<commit_message>
Updated for Identity3 - ThatConference 2016
</commit_message>
<xml_diff>
--- a/slides.pptx
+++ b/slides.pptx
@@ -11,12 +11,12 @@
     <p:sldId id="256" r:id="rId2"/>
     <p:sldId id="265" r:id="rId3"/>
     <p:sldId id="413" r:id="rId4"/>
-    <p:sldId id="415" r:id="rId5"/>
-    <p:sldId id="416" r:id="rId6"/>
-    <p:sldId id="417" r:id="rId7"/>
-    <p:sldId id="418" r:id="rId8"/>
-    <p:sldId id="419" r:id="rId9"/>
-    <p:sldId id="420" r:id="rId10"/>
+    <p:sldId id="422" r:id="rId5"/>
+    <p:sldId id="415" r:id="rId6"/>
+    <p:sldId id="416" r:id="rId7"/>
+    <p:sldId id="417" r:id="rId8"/>
+    <p:sldId id="418" r:id="rId9"/>
+    <p:sldId id="419" r:id="rId10"/>
     <p:sldId id="421" r:id="rId11"/>
     <p:sldId id="398" r:id="rId12"/>
     <p:sldId id="411" r:id="rId13"/>
@@ -209,7 +209,7 @@
           <a:p>
             <a:fld id="{99DFD45C-204D-49D0-AA7B-31A6035D5E91}" type="datetimeFigureOut">
               <a:rPr lang="en-US" smtClean="0"/>
-              <a:t>6/29/2015</a:t>
+              <a:t>8/10/2016</a:t>
             </a:fld>
             <a:endParaRPr lang="en-US"/>
           </a:p>
@@ -273,38 +273,37 @@
           <a:p>
             <a:pPr lvl="0"/>
             <a:r>
-              <a:rPr lang="en-US" smtClean="0"/>
+              <a:rPr lang="en-US"/>
               <a:t>Click to edit Master text styles</a:t>
             </a:r>
           </a:p>
           <a:p>
             <a:pPr lvl="1"/>
             <a:r>
-              <a:rPr lang="en-US" smtClean="0"/>
+              <a:rPr lang="en-US"/>
               <a:t>Second level</a:t>
             </a:r>
           </a:p>
           <a:p>
             <a:pPr lvl="2"/>
             <a:r>
-              <a:rPr lang="en-US" smtClean="0"/>
+              <a:rPr lang="en-US"/>
               <a:t>Third level</a:t>
             </a:r>
           </a:p>
           <a:p>
             <a:pPr lvl="3"/>
             <a:r>
-              <a:rPr lang="en-US" smtClean="0"/>
+              <a:rPr lang="en-US"/>
               <a:t>Fourth level</a:t>
             </a:r>
           </a:p>
           <a:p>
             <a:pPr lvl="4"/>
             <a:r>
-              <a:rPr lang="en-US" smtClean="0"/>
+              <a:rPr lang="en-US"/>
               <a:t>Fifth level</a:t>
             </a:r>
-            <a:endParaRPr lang="en-US"/>
           </a:p>
         </p:txBody>
       </p:sp>
@@ -522,22 +521,17 @@
           <a:lstStyle/>
           <a:p>
             <a:r>
-              <a:rPr lang="en-US" dirty="0" smtClean="0"/>
+              <a:rPr lang="en-US" dirty="0"/>
               <a:t>The icons use </a:t>
             </a:r>
             <a:r>
-              <a:rPr lang="en-US" dirty="0" err="1" smtClean="0"/>
+              <a:rPr lang="en-US" dirty="0" err="1"/>
               <a:t>FontAwesome</a:t>
             </a:r>
             <a:r>
-              <a:rPr lang="en-US" dirty="0" smtClean="0"/>
-              <a:t>. If they appear to be missing, try installing the font from here: http://</a:t>
-            </a:r>
-            <a:r>
-              <a:rPr lang="en-US" dirty="0" smtClean="0"/>
-              <a:t>fortawesome.github.io/Font-Awesome/</a:t>
-            </a:r>
-            <a:endParaRPr lang="en-US" dirty="0" smtClean="0"/>
+              <a:rPr lang="en-US" dirty="0"/>
+              <a:t>. If they appear to be missing, try installing the font from here: http://fortawesome.github.io/Font-Awesome/</a:t>
+            </a:r>
           </a:p>
         </p:txBody>
       </p:sp>
@@ -622,30 +616,30 @@
           <a:lstStyle/>
           <a:p>
             <a:r>
-              <a:rPr lang="en-US" dirty="0" smtClean="0"/>
+              <a:rPr lang="en-US" dirty="0"/>
               <a:t>Keep</a:t>
             </a:r>
             <a:r>
-              <a:rPr lang="en-US" baseline="0" dirty="0" smtClean="0"/>
+              <a:rPr lang="en-US" baseline="0" dirty="0"/>
               <a:t> in mind that when ASP.NET Membership shipped, it pre-dated things like MVC which didn’t release until much later. So this was a solution that made sense at the time.</a:t>
             </a:r>
-            <a:endParaRPr lang="en-US" dirty="0" smtClean="0"/>
-          </a:p>
-          <a:p>
-            <a:r>
-              <a:rPr lang="en-US" dirty="0" smtClean="0"/>
+            <a:endParaRPr lang="en-US" dirty="0"/>
+          </a:p>
+          <a:p>
+            <a:r>
+              <a:rPr lang="en-US" dirty="0"/>
               <a:t>Really only worked with SQL server. Other relational databases (even MySQL) required custom providers, and trying to write a custom provider for a non-relational database was very difficult</a:t>
             </a:r>
           </a:p>
           <a:p>
             <a:r>
-              <a:rPr lang="en-US" dirty="0" smtClean="0"/>
+              <a:rPr lang="en-US" dirty="0"/>
               <a:t>Things like roles and passwords were a requirement of the system. This meant no compatibility with things like OAuth, Claims based authentication, etc.</a:t>
             </a:r>
           </a:p>
           <a:p>
             <a:r>
-              <a:rPr lang="en-US" dirty="0" smtClean="0"/>
+              <a:rPr lang="en-US" dirty="0"/>
               <a:t>Adding fields to users was difficult. The mechanism was user profiles, but they way they worked was weird. Because of the tight coupling with SQL and a specific database schema, additional fields were all stored in a single column, in a relatively cryptic format. Nothing as neat as JSON or even XML. This made querying or reporting on user data overly complicated. And forget about doing SQL joins to any of that.</a:t>
             </a:r>
           </a:p>
@@ -671,7 +665,7 @@
           <a:p>
             <a:fld id="{C16E5CF5-7271-4C13-8455-0600239432B5}" type="slidenum">
               <a:rPr lang="en-US" smtClean="0"/>
-              <a:t>4</a:t>
+              <a:t>5</a:t>
             </a:fld>
             <a:endParaRPr lang="en-US"/>
           </a:p>
@@ -904,7 +898,7 @@
           </a:lstStyle>
           <a:p>
             <a:r>
-              <a:rPr lang="en-US" smtClean="0"/>
+              <a:rPr lang="en-US"/>
               <a:t>Click to edit Master title style</a:t>
             </a:r>
             <a:endParaRPr lang="en-US" dirty="0"/>
@@ -976,7 +970,7 @@
           </a:lstStyle>
           <a:p>
             <a:r>
-              <a:rPr lang="en-US" smtClean="0"/>
+              <a:rPr lang="en-US"/>
               <a:t>Click to edit Master subtitle style</a:t>
             </a:r>
             <a:endParaRPr lang="en-US" dirty="0"/>
@@ -1000,7 +994,7 @@
           <a:p>
             <a:fld id="{96DFF08F-DC6B-4601-B491-B0F83F6DD2DA}" type="datetimeFigureOut">
               <a:rPr lang="en-US" dirty="0"/>
-              <a:t>6/29/2015</a:t>
+              <a:t>8/10/2016</a:t>
             </a:fld>
             <a:endParaRPr lang="en-US" dirty="0"/>
           </a:p>
@@ -1127,7 +1121,7 @@
           <a:lstStyle/>
           <a:p>
             <a:r>
-              <a:rPr lang="en-US" smtClean="0"/>
+              <a:rPr lang="en-US"/>
               <a:t>Click to edit Master title style</a:t>
             </a:r>
             <a:endParaRPr lang="en-US" dirty="0"/>
@@ -1151,35 +1145,35 @@
           <a:p>
             <a:pPr lvl="0"/>
             <a:r>
-              <a:rPr lang="en-US" smtClean="0"/>
+              <a:rPr lang="en-US"/>
               <a:t>Click to edit Master text styles</a:t>
             </a:r>
           </a:p>
           <a:p>
             <a:pPr lvl="1"/>
             <a:r>
-              <a:rPr lang="en-US" smtClean="0"/>
+              <a:rPr lang="en-US"/>
               <a:t>Second level</a:t>
             </a:r>
           </a:p>
           <a:p>
             <a:pPr lvl="2"/>
             <a:r>
-              <a:rPr lang="en-US" smtClean="0"/>
+              <a:rPr lang="en-US"/>
               <a:t>Third level</a:t>
             </a:r>
           </a:p>
           <a:p>
             <a:pPr lvl="3"/>
             <a:r>
-              <a:rPr lang="en-US" smtClean="0"/>
+              <a:rPr lang="en-US"/>
               <a:t>Fourth level</a:t>
             </a:r>
           </a:p>
           <a:p>
             <a:pPr lvl="4"/>
             <a:r>
-              <a:rPr lang="en-US" smtClean="0"/>
+              <a:rPr lang="en-US"/>
               <a:t>Fifth level</a:t>
             </a:r>
             <a:endParaRPr lang="en-US" dirty="0"/>
@@ -1203,7 +1197,7 @@
           <a:p>
             <a:fld id="{96DFF08F-DC6B-4601-B491-B0F83F6DD2DA}" type="datetimeFigureOut">
               <a:rPr lang="en-US" dirty="0"/>
-              <a:t>6/29/2015</a:t>
+              <a:t>8/10/2016</a:t>
             </a:fld>
             <a:endParaRPr lang="en-US" dirty="0"/>
           </a:p>
@@ -1373,7 +1367,7 @@
           <a:lstStyle/>
           <a:p>
             <a:r>
-              <a:rPr lang="en-US" smtClean="0"/>
+              <a:rPr lang="en-US"/>
               <a:t>Click to edit Master title style</a:t>
             </a:r>
             <a:endParaRPr lang="en-US" dirty="0"/>
@@ -1402,35 +1396,35 @@
           <a:p>
             <a:pPr lvl="0"/>
             <a:r>
-              <a:rPr lang="en-US" smtClean="0"/>
+              <a:rPr lang="en-US"/>
               <a:t>Click to edit Master text styles</a:t>
             </a:r>
           </a:p>
           <a:p>
             <a:pPr lvl="1"/>
             <a:r>
-              <a:rPr lang="en-US" smtClean="0"/>
+              <a:rPr lang="en-US"/>
               <a:t>Second level</a:t>
             </a:r>
           </a:p>
           <a:p>
             <a:pPr lvl="2"/>
             <a:r>
-              <a:rPr lang="en-US" smtClean="0"/>
+              <a:rPr lang="en-US"/>
               <a:t>Third level</a:t>
             </a:r>
           </a:p>
           <a:p>
             <a:pPr lvl="3"/>
             <a:r>
-              <a:rPr lang="en-US" smtClean="0"/>
+              <a:rPr lang="en-US"/>
               <a:t>Fourth level</a:t>
             </a:r>
           </a:p>
           <a:p>
             <a:pPr lvl="4"/>
             <a:r>
-              <a:rPr lang="en-US" smtClean="0"/>
+              <a:rPr lang="en-US"/>
               <a:t>Fifth level</a:t>
             </a:r>
             <a:endParaRPr lang="en-US" dirty="0"/>
@@ -1454,7 +1448,7 @@
           <a:p>
             <a:fld id="{96DFF08F-DC6B-4601-B491-B0F83F6DD2DA}" type="datetimeFigureOut">
               <a:rPr lang="en-US" dirty="0"/>
-              <a:t>6/29/2015</a:t>
+              <a:t>8/10/2016</a:t>
             </a:fld>
             <a:endParaRPr lang="en-US" dirty="0"/>
           </a:p>
@@ -1543,7 +1537,7 @@
           <a:lstStyle/>
           <a:p>
             <a:r>
-              <a:rPr lang="en-US" smtClean="0"/>
+              <a:rPr lang="en-US"/>
               <a:t>Click to edit Master title style</a:t>
             </a:r>
             <a:endParaRPr lang="en-US" dirty="0"/>
@@ -1567,35 +1561,35 @@
           <a:p>
             <a:pPr lvl="0"/>
             <a:r>
-              <a:rPr lang="en-US" smtClean="0"/>
+              <a:rPr lang="en-US"/>
               <a:t>Click to edit Master text styles</a:t>
             </a:r>
           </a:p>
           <a:p>
             <a:pPr lvl="1"/>
             <a:r>
-              <a:rPr lang="en-US" smtClean="0"/>
+              <a:rPr lang="en-US"/>
               <a:t>Second level</a:t>
             </a:r>
           </a:p>
           <a:p>
             <a:pPr lvl="2"/>
             <a:r>
-              <a:rPr lang="en-US" smtClean="0"/>
+              <a:rPr lang="en-US"/>
               <a:t>Third level</a:t>
             </a:r>
           </a:p>
           <a:p>
             <a:pPr lvl="3"/>
             <a:r>
-              <a:rPr lang="en-US" smtClean="0"/>
+              <a:rPr lang="en-US"/>
               <a:t>Fourth level</a:t>
             </a:r>
           </a:p>
           <a:p>
             <a:pPr lvl="4"/>
             <a:r>
-              <a:rPr lang="en-US" smtClean="0"/>
+              <a:rPr lang="en-US"/>
               <a:t>Fifth level</a:t>
             </a:r>
             <a:endParaRPr lang="en-US" dirty="0"/>
@@ -1619,7 +1613,7 @@
           <a:p>
             <a:fld id="{D62CEF3B-A037-46D0-B02C-1428F07E9383}" type="datetimeFigureOut">
               <a:rPr lang="en-US" dirty="0"/>
-              <a:t>6/29/2015</a:t>
+              <a:t>8/10/2016</a:t>
             </a:fld>
             <a:endParaRPr lang="en-US" dirty="0"/>
           </a:p>
@@ -1813,7 +1807,7 @@
           </a:lstStyle>
           <a:p>
             <a:r>
-              <a:rPr lang="en-US" smtClean="0"/>
+              <a:rPr lang="en-US"/>
               <a:t>Click to edit Master title style</a:t>
             </a:r>
             <a:endParaRPr lang="en-US" dirty="0"/>
@@ -1934,7 +1928,7 @@
           <a:p>
             <a:pPr lvl="0"/>
             <a:r>
-              <a:rPr lang="en-US" smtClean="0"/>
+              <a:rPr lang="en-US"/>
               <a:t>Click to edit Master text styles</a:t>
             </a:r>
           </a:p>
@@ -1957,7 +1951,7 @@
           <a:p>
             <a:fld id="{96DFF08F-DC6B-4601-B491-B0F83F6DD2DA}" type="datetimeFigureOut">
               <a:rPr lang="en-US" dirty="0"/>
-              <a:t>6/29/2015</a:t>
+              <a:t>8/10/2016</a:t>
             </a:fld>
             <a:endParaRPr lang="en-US" dirty="0"/>
           </a:p>
@@ -2089,7 +2083,7 @@
           <a:lstStyle/>
           <a:p>
             <a:r>
-              <a:rPr lang="en-US" smtClean="0"/>
+              <a:rPr lang="en-US"/>
               <a:t>Click to edit Master title style</a:t>
             </a:r>
             <a:endParaRPr lang="en-US" dirty="0"/>
@@ -2118,35 +2112,35 @@
           <a:p>
             <a:pPr lvl="0"/>
             <a:r>
-              <a:rPr lang="en-US" smtClean="0"/>
+              <a:rPr lang="en-US"/>
               <a:t>Click to edit Master text styles</a:t>
             </a:r>
           </a:p>
           <a:p>
             <a:pPr lvl="1"/>
             <a:r>
-              <a:rPr lang="en-US" smtClean="0"/>
+              <a:rPr lang="en-US"/>
               <a:t>Second level</a:t>
             </a:r>
           </a:p>
           <a:p>
             <a:pPr lvl="2"/>
             <a:r>
-              <a:rPr lang="en-US" smtClean="0"/>
+              <a:rPr lang="en-US"/>
               <a:t>Third level</a:t>
             </a:r>
           </a:p>
           <a:p>
             <a:pPr lvl="3"/>
             <a:r>
-              <a:rPr lang="en-US" smtClean="0"/>
+              <a:rPr lang="en-US"/>
               <a:t>Fourth level</a:t>
             </a:r>
           </a:p>
           <a:p>
             <a:pPr lvl="4"/>
             <a:r>
-              <a:rPr lang="en-US" smtClean="0"/>
+              <a:rPr lang="en-US"/>
               <a:t>Fifth level</a:t>
             </a:r>
             <a:endParaRPr lang="en-US" dirty="0"/>
@@ -2175,35 +2169,35 @@
           <a:p>
             <a:pPr lvl="0"/>
             <a:r>
-              <a:rPr lang="en-US" smtClean="0"/>
+              <a:rPr lang="en-US"/>
               <a:t>Click to edit Master text styles</a:t>
             </a:r>
           </a:p>
           <a:p>
             <a:pPr lvl="1"/>
             <a:r>
-              <a:rPr lang="en-US" smtClean="0"/>
+              <a:rPr lang="en-US"/>
               <a:t>Second level</a:t>
             </a:r>
           </a:p>
           <a:p>
             <a:pPr lvl="2"/>
             <a:r>
-              <a:rPr lang="en-US" smtClean="0"/>
+              <a:rPr lang="en-US"/>
               <a:t>Third level</a:t>
             </a:r>
           </a:p>
           <a:p>
             <a:pPr lvl="3"/>
             <a:r>
-              <a:rPr lang="en-US" smtClean="0"/>
+              <a:rPr lang="en-US"/>
               <a:t>Fourth level</a:t>
             </a:r>
           </a:p>
           <a:p>
             <a:pPr lvl="4"/>
             <a:r>
-              <a:rPr lang="en-US" smtClean="0"/>
+              <a:rPr lang="en-US"/>
               <a:t>Fifth level</a:t>
             </a:r>
             <a:endParaRPr lang="en-US" dirty="0"/>
@@ -2227,7 +2221,7 @@
           <a:p>
             <a:fld id="{96DFF08F-DC6B-4601-B491-B0F83F6DD2DA}" type="datetimeFigureOut">
               <a:rPr lang="en-US" dirty="0"/>
-              <a:t>6/29/2015</a:t>
+              <a:t>8/10/2016</a:t>
             </a:fld>
             <a:endParaRPr lang="en-US" dirty="0"/>
           </a:p>
@@ -2321,7 +2315,7 @@
           <a:lstStyle/>
           <a:p>
             <a:r>
-              <a:rPr lang="en-US" smtClean="0"/>
+              <a:rPr lang="en-US"/>
               <a:t>Click to edit Master title style</a:t>
             </a:r>
             <a:endParaRPr lang="en-US" dirty="0"/>
@@ -2393,7 +2387,7 @@
           <a:p>
             <a:pPr lvl="0"/>
             <a:r>
-              <a:rPr lang="en-US" smtClean="0"/>
+              <a:rPr lang="en-US"/>
               <a:t>Click to edit Master text styles</a:t>
             </a:r>
           </a:p>
@@ -2421,35 +2415,35 @@
           <a:p>
             <a:pPr lvl="0"/>
             <a:r>
-              <a:rPr lang="en-US" smtClean="0"/>
+              <a:rPr lang="en-US"/>
               <a:t>Click to edit Master text styles</a:t>
             </a:r>
           </a:p>
           <a:p>
             <a:pPr lvl="1"/>
             <a:r>
-              <a:rPr lang="en-US" smtClean="0"/>
+              <a:rPr lang="en-US"/>
               <a:t>Second level</a:t>
             </a:r>
           </a:p>
           <a:p>
             <a:pPr lvl="2"/>
             <a:r>
-              <a:rPr lang="en-US" smtClean="0"/>
+              <a:rPr lang="en-US"/>
               <a:t>Third level</a:t>
             </a:r>
           </a:p>
           <a:p>
             <a:pPr lvl="3"/>
             <a:r>
-              <a:rPr lang="en-US" smtClean="0"/>
+              <a:rPr lang="en-US"/>
               <a:t>Fourth level</a:t>
             </a:r>
           </a:p>
           <a:p>
             <a:pPr lvl="4"/>
             <a:r>
-              <a:rPr lang="en-US" smtClean="0"/>
+              <a:rPr lang="en-US"/>
               <a:t>Fifth level</a:t>
             </a:r>
             <a:endParaRPr lang="en-US" dirty="0"/>
@@ -2521,7 +2515,7 @@
           <a:p>
             <a:pPr lvl="0"/>
             <a:r>
-              <a:rPr lang="en-US" smtClean="0"/>
+              <a:rPr lang="en-US"/>
               <a:t>Click to edit Master text styles</a:t>
             </a:r>
           </a:p>
@@ -2549,35 +2543,35 @@
           <a:p>
             <a:pPr lvl="0"/>
             <a:r>
-              <a:rPr lang="en-US" smtClean="0"/>
+              <a:rPr lang="en-US"/>
               <a:t>Click to edit Master text styles</a:t>
             </a:r>
           </a:p>
           <a:p>
             <a:pPr lvl="1"/>
             <a:r>
-              <a:rPr lang="en-US" smtClean="0"/>
+              <a:rPr lang="en-US"/>
               <a:t>Second level</a:t>
             </a:r>
           </a:p>
           <a:p>
             <a:pPr lvl="2"/>
             <a:r>
-              <a:rPr lang="en-US" smtClean="0"/>
+              <a:rPr lang="en-US"/>
               <a:t>Third level</a:t>
             </a:r>
           </a:p>
           <a:p>
             <a:pPr lvl="3"/>
             <a:r>
-              <a:rPr lang="en-US" smtClean="0"/>
+              <a:rPr lang="en-US"/>
               <a:t>Fourth level</a:t>
             </a:r>
           </a:p>
           <a:p>
             <a:pPr lvl="4"/>
             <a:r>
-              <a:rPr lang="en-US" smtClean="0"/>
+              <a:rPr lang="en-US"/>
               <a:t>Fifth level</a:t>
             </a:r>
             <a:endParaRPr lang="en-US" dirty="0"/>
@@ -2601,7 +2595,7 @@
           <a:p>
             <a:fld id="{96DFF08F-DC6B-4601-B491-B0F83F6DD2DA}" type="datetimeFigureOut">
               <a:rPr lang="en-US" dirty="0"/>
-              <a:t>6/29/2015</a:t>
+              <a:t>8/10/2016</a:t>
             </a:fld>
             <a:endParaRPr lang="en-US" dirty="0"/>
           </a:p>
@@ -2690,7 +2684,7 @@
           <a:lstStyle/>
           <a:p>
             <a:r>
-              <a:rPr lang="en-US" smtClean="0"/>
+              <a:rPr lang="en-US"/>
               <a:t>Click to edit Master title style</a:t>
             </a:r>
             <a:endParaRPr lang="en-US" dirty="0"/>
@@ -2714,7 +2708,7 @@
           <a:p>
             <a:fld id="{96DFF08F-DC6B-4601-B491-B0F83F6DD2DA}" type="datetimeFigureOut">
               <a:rPr lang="en-US" dirty="0"/>
-              <a:t>6/29/2015</a:t>
+              <a:t>8/10/2016</a:t>
             </a:fld>
             <a:endParaRPr lang="en-US" dirty="0"/>
           </a:p>
@@ -2881,7 +2875,7 @@
             <a:fld id="{96DFF08F-DC6B-4601-B491-B0F83F6DD2DA}" type="datetimeFigureOut">
               <a:rPr lang="en-US" dirty="0"/>
               <a:pPr/>
-              <a:t>6/29/2015</a:t>
+              <a:t>8/10/2016</a:t>
             </a:fld>
             <a:endParaRPr lang="en-US" dirty="0"/>
           </a:p>
@@ -2943,13 +2937,6 @@
   <p:clrMapOvr>
     <a:masterClrMapping/>
   </p:clrMapOvr>
-  <p:timing>
-    <p:tnLst>
-      <p:par>
-        <p:cTn id="1" dur="indefinite" restart="never" nodeType="tmRoot"/>
-      </p:par>
-    </p:tnLst>
-  </p:timing>
 </p:sldLayout>
 </file>
 
@@ -3077,7 +3064,7 @@
           </a:lstStyle>
           <a:p>
             <a:r>
-              <a:rPr lang="en-US" smtClean="0"/>
+              <a:rPr lang="en-US"/>
               <a:t>Click to edit Master title style</a:t>
             </a:r>
             <a:endParaRPr lang="en-US" dirty="0"/>
@@ -3106,35 +3093,35 @@
           <a:p>
             <a:pPr lvl="0"/>
             <a:r>
-              <a:rPr lang="en-US" smtClean="0"/>
+              <a:rPr lang="en-US"/>
               <a:t>Click to edit Master text styles</a:t>
             </a:r>
           </a:p>
           <a:p>
             <a:pPr lvl="1"/>
             <a:r>
-              <a:rPr lang="en-US" smtClean="0"/>
+              <a:rPr lang="en-US"/>
               <a:t>Second level</a:t>
             </a:r>
           </a:p>
           <a:p>
             <a:pPr lvl="2"/>
             <a:r>
-              <a:rPr lang="en-US" smtClean="0"/>
+              <a:rPr lang="en-US"/>
               <a:t>Third level</a:t>
             </a:r>
           </a:p>
           <a:p>
             <a:pPr lvl="3"/>
             <a:r>
-              <a:rPr lang="en-US" smtClean="0"/>
+              <a:rPr lang="en-US"/>
               <a:t>Fourth level</a:t>
             </a:r>
           </a:p>
           <a:p>
             <a:pPr lvl="4"/>
             <a:r>
-              <a:rPr lang="en-US" smtClean="0"/>
+              <a:rPr lang="en-US"/>
               <a:t>Fifth level</a:t>
             </a:r>
             <a:endParaRPr lang="en-US" dirty="0"/>
@@ -3206,7 +3193,7 @@
           <a:p>
             <a:pPr lvl="0"/>
             <a:r>
-              <a:rPr lang="en-US" smtClean="0"/>
+              <a:rPr lang="en-US"/>
               <a:t>Click to edit Master text styles</a:t>
             </a:r>
           </a:p>
@@ -3239,7 +3226,7 @@
             <a:fld id="{96DFF08F-DC6B-4601-B491-B0F83F6DD2DA}" type="datetimeFigureOut">
               <a:rPr lang="en-US" dirty="0"/>
               <a:pPr/>
-              <a:t>6/29/2015</a:t>
+              <a:t>8/10/2016</a:t>
             </a:fld>
             <a:endParaRPr lang="en-US" dirty="0"/>
           </a:p>
@@ -3441,7 +3428,7 @@
           </a:lstStyle>
           <a:p>
             <a:r>
-              <a:rPr lang="en-US" smtClean="0"/>
+              <a:rPr lang="en-US"/>
               <a:t>Click to edit Master title style</a:t>
             </a:r>
             <a:endParaRPr lang="en-US" dirty="0"/>
@@ -3511,7 +3498,7 @@
           </a:lstStyle>
           <a:p>
             <a:r>
-              <a:rPr lang="en-US" smtClean="0"/>
+              <a:rPr lang="en-US"/>
               <a:t>Click icon to add picture</a:t>
             </a:r>
             <a:endParaRPr lang="en-US" dirty="0"/>
@@ -3589,7 +3576,7 @@
           <a:p>
             <a:pPr lvl="0"/>
             <a:r>
-              <a:rPr lang="en-US" smtClean="0"/>
+              <a:rPr lang="en-US"/>
               <a:t>Click to edit Master text styles</a:t>
             </a:r>
           </a:p>
@@ -3612,7 +3599,7 @@
           <a:p>
             <a:fld id="{96DFF08F-DC6B-4601-B491-B0F83F6DD2DA}" type="datetimeFigureOut">
               <a:rPr lang="en-US" dirty="0"/>
-              <a:t>6/29/2015</a:t>
+              <a:t>8/10/2016</a:t>
             </a:fld>
             <a:endParaRPr lang="en-US" dirty="0"/>
           </a:p>
@@ -3792,7 +3779,7 @@
           <a:lstStyle/>
           <a:p>
             <a:r>
-              <a:rPr lang="en-US" smtClean="0"/>
+              <a:rPr lang="en-US"/>
               <a:t>Click to edit Master title style</a:t>
             </a:r>
             <a:endParaRPr lang="en-US" dirty="0"/>
@@ -3826,35 +3813,35 @@
           <a:p>
             <a:pPr lvl="0"/>
             <a:r>
-              <a:rPr lang="en-US" smtClean="0"/>
+              <a:rPr lang="en-US"/>
               <a:t>Click to edit Master text styles</a:t>
             </a:r>
           </a:p>
           <a:p>
             <a:pPr lvl="1"/>
             <a:r>
-              <a:rPr lang="en-US" smtClean="0"/>
+              <a:rPr lang="en-US"/>
               <a:t>Second level</a:t>
             </a:r>
           </a:p>
           <a:p>
             <a:pPr lvl="2"/>
             <a:r>
-              <a:rPr lang="en-US" smtClean="0"/>
+              <a:rPr lang="en-US"/>
               <a:t>Third level</a:t>
             </a:r>
           </a:p>
           <a:p>
             <a:pPr lvl="3"/>
             <a:r>
-              <a:rPr lang="en-US" smtClean="0"/>
+              <a:rPr lang="en-US"/>
               <a:t>Fourth level</a:t>
             </a:r>
           </a:p>
           <a:p>
             <a:pPr lvl="4"/>
             <a:r>
-              <a:rPr lang="en-US" smtClean="0"/>
+              <a:rPr lang="en-US"/>
               <a:t>Fifth level</a:t>
             </a:r>
             <a:endParaRPr lang="en-US" dirty="0"/>
@@ -3895,7 +3882,7 @@
             <a:fld id="{96DFF08F-DC6B-4601-B491-B0F83F6DD2DA}" type="datetimeFigureOut">
               <a:rPr lang="en-US" dirty="0"/>
               <a:pPr/>
-              <a:t>6/29/2015</a:t>
+              <a:t>8/10/2016</a:t>
             </a:fld>
             <a:endParaRPr lang="en-US" dirty="0"/>
           </a:p>
@@ -4434,26 +4421,22 @@
           <a:p>
             <a:pPr algn="ctr"/>
             <a:r>
-              <a:rPr lang="en-US" sz="7200" dirty="0" smtClean="0"/>
-              <a:t>Inside Auth</a:t>
+              <a:rPr lang="en-US" sz="7200" dirty="0"/>
+              <a:t>Identity Management</a:t>
             </a:r>
             <a:br>
-              <a:rPr lang="en-US" sz="7200" dirty="0" smtClean="0"/>
+              <a:rPr lang="en-US" sz="7200" dirty="0"/>
             </a:br>
             <a:r>
-              <a:rPr lang="en-US" sz="6000" dirty="0" smtClean="0"/>
-              <a:t>with </a:t>
-            </a:r>
-            <a:r>
-              <a:rPr lang="en-US" sz="6600" dirty="0" smtClean="0"/>
-              <a:t/>
+              <a:rPr lang="en-US" sz="6000" dirty="0"/>
+              <a:t>in </a:t>
             </a:r>
             <a:br>
-              <a:rPr lang="en-US" sz="6600" dirty="0" smtClean="0"/>
+              <a:rPr lang="en-US" sz="6600" dirty="0"/>
             </a:br>
             <a:r>
-              <a:rPr lang="en-US" sz="7200" dirty="0" smtClean="0"/>
-              <a:t>AspNet.Identity</a:t>
+              <a:rPr lang="en-US" sz="7200" dirty="0"/>
+              <a:t>ASP.NET Core</a:t>
             </a:r>
             <a:endParaRPr lang="en-US" sz="4400" dirty="0"/>
           </a:p>
@@ -4482,10 +4465,10 @@
           <a:lstStyle/>
           <a:p>
             <a:r>
-              <a:rPr lang="en-US" sz="4800" dirty="0" smtClean="0"/>
+              <a:rPr lang="en-US" sz="4800" dirty="0"/>
               <a:t>Ondrej balas</a:t>
             </a:r>
-            <a:endParaRPr lang="en-US" sz="3500" dirty="0" smtClean="0"/>
+            <a:endParaRPr lang="en-US" sz="3500" dirty="0"/>
           </a:p>
         </p:txBody>
       </p:sp>
@@ -4756,7 +4739,7 @@
           <a:p>
             <a:pPr algn="r"/>
             <a:r>
-              <a:rPr lang="en-US" dirty="0" smtClean="0"/>
+              <a:rPr lang="en-US" dirty="0"/>
               <a:t>@ondrejbalas </a:t>
             </a:r>
             <a:r>
@@ -4765,15 +4748,11 @@
               </a:rPr>
               <a:t></a:t>
             </a:r>
-            <a:r>
-              <a:rPr lang="en-US" dirty="0" smtClean="0"/>
-              <a:t/>
-            </a:r>
             <a:br>
-              <a:rPr lang="en-US" dirty="0" smtClean="0"/>
+              <a:rPr lang="en-US" dirty="0"/>
             </a:br>
             <a:r>
-              <a:rPr lang="en-US" dirty="0" smtClean="0"/>
+              <a:rPr lang="en-US" dirty="0"/>
               <a:t>www.ondrejbalas.com </a:t>
             </a:r>
             <a:r>
@@ -4782,15 +4761,11 @@
               </a:rPr>
               <a:t></a:t>
             </a:r>
-            <a:r>
-              <a:rPr lang="en-US" dirty="0"/>
-              <a:t/>
-            </a:r>
             <a:br>
               <a:rPr lang="en-US" dirty="0"/>
             </a:br>
             <a:r>
-              <a:rPr lang="en-US" dirty="0" smtClean="0"/>
+              <a:rPr lang="en-US" dirty="0"/>
               <a:t>Ondrej@ondrejbalas.com</a:t>
             </a:r>
             <a:r>
@@ -4799,7 +4774,7 @@
               </a:rPr>
               <a:t> </a:t>
             </a:r>
-            <a:endParaRPr lang="en-US" dirty="0" smtClean="0"/>
+            <a:endParaRPr lang="en-US" dirty="0"/>
           </a:p>
         </p:txBody>
       </p:sp>
@@ -4813,13 +4788,6 @@
   <p:clrMapOvr>
     <a:masterClrMapping/>
   </p:clrMapOvr>
-  <p:timing>
-    <p:tnLst>
-      <p:par>
-        <p:cTn id="1" dur="indefinite" restart="never" nodeType="tmRoot"/>
-      </p:par>
-    </p:tnLst>
-  </p:timing>
 </p:sld>
 </file>
 
@@ -4857,10 +4825,9 @@
           <a:p>
             <a:pPr algn="ctr"/>
             <a:r>
-              <a:rPr lang="en-US" dirty="0" smtClean="0"/>
+              <a:rPr lang="en-US" dirty="0"/>
               <a:t>Not Covering</a:t>
             </a:r>
-            <a:endParaRPr lang="en-US" dirty="0"/>
           </a:p>
         </p:txBody>
       </p:sp>
@@ -4892,10 +4859,10 @@
               </a:lnSpc>
             </a:pPr>
             <a:r>
-              <a:rPr lang="en-US" sz="2400" dirty="0" err="1" smtClean="0"/>
+              <a:rPr lang="en-US" sz="2400" dirty="0" err="1"/>
               <a:t>WebForms</a:t>
             </a:r>
-            <a:endParaRPr lang="en-US" sz="2400" dirty="0" smtClean="0"/>
+            <a:endParaRPr lang="en-US" sz="2400" dirty="0"/>
           </a:p>
           <a:p>
             <a:pPr algn="ctr">
@@ -4904,10 +4871,10 @@
               </a:lnSpc>
             </a:pPr>
             <a:r>
-              <a:rPr lang="en-US" sz="2400" dirty="0" err="1" smtClean="0"/>
+              <a:rPr lang="en-US" sz="2400" dirty="0" err="1"/>
               <a:t>EntityFramework</a:t>
             </a:r>
-            <a:endParaRPr lang="en-US" sz="2400" dirty="0" smtClean="0"/>
+            <a:endParaRPr lang="en-US" sz="2400" dirty="0"/>
           </a:p>
         </p:txBody>
       </p:sp>
@@ -5085,10 +5052,9 @@
           <a:lstStyle/>
           <a:p>
             <a:r>
-              <a:rPr lang="en-US" dirty="0" smtClean="0"/>
+              <a:rPr lang="en-US" dirty="0"/>
               <a:t>Code Samples</a:t>
             </a:r>
-            <a:endParaRPr lang="en-US" dirty="0"/>
           </a:p>
         </p:txBody>
       </p:sp>
@@ -5110,38 +5076,8 @@
           <a:lstStyle/>
           <a:p>
             <a:r>
-              <a:rPr lang="en-US" sz="2400" dirty="0" smtClean="0"/>
+              <a:rPr lang="en-US" sz="2400" dirty="0"/>
               <a:t>All code samples are created in </a:t>
-            </a:r>
-            <a:r>
-              <a:rPr lang="en-US" sz="2400" b="1" dirty="0" smtClean="0">
-                <a:solidFill>
-                  <a:srgbClr val="0000FF"/>
-                </a:solidFill>
-              </a:rPr>
-              <a:t>Visual Studio 2013 with Update 4</a:t>
-            </a:r>
-            <a:r>
-              <a:rPr lang="en-US" sz="2400" dirty="0" smtClean="0"/>
-              <a:t>.</a:t>
-            </a:r>
-          </a:p>
-          <a:p>
-            <a:r>
-              <a:rPr lang="en-US" sz="2400" dirty="0" smtClean="0"/>
-              <a:t>The project type is the </a:t>
-            </a:r>
-            <a:r>
-              <a:rPr lang="en-US" sz="2400" b="1" dirty="0" smtClean="0">
-                <a:solidFill>
-                  <a:srgbClr val="0000FF"/>
-                </a:solidFill>
-              </a:rPr>
-              <a:t>ASP.NET Web Application</a:t>
-            </a:r>
-            <a:r>
-              <a:rPr lang="en-US" sz="2400" dirty="0" smtClean="0"/>
-              <a:t> under </a:t>
             </a:r>
             <a:r>
               <a:rPr lang="en-US" sz="2400" b="1" dirty="0">
@@ -5149,10 +5085,40 @@
                   <a:srgbClr val="0000FF"/>
                 </a:solidFill>
               </a:rPr>
-              <a:t>.NET Framework 4.6</a:t>
-            </a:r>
-            <a:r>
-              <a:rPr lang="en-US" sz="2400" dirty="0" smtClean="0"/>
+              <a:t>Visual Studio 2015</a:t>
+            </a:r>
+            <a:r>
+              <a:rPr lang="en-US" sz="2400" dirty="0"/>
+              <a:t>.</a:t>
+            </a:r>
+          </a:p>
+          <a:p>
+            <a:r>
+              <a:rPr lang="en-US" sz="2400" dirty="0"/>
+              <a:t>The project template is the </a:t>
+            </a:r>
+            <a:r>
+              <a:rPr lang="en-US" sz="2400" b="1" dirty="0">
+                <a:solidFill>
+                  <a:srgbClr val="0000FF"/>
+                </a:solidFill>
+              </a:rPr>
+              <a:t>ASP.NET Core Web Application (.NET Framework)</a:t>
+            </a:r>
+            <a:r>
+              <a:rPr lang="en-US" sz="2400" dirty="0"/>
+              <a:t> under </a:t>
+            </a:r>
+            <a:r>
+              <a:rPr lang="en-US" sz="2400" b="1" dirty="0">
+                <a:solidFill>
+                  <a:srgbClr val="0000FF"/>
+                </a:solidFill>
+              </a:rPr>
+              <a:t>.NET Framework 4.6.2</a:t>
+            </a:r>
+            <a:r>
+              <a:rPr lang="en-US" sz="2400" dirty="0"/>
               <a:t>, and using the </a:t>
             </a:r>
             <a:r>
@@ -5164,26 +5130,8 @@
               <a:t>MVC</a:t>
             </a:r>
             <a:r>
-              <a:rPr lang="en-US" sz="2400" dirty="0" smtClean="0"/>
+              <a:rPr lang="en-US" sz="2400" dirty="0"/>
               <a:t> template with </a:t>
-            </a:r>
-            <a:r>
-              <a:rPr lang="en-US" sz="2400" b="1" dirty="0" smtClean="0">
-                <a:solidFill>
-                  <a:srgbClr val="0000FF"/>
-                </a:solidFill>
-              </a:rPr>
-              <a:t>No Authentication</a:t>
-            </a:r>
-            <a:r>
-              <a:rPr lang="en-US" sz="2400" dirty="0" smtClean="0"/>
-              <a:t>.</a:t>
-            </a:r>
-          </a:p>
-          <a:p>
-            <a:r>
-              <a:rPr lang="en-US" sz="2400" dirty="0" smtClean="0"/>
-              <a:t>I chose to use </a:t>
             </a:r>
             <a:r>
               <a:rPr lang="en-US" sz="2400" b="1" dirty="0">
@@ -5194,32 +5142,50 @@
               <a:t>No Authentication</a:t>
             </a:r>
             <a:r>
-              <a:rPr lang="en-US" sz="2400" dirty="0" smtClean="0"/>
+              <a:rPr lang="en-US" sz="2400" dirty="0"/>
+              <a:t>.</a:t>
+            </a:r>
+          </a:p>
+          <a:p>
+            <a:r>
+              <a:rPr lang="en-US" sz="2400" dirty="0"/>
+              <a:t>I chose to use </a:t>
+            </a:r>
+            <a:r>
+              <a:rPr lang="en-US" sz="2400" b="1" dirty="0">
+                <a:solidFill>
+                  <a:srgbClr val="0000FF"/>
+                </a:solidFill>
+              </a:rPr>
+              <a:t>No Authentication</a:t>
+            </a:r>
+            <a:r>
+              <a:rPr lang="en-US" sz="2400" dirty="0"/>
               <a:t> because the templates including authentication are coupled with EF, including some implementations sitting in the </a:t>
             </a:r>
             <a:r>
-              <a:rPr lang="en-US" sz="2400" dirty="0" err="1" smtClean="0"/>
-              <a:t>AspNet.Identity.EntityFramework</a:t>
-            </a:r>
-            <a:r>
-              <a:rPr lang="en-US" sz="2400" dirty="0" smtClean="0"/>
+              <a:rPr lang="en-US" sz="2400" dirty="0" err="1"/>
+              <a:t>Microsoft.AspNetCore.Identity.EntityFrameworkCore</a:t>
+            </a:r>
+            <a:r>
+              <a:rPr lang="en-US" sz="2400" dirty="0"/>
               <a:t> namespace. This muddies the waters and makes it difficult to see the separation between Identity and the data layer.</a:t>
             </a:r>
           </a:p>
           <a:p>
             <a:r>
-              <a:rPr lang="en-US" sz="2400" dirty="0" smtClean="0"/>
+              <a:rPr lang="en-US" sz="2400" dirty="0"/>
               <a:t>Let’s code!</a:t>
             </a:r>
           </a:p>
           <a:p>
-            <a:endParaRPr lang="en-US" sz="2400" dirty="0" smtClean="0"/>
+            <a:endParaRPr lang="en-US" sz="2400" dirty="0"/>
           </a:p>
           <a:p>
             <a:pPr marL="0" indent="0">
               <a:buNone/>
             </a:pPr>
-            <a:endParaRPr lang="en-US" sz="2400" dirty="0" smtClean="0"/>
+            <a:endParaRPr lang="en-US" sz="2400" dirty="0"/>
           </a:p>
           <a:p>
             <a:endParaRPr lang="en-US" sz="2400" dirty="0"/>
@@ -5236,13 +5202,6 @@
   <p:clrMapOvr>
     <a:masterClrMapping/>
   </p:clrMapOvr>
-  <p:timing>
-    <p:tnLst>
-      <p:par>
-        <p:cTn id="1" dur="indefinite" restart="never" nodeType="tmRoot"/>
-      </p:par>
-    </p:tnLst>
-  </p:timing>
 </p:sld>
 </file>
 
@@ -5311,18 +5270,13 @@
           <a:p>
             <a:pPr algn="ctr"/>
             <a:r>
-              <a:rPr lang="en-US" sz="4000" b="1" dirty="0" smtClean="0">
+              <a:rPr lang="en-US" sz="4000" b="1" dirty="0">
                 <a:solidFill>
                   <a:srgbClr val="4D4339"/>
                 </a:solidFill>
               </a:rPr>
               <a:t>Managers</a:t>
             </a:r>
-            <a:endParaRPr lang="en-US" sz="4000" b="1" dirty="0">
-              <a:solidFill>
-                <a:srgbClr val="4D4339"/>
-              </a:solidFill>
-            </a:endParaRPr>
           </a:p>
         </p:txBody>
       </p:sp>
@@ -5373,7 +5327,7 @@
           <a:p>
             <a:pPr algn="ctr"/>
             <a:r>
-              <a:rPr lang="en-US" sz="2800" b="1" dirty="0" err="1" smtClean="0">
+              <a:rPr lang="en-US" sz="2800" b="1" dirty="0" err="1">
                 <a:solidFill>
                   <a:schemeClr val="tx1"/>
                 </a:solidFill>
@@ -5436,7 +5390,7 @@
           <a:p>
             <a:pPr algn="ctr"/>
             <a:r>
-              <a:rPr lang="en-US" sz="2800" b="1" dirty="0" err="1" smtClean="0">
+              <a:rPr lang="en-US" sz="2800" b="1" dirty="0" err="1">
                 <a:solidFill>
                   <a:schemeClr val="tx1"/>
                 </a:solidFill>
@@ -5499,7 +5453,7 @@
           <a:p>
             <a:pPr algn="ctr"/>
             <a:r>
-              <a:rPr lang="en-US" sz="2800" b="1" dirty="0" err="1" smtClean="0">
+              <a:rPr lang="en-US" sz="2800" b="1" dirty="0" err="1">
                 <a:solidFill>
                   <a:schemeClr val="tx1"/>
                 </a:solidFill>
@@ -5677,18 +5631,13 @@
           <a:p>
             <a:pPr algn="ctr"/>
             <a:r>
-              <a:rPr lang="en-US" sz="4000" b="1" dirty="0" smtClean="0">
+              <a:rPr lang="en-US" sz="4000" b="1" dirty="0">
                 <a:solidFill>
                   <a:srgbClr val="4D4339"/>
                 </a:solidFill>
               </a:rPr>
               <a:t>Stores</a:t>
             </a:r>
-            <a:endParaRPr lang="en-US" sz="4000" b="1" dirty="0">
-              <a:solidFill>
-                <a:srgbClr val="4D4339"/>
-              </a:solidFill>
-            </a:endParaRPr>
           </a:p>
         </p:txBody>
       </p:sp>
@@ -5763,7 +5712,7 @@
           <a:p>
             <a:pPr algn="ctr"/>
             <a:r>
-              <a:rPr lang="en-US" sz="2000" b="1" dirty="0" err="1" smtClean="0">
+              <a:rPr lang="en-US" sz="2000" b="1" dirty="0" err="1">
                 <a:solidFill>
                   <a:schemeClr val="tx1"/>
                 </a:solidFill>
@@ -5826,7 +5775,7 @@
           <a:p>
             <a:pPr algn="ctr"/>
             <a:r>
-              <a:rPr lang="en-US" sz="2000" b="1" dirty="0" err="1" smtClean="0">
+              <a:rPr lang="en-US" sz="2000" b="1" dirty="0" err="1">
                 <a:solidFill>
                   <a:schemeClr val="tx1"/>
                 </a:solidFill>
@@ -5889,7 +5838,7 @@
           <a:p>
             <a:pPr algn="ctr"/>
             <a:r>
-              <a:rPr lang="en-US" sz="2000" b="1" dirty="0" err="1" smtClean="0">
+              <a:rPr lang="en-US" sz="2000" b="1" dirty="0" err="1">
                 <a:solidFill>
                   <a:schemeClr val="tx1"/>
                 </a:solidFill>
@@ -5952,7 +5901,7 @@
           <a:p>
             <a:pPr algn="ctr"/>
             <a:r>
-              <a:rPr lang="en-US" sz="2000" b="1" dirty="0" err="1" smtClean="0">
+              <a:rPr lang="en-US" sz="2000" b="1" dirty="0" err="1">
                 <a:solidFill>
                   <a:schemeClr val="tx1"/>
                 </a:solidFill>
@@ -6015,7 +5964,7 @@
           <a:p>
             <a:pPr algn="ctr"/>
             <a:r>
-              <a:rPr lang="en-US" sz="2000" b="1" dirty="0" err="1" smtClean="0">
+              <a:rPr lang="en-US" sz="2000" b="1" dirty="0" err="1">
                 <a:solidFill>
                   <a:schemeClr val="tx1"/>
                 </a:solidFill>
@@ -6078,7 +6027,7 @@
           <a:p>
             <a:pPr algn="ctr"/>
             <a:r>
-              <a:rPr lang="en-US" sz="2000" b="1" dirty="0" err="1" smtClean="0">
+              <a:rPr lang="en-US" sz="2000" b="1" dirty="0" err="1">
                 <a:solidFill>
                   <a:schemeClr val="tx1"/>
                 </a:solidFill>
@@ -6183,13 +6132,6 @@
   <p:clrMapOvr>
     <a:masterClrMapping/>
   </p:clrMapOvr>
-  <p:timing>
-    <p:tnLst>
-      <p:par>
-        <p:cTn id="1" dur="indefinite" restart="never" nodeType="tmRoot"/>
-      </p:par>
-    </p:tnLst>
-  </p:timing>
 </p:sld>
 </file>
 
@@ -6234,10 +6176,9 @@
           <a:p>
             <a:pPr algn="ctr"/>
             <a:r>
-              <a:rPr lang="en-US" sz="7200" dirty="0" smtClean="0"/>
+              <a:rPr lang="en-US" sz="7200" dirty="0"/>
               <a:t>Thanks!</a:t>
             </a:r>
-            <a:endParaRPr lang="en-US" sz="7200" dirty="0"/>
           </a:p>
         </p:txBody>
       </p:sp>
@@ -6264,10 +6205,10 @@
           <a:lstStyle/>
           <a:p>
             <a:r>
-              <a:rPr lang="en-US" sz="4800" dirty="0" smtClean="0"/>
+              <a:rPr lang="en-US" sz="4800" dirty="0"/>
               <a:t>Ondrej balas</a:t>
             </a:r>
-            <a:endParaRPr lang="en-US" sz="3500" dirty="0" smtClean="0"/>
+            <a:endParaRPr lang="en-US" sz="3500" dirty="0"/>
           </a:p>
         </p:txBody>
       </p:sp>
@@ -6538,7 +6479,7 @@
           <a:p>
             <a:pPr algn="r"/>
             <a:r>
-              <a:rPr lang="en-US" dirty="0" smtClean="0"/>
+              <a:rPr lang="en-US" dirty="0"/>
               <a:t>www.ondrejbalas.com </a:t>
             </a:r>
             <a:r>
@@ -6547,15 +6488,11 @@
               </a:rPr>
               <a:t></a:t>
             </a:r>
-            <a:r>
-              <a:rPr lang="en-US" dirty="0"/>
-              <a:t/>
-            </a:r>
             <a:br>
               <a:rPr lang="en-US" dirty="0"/>
             </a:br>
             <a:r>
-              <a:rPr lang="en-US" dirty="0" smtClean="0"/>
+              <a:rPr lang="en-US" dirty="0"/>
               <a:t>Ondrej@ondrejbalas.com</a:t>
             </a:r>
             <a:r>
@@ -6564,7 +6501,7 @@
               </a:rPr>
               <a:t> </a:t>
             </a:r>
-            <a:endParaRPr lang="en-US" dirty="0" smtClean="0"/>
+            <a:endParaRPr lang="en-US" dirty="0"/>
           </a:p>
         </p:txBody>
       </p:sp>
@@ -6834,34 +6771,33 @@
           </a:lstStyle>
           <a:p>
             <a:r>
-              <a:rPr lang="en-US" sz="4400" b="1" dirty="0" smtClean="0">
+              <a:rPr lang="en-US" sz="4400" b="1" dirty="0">
                 <a:latin typeface="FontAwesome" pitchFamily="2" charset="0"/>
               </a:rPr>
               <a:t> </a:t>
             </a:r>
             <a:r>
-              <a:rPr lang="en-US" sz="4400" b="1" dirty="0" smtClean="0"/>
+              <a:rPr lang="en-US" sz="4400" b="1" dirty="0"/>
               <a:t>@ondrejbalas</a:t>
             </a:r>
             <a:br>
-              <a:rPr lang="en-US" sz="4400" b="1" dirty="0" smtClean="0"/>
+              <a:rPr lang="en-US" sz="4400" b="1" dirty="0"/>
             </a:br>
-            <a:endParaRPr lang="en-US" sz="1800" b="1" dirty="0" smtClean="0">
+            <a:endParaRPr lang="en-US" sz="1800" b="1" dirty="0">
               <a:latin typeface="FontAwesome" pitchFamily="2" charset="0"/>
             </a:endParaRPr>
           </a:p>
           <a:p>
             <a:r>
-              <a:rPr lang="en-US" sz="4400" b="1" dirty="0" smtClean="0">
+              <a:rPr lang="en-US" sz="4400" b="1" dirty="0">
                 <a:latin typeface="FontAwesome" pitchFamily="2" charset="0"/>
               </a:rPr>
               <a:t> </a:t>
             </a:r>
             <a:r>
-              <a:rPr lang="en-US" sz="4400" b="1" dirty="0" smtClean="0"/>
+              <a:rPr lang="en-US" sz="4400" b="1" dirty="0"/>
               <a:t>github.com/ondrejbalas</a:t>
             </a:r>
-            <a:endParaRPr lang="en-US" sz="4400" b="1" dirty="0"/>
           </a:p>
         </p:txBody>
       </p:sp>
@@ -6887,13 +6823,6 @@
       </p:transition>
     </mc:Fallback>
   </mc:AlternateContent>
-  <p:timing>
-    <p:tnLst>
-      <p:par>
-        <p:cTn id="1" dur="indefinite" restart="never" nodeType="tmRoot"/>
-      </p:par>
-    </p:tnLst>
-  </p:timing>
 </p:sld>
 </file>
 
@@ -6937,10 +6866,10 @@
           <a:lstStyle/>
           <a:p>
             <a:r>
-              <a:rPr lang="en-US" sz="8000" dirty="0" smtClean="0"/>
+              <a:rPr lang="en-US" sz="8000" dirty="0"/>
               <a:t>Ondrej  balas</a:t>
             </a:r>
-            <a:endParaRPr lang="en-US" sz="5400" dirty="0" smtClean="0"/>
+            <a:endParaRPr lang="en-US" sz="5400" dirty="0"/>
           </a:p>
         </p:txBody>
       </p:sp>
@@ -7333,105 +7262,68 @@
           </a:lstStyle>
           <a:p>
             <a:r>
-              <a:rPr lang="en-US" cap="none" dirty="0" smtClean="0">
+              <a:rPr lang="en-US" cap="none" dirty="0">
                 <a:latin typeface="FontAwesome" pitchFamily="50" charset="0"/>
               </a:rPr>
               <a:t></a:t>
             </a:r>
             <a:r>
-              <a:rPr lang="en-US" cap="none" dirty="0" smtClean="0"/>
+              <a:rPr lang="en-US" cap="none" dirty="0"/>
               <a:t> </a:t>
             </a:r>
             <a:r>
-              <a:rPr lang="en-US" b="1" cap="none" dirty="0" smtClean="0"/>
-              <a:t>Microsoft MVP in C#</a:t>
-            </a:r>
-          </a:p>
-          <a:p>
-            <a:r>
-              <a:rPr lang="en-US" cap="none" dirty="0" smtClean="0">
+              <a:rPr lang="en-US" b="1" cap="none" dirty="0"/>
+              <a:t>Microsoft MVP in Visual Studio</a:t>
+            </a:r>
+          </a:p>
+          <a:p>
+            <a:r>
+              <a:rPr lang="en-US" cap="none" dirty="0">
                 <a:latin typeface="FontAwesome" pitchFamily="50" charset="0"/>
               </a:rPr>
               <a:t></a:t>
             </a:r>
             <a:r>
-              <a:rPr lang="en-US" cap="none" dirty="0" smtClean="0"/>
+              <a:rPr lang="en-US" cap="none" dirty="0"/>
               <a:t> </a:t>
             </a:r>
             <a:r>
-              <a:rPr lang="en-US" b="1" cap="none" dirty="0" smtClean="0"/>
+              <a:rPr lang="en-US" b="1" cap="none" dirty="0"/>
               <a:t>Writer for Visual Studio Magazine</a:t>
             </a:r>
           </a:p>
           <a:p>
             <a:r>
-              <a:rPr lang="en-US" dirty="0" smtClean="0">
+              <a:rPr lang="en-US" dirty="0">
                 <a:latin typeface="FontAwesome" pitchFamily="50" charset="0"/>
               </a:rPr>
               <a:t></a:t>
             </a:r>
             <a:r>
-              <a:rPr lang="en-US" cap="none" dirty="0" smtClean="0"/>
+              <a:rPr lang="en-US" cap="none" dirty="0"/>
               <a:t> </a:t>
             </a:r>
             <a:r>
-              <a:rPr lang="en-US" b="1" cap="none" dirty="0" smtClean="0"/>
-              <a:t>Owner of </a:t>
-            </a:r>
-            <a:r>
-              <a:rPr lang="en-US" b="1" cap="none" dirty="0" err="1" smtClean="0"/>
-              <a:t>UseTech</a:t>
-            </a:r>
-            <a:r>
-              <a:rPr lang="en-US" b="1" cap="none" dirty="0" smtClean="0"/>
-              <a:t> Design</a:t>
-            </a:r>
-          </a:p>
-          <a:p>
-            <a:r>
-              <a:rPr lang="en-US" dirty="0" smtClean="0">
+              <a:rPr lang="en-US" b="1" cap="none" dirty="0"/>
+              <a:t>Owner of UseTech Design</a:t>
+            </a:r>
+          </a:p>
+          <a:p>
+            <a:r>
+              <a:rPr lang="en-US" dirty="0">
                 <a:latin typeface="FontAwesome" pitchFamily="50" charset="0"/>
               </a:rPr>
               <a:t></a:t>
             </a:r>
             <a:r>
-              <a:rPr lang="en-US" dirty="0" smtClean="0"/>
+              <a:rPr lang="en-US" dirty="0"/>
               <a:t> </a:t>
             </a:r>
             <a:r>
-              <a:rPr lang="en-US" b="1" cap="none" dirty="0" smtClean="0"/>
+              <a:rPr lang="en-US" b="1" cap="none" dirty="0"/>
               <a:t>Building software that drives business</a:t>
             </a:r>
-          </a:p>
-          <a:p>
-            <a:r>
-              <a:rPr lang="en-US" dirty="0">
-                <a:solidFill>
-                  <a:srgbClr val="344068"/>
-                </a:solidFill>
-                <a:latin typeface="FontAwesome" pitchFamily="50" charset="0"/>
-              </a:rPr>
-              <a:t></a:t>
-            </a:r>
-            <a:r>
-              <a:rPr lang="en-US" dirty="0">
-                <a:solidFill>
-                  <a:srgbClr val="344068"/>
-                </a:solidFill>
-              </a:rPr>
-              <a:t> </a:t>
-            </a:r>
-            <a:r>
-              <a:rPr lang="en-US" b="1" cap="none" dirty="0">
-                <a:solidFill>
-                  <a:srgbClr val="344068"/>
-                </a:solidFill>
-              </a:rPr>
-              <a:t>Serial Entrepreneur</a:t>
-            </a:r>
-          </a:p>
-          <a:p>
-            <a:endParaRPr lang="en-US" sz="1800" b="1" dirty="0" smtClean="0"/>
+            <a:endParaRPr lang="en-US" sz="1800" b="1" dirty="0"/>
           </a:p>
         </p:txBody>
       </p:sp>
@@ -7706,19 +7598,19 @@
               </a:lnSpc>
             </a:pPr>
             <a:r>
-              <a:rPr lang="en-US" sz="2000" dirty="0" smtClean="0">
+              <a:rPr lang="en-US" sz="2000" dirty="0">
                 <a:latin typeface="FontAwesome" pitchFamily="2" charset="0"/>
               </a:rPr>
               <a:t></a:t>
             </a:r>
             <a:r>
-              <a:rPr lang="en-US" dirty="0" smtClean="0">
+              <a:rPr lang="en-US" dirty="0">
                 <a:latin typeface="FontAwesome" pitchFamily="2" charset="0"/>
               </a:rPr>
               <a:t> </a:t>
             </a:r>
             <a:r>
-              <a:rPr lang="en-US" sz="1800" dirty="0" smtClean="0"/>
+              <a:rPr lang="en-US" sz="1800" dirty="0"/>
               <a:t>www.ondrejbalas.com</a:t>
             </a:r>
           </a:p>
@@ -7729,19 +7621,19 @@
               </a:lnSpc>
             </a:pPr>
             <a:r>
-              <a:rPr lang="en-US" sz="2000" dirty="0" smtClean="0">
+              <a:rPr lang="en-US" sz="2000" dirty="0">
                 <a:latin typeface="FontAwesome" pitchFamily="2" charset="0"/>
               </a:rPr>
               <a:t></a:t>
             </a:r>
             <a:r>
-              <a:rPr lang="en-US" dirty="0" smtClean="0">
+              <a:rPr lang="en-US" dirty="0">
                 <a:latin typeface="FontAwesome" pitchFamily="2" charset="0"/>
               </a:rPr>
               <a:t> </a:t>
             </a:r>
             <a:r>
-              <a:rPr lang="en-US" sz="1800" dirty="0" smtClean="0"/>
+              <a:rPr lang="en-US" sz="1800" dirty="0"/>
               <a:t>Ondrej@ondrejbalas.com</a:t>
             </a:r>
           </a:p>
@@ -7768,7 +7660,7 @@
                 <a:spcPct val="50000"/>
               </a:lnSpc>
             </a:pPr>
-            <a:endParaRPr lang="en-US" sz="1800" dirty="0" smtClean="0"/>
+            <a:endParaRPr lang="en-US" sz="1800" dirty="0"/>
           </a:p>
         </p:txBody>
       </p:sp>
@@ -7782,13 +7674,6 @@
   <p:clrMapOvr>
     <a:masterClrMapping/>
   </p:clrMapOvr>
-  <p:timing>
-    <p:tnLst>
-      <p:par>
-        <p:cTn id="1" dur="indefinite" restart="never" nodeType="tmRoot"/>
-      </p:par>
-    </p:tnLst>
-  </p:timing>
 </p:sld>
 </file>
 
@@ -7826,10 +7711,9 @@
           <a:p>
             <a:pPr algn="ctr"/>
             <a:r>
-              <a:rPr lang="en-US" dirty="0" smtClean="0"/>
+              <a:rPr lang="en-US" dirty="0"/>
               <a:t>AspNet.Identity</a:t>
             </a:r>
-            <a:endParaRPr lang="en-US" dirty="0"/>
           </a:p>
         </p:txBody>
       </p:sp>
@@ -7860,15 +7744,11 @@
                 <a:spcPct val="150000"/>
               </a:lnSpc>
             </a:pPr>
-            <a:r>
-              <a:rPr lang="en-US" sz="200" dirty="0" smtClean="0"/>
-              <a:t/>
-            </a:r>
             <a:br>
-              <a:rPr lang="en-US" sz="200" dirty="0" smtClean="0"/>
+              <a:rPr lang="en-US" sz="200" dirty="0"/>
             </a:br>
             <a:r>
-              <a:rPr lang="en-US" sz="2400" dirty="0" smtClean="0"/>
+              <a:rPr lang="en-US" sz="2400" dirty="0"/>
               <a:t>Access Control (Authentication &amp; Authorization)</a:t>
             </a:r>
           </a:p>
@@ -7880,7 +7760,7 @@
             </a:pPr>
             <a:r>
               <a:rPr lang="en-US" sz="2400" dirty="0"/>
-              <a:t>First released as NuGet packages, compatible with .NET 4.5 and higher.</a:t>
+              <a:t>First released as NuGet packages, compatible with .NET 4.5 and higher</a:t>
             </a:r>
           </a:p>
           <a:p>
@@ -7891,23 +7771,7 @@
             </a:pPr>
             <a:r>
               <a:rPr lang="en-US" sz="2400" dirty="0"/>
-              <a:t>The MVC 5 “Individual Accounts” template in VS </a:t>
-            </a:r>
-            <a:r>
-              <a:rPr lang="en-US" sz="2400" dirty="0" smtClean="0"/>
-              <a:t>2013 </a:t>
-            </a:r>
-            <a:r>
-              <a:rPr lang="en-US" dirty="0" smtClean="0"/>
-              <a:t>(Update 4)</a:t>
-            </a:r>
-            <a:r>
-              <a:rPr lang="en-US" sz="2400" dirty="0" smtClean="0"/>
-              <a:t> </a:t>
-            </a:r>
-            <a:r>
-              <a:rPr lang="en-US" sz="2400" dirty="0"/>
-              <a:t>gets you Identity 2.</a:t>
+              <a:t>The MVC 5 “Individual Accounts” templates use Identity 2</a:t>
             </a:r>
           </a:p>
           <a:p>
@@ -7918,7 +7782,7 @@
             </a:pPr>
             <a:r>
               <a:rPr lang="en-US" sz="2400" dirty="0"/>
-              <a:t>Built as OWIN-compatible Middleware</a:t>
+              <a:t>MVC 6 templates use Identity 3</a:t>
             </a:r>
           </a:p>
         </p:txBody>
@@ -8196,8 +8060,8 @@
           <a:p>
             <a:pPr algn="ctr"/>
             <a:r>
-              <a:rPr lang="en-US" dirty="0" smtClean="0"/>
-              <a:t>ASP.NET Membership (2005)</a:t>
+              <a:rPr lang="en-US" dirty="0" err="1"/>
+              <a:t>AspNetCore.Identity</a:t>
             </a:r>
             <a:endParaRPr lang="en-US" dirty="0"/>
           </a:p>
@@ -8215,8 +8079,8 @@
         </p:nvSpPr>
         <p:spPr>
           <a:xfrm>
-            <a:off x="628073" y="1845734"/>
-            <a:ext cx="11175999" cy="4023360"/>
+            <a:off x="752474" y="1845734"/>
+            <a:ext cx="10810875" cy="4023360"/>
           </a:xfrm>
         </p:spPr>
         <p:txBody>
@@ -8230,16 +8094,12 @@
                 <a:spcPct val="150000"/>
               </a:lnSpc>
             </a:pPr>
-            <a:r>
-              <a:rPr lang="en-US" sz="200" dirty="0" smtClean="0"/>
-              <a:t/>
-            </a:r>
             <a:br>
-              <a:rPr lang="en-US" sz="200" dirty="0" smtClean="0"/>
+              <a:rPr lang="en-US" sz="200" dirty="0"/>
             </a:br>
             <a:r>
-              <a:rPr lang="en-US" sz="2400" dirty="0" smtClean="0"/>
-              <a:t>Tightly coupled to SQL Server (with a specific schema). </a:t>
+              <a:rPr lang="en-US" sz="2400" dirty="0"/>
+              <a:t>Access Control (Authentication &amp; Authorization)</a:t>
             </a:r>
           </a:p>
           <a:p>
@@ -8249,8 +8109,8 @@
               </a:lnSpc>
             </a:pPr>
             <a:r>
-              <a:rPr lang="en-US" sz="2400" dirty="0" smtClean="0"/>
-              <a:t>Even other relational databases like MySQL required a complicated custom provider</a:t>
+              <a:rPr lang="en-US" sz="2400" dirty="0"/>
+              <a:t>First released as NuGet packages, compatible with .NET 4.5 and higher</a:t>
             </a:r>
           </a:p>
           <a:p>
@@ -8260,28 +8120,52 @@
               </a:lnSpc>
             </a:pPr>
             <a:r>
-              <a:rPr lang="en-US" sz="2400" dirty="0" smtClean="0"/>
-              <a:t>Roles and passwords are required. (OAuth &amp; claims-based become difficult or impossible)</a:t>
-            </a:r>
-          </a:p>
-          <a:p>
-            <a:pPr algn="ctr">
+              <a:rPr lang="en-US" sz="2400" dirty="0"/>
+              <a:t>The MVC 5 “Individual Accounts” templates use Identity 2</a:t>
+            </a:r>
+          </a:p>
+          <a:p>
+            <a:pPr marL="0" indent="0" algn="ctr">
               <a:lnSpc>
                 <a:spcPct val="150000"/>
               </a:lnSpc>
+              <a:buNone/>
             </a:pPr>
             <a:r>
-              <a:rPr lang="en-US" sz="2400" dirty="0" smtClean="0"/>
-              <a:t>Custom user profile fields were a PAIN!</a:t>
-            </a:r>
-            <a:endParaRPr lang="en-US" sz="2400" dirty="0"/>
+              <a:rPr lang="en-US" sz="2400" strike="sngStrike" dirty="0"/>
+              <a:t>MVC 6</a:t>
+            </a:r>
+            <a:r>
+              <a:rPr lang="en-US" sz="2400" dirty="0"/>
+              <a:t> </a:t>
+            </a:r>
+            <a:r>
+              <a:rPr lang="en-US" sz="2400" b="1" dirty="0"/>
+              <a:t>ASP.NET Core MVC 1.0</a:t>
+            </a:r>
+            <a:r>
+              <a:rPr lang="en-US" sz="2400" dirty="0"/>
+              <a:t> templates use </a:t>
+            </a:r>
+            <a:r>
+              <a:rPr lang="en-US" sz="2400" strike="sngStrike" dirty="0"/>
+              <a:t>Identity 3</a:t>
+            </a:r>
+            <a:r>
+              <a:rPr lang="en-US" sz="2400" dirty="0"/>
+              <a:t> </a:t>
+            </a:r>
+            <a:r>
+              <a:rPr lang="en-US" sz="2400" b="1" dirty="0"/>
+              <a:t>ASP.NET Core Identity 1.0</a:t>
+            </a:r>
           </a:p>
         </p:txBody>
       </p:sp>
     </p:spTree>
     <p:extLst>
       <p:ext uri="{BB962C8B-B14F-4D97-AF65-F5344CB8AC3E}">
-        <p14:creationId xmlns:p14="http://schemas.microsoft.com/office/powerpoint/2010/main" val="2326878691"/>
+        <p14:creationId xmlns:p14="http://schemas.microsoft.com/office/powerpoint/2010/main" val="3811974222"/>
       </p:ext>
     </p:extLst>
   </p:cSld>
@@ -8551,10 +8435,9 @@
           <a:p>
             <a:pPr algn="ctr"/>
             <a:r>
-              <a:rPr lang="en-US" dirty="0" smtClean="0"/>
-              <a:t>Simple Membership (2012)</a:t>
-            </a:r>
-            <a:endParaRPr lang="en-US" dirty="0"/>
+              <a:rPr lang="en-US" dirty="0"/>
+              <a:t>ASP.NET Membership (2005)</a:t>
+            </a:r>
           </a:p>
         </p:txBody>
       </p:sp>
@@ -8570,8 +8453,8 @@
         </p:nvSpPr>
         <p:spPr>
           <a:xfrm>
-            <a:off x="752474" y="1744135"/>
-            <a:ext cx="10810875" cy="4592009"/>
+            <a:off x="628073" y="1845734"/>
+            <a:ext cx="11175999" cy="4023360"/>
           </a:xfrm>
         </p:spPr>
         <p:txBody>
@@ -8585,16 +8468,12 @@
                 <a:spcPct val="150000"/>
               </a:lnSpc>
             </a:pPr>
-            <a:r>
-              <a:rPr lang="en-US" sz="200" dirty="0" smtClean="0"/>
-              <a:t/>
-            </a:r>
             <a:br>
-              <a:rPr lang="en-US" sz="200" dirty="0" smtClean="0"/>
+              <a:rPr lang="en-US" sz="200" dirty="0"/>
             </a:br>
             <a:r>
-              <a:rPr lang="en-US" sz="2400" dirty="0" smtClean="0"/>
-              <a:t>Supports a custom database schema</a:t>
+              <a:rPr lang="en-US" sz="2400" dirty="0"/>
+              <a:t>Tightly coupled to SQL Server (with a specific schema)</a:t>
             </a:r>
           </a:p>
           <a:p>
@@ -8604,8 +8483,8 @@
               </a:lnSpc>
             </a:pPr>
             <a:r>
-              <a:rPr lang="en-US" sz="2400" dirty="0" smtClean="0"/>
-              <a:t>You can choose the ID and username columns</a:t>
+              <a:rPr lang="en-US" sz="2400" dirty="0"/>
+              <a:t>Even other relational databases like MySQL required a complicated custom provider</a:t>
             </a:r>
           </a:p>
           <a:p>
@@ -8615,16 +8494,8 @@
               </a:lnSpc>
             </a:pPr>
             <a:r>
-              <a:rPr lang="en-US" sz="2400" dirty="0" smtClean="0"/>
-              <a:t>There are extensions making OAuth and </a:t>
-            </a:r>
-            <a:r>
-              <a:rPr lang="en-US" sz="2400" dirty="0" err="1" smtClean="0"/>
-              <a:t>OpenID</a:t>
-            </a:r>
-            <a:r>
-              <a:rPr lang="en-US" sz="2400" dirty="0" smtClean="0"/>
-              <a:t> support possible</a:t>
+              <a:rPr lang="en-US" sz="2400" dirty="0"/>
+              <a:t>Roles and passwords are required. (OAuth &amp; claims-based become difficult or impossible)</a:t>
             </a:r>
           </a:p>
           <a:p>
@@ -8635,19 +8506,323 @@
             </a:pPr>
             <a:r>
               <a:rPr lang="en-US" sz="2400" dirty="0"/>
-              <a:t>Supports account reset token by default</a:t>
-            </a:r>
-            <a:endParaRPr lang="en-US" sz="2400" dirty="0" smtClean="0"/>
-          </a:p>
+              <a:t>Custom user profile fields were a PAIN!</a:t>
+            </a:r>
+          </a:p>
+        </p:txBody>
+      </p:sp>
+    </p:spTree>
+    <p:extLst>
+      <p:ext uri="{BB962C8B-B14F-4D97-AF65-F5344CB8AC3E}">
+        <p14:creationId xmlns:p14="http://schemas.microsoft.com/office/powerpoint/2010/main" val="2326878691"/>
+      </p:ext>
+    </p:extLst>
+  </p:cSld>
+  <p:clrMapOvr>
+    <a:masterClrMapping/>
+  </p:clrMapOvr>
+  <p:timing>
+    <p:tnLst>
+      <p:par>
+        <p:cTn id="1" dur="indefinite" restart="never" nodeType="tmRoot">
+          <p:childTnLst>
+            <p:seq concurrent="1" nextAc="seek">
+              <p:cTn id="2" dur="indefinite" nodeType="mainSeq">
+                <p:childTnLst>
+                  <p:par>
+                    <p:cTn id="3" fill="hold">
+                      <p:stCondLst>
+                        <p:cond delay="indefinite"/>
+                      </p:stCondLst>
+                      <p:childTnLst>
+                        <p:par>
+                          <p:cTn id="4" fill="hold">
+                            <p:stCondLst>
+                              <p:cond delay="0"/>
+                            </p:stCondLst>
+                            <p:childTnLst>
+                              <p:par>
+                                <p:cTn id="5" presetID="1" presetClass="entr" presetSubtype="0" fill="hold" nodeType="clickEffect">
+                                  <p:stCondLst>
+                                    <p:cond delay="0"/>
+                                  </p:stCondLst>
+                                  <p:childTnLst>
+                                    <p:set>
+                                      <p:cBhvr>
+                                        <p:cTn id="6" dur="1" fill="hold">
+                                          <p:stCondLst>
+                                            <p:cond delay="0"/>
+                                          </p:stCondLst>
+                                        </p:cTn>
+                                        <p:tgtEl>
+                                          <p:spTgt spid="3">
+                                            <p:txEl>
+                                              <p:pRg st="0" end="0"/>
+                                            </p:txEl>
+                                          </p:spTgt>
+                                        </p:tgtEl>
+                                        <p:attrNameLst>
+                                          <p:attrName>style.visibility</p:attrName>
+                                        </p:attrNameLst>
+                                      </p:cBhvr>
+                                      <p:to>
+                                        <p:strVal val="visible"/>
+                                      </p:to>
+                                    </p:set>
+                                  </p:childTnLst>
+                                </p:cTn>
+                              </p:par>
+                            </p:childTnLst>
+                          </p:cTn>
+                        </p:par>
+                      </p:childTnLst>
+                    </p:cTn>
+                  </p:par>
+                  <p:par>
+                    <p:cTn id="7" fill="hold">
+                      <p:stCondLst>
+                        <p:cond delay="indefinite"/>
+                      </p:stCondLst>
+                      <p:childTnLst>
+                        <p:par>
+                          <p:cTn id="8" fill="hold">
+                            <p:stCondLst>
+                              <p:cond delay="0"/>
+                            </p:stCondLst>
+                            <p:childTnLst>
+                              <p:par>
+                                <p:cTn id="9" presetID="1" presetClass="entr" presetSubtype="0" fill="hold" nodeType="clickEffect">
+                                  <p:stCondLst>
+                                    <p:cond delay="0"/>
+                                  </p:stCondLst>
+                                  <p:childTnLst>
+                                    <p:set>
+                                      <p:cBhvr>
+                                        <p:cTn id="10" dur="1" fill="hold">
+                                          <p:stCondLst>
+                                            <p:cond delay="0"/>
+                                          </p:stCondLst>
+                                        </p:cTn>
+                                        <p:tgtEl>
+                                          <p:spTgt spid="3">
+                                            <p:txEl>
+                                              <p:pRg st="1" end="1"/>
+                                            </p:txEl>
+                                          </p:spTgt>
+                                        </p:tgtEl>
+                                        <p:attrNameLst>
+                                          <p:attrName>style.visibility</p:attrName>
+                                        </p:attrNameLst>
+                                      </p:cBhvr>
+                                      <p:to>
+                                        <p:strVal val="visible"/>
+                                      </p:to>
+                                    </p:set>
+                                  </p:childTnLst>
+                                </p:cTn>
+                              </p:par>
+                            </p:childTnLst>
+                          </p:cTn>
+                        </p:par>
+                      </p:childTnLst>
+                    </p:cTn>
+                  </p:par>
+                  <p:par>
+                    <p:cTn id="11" fill="hold">
+                      <p:stCondLst>
+                        <p:cond delay="indefinite"/>
+                      </p:stCondLst>
+                      <p:childTnLst>
+                        <p:par>
+                          <p:cTn id="12" fill="hold">
+                            <p:stCondLst>
+                              <p:cond delay="0"/>
+                            </p:stCondLst>
+                            <p:childTnLst>
+                              <p:par>
+                                <p:cTn id="13" presetID="1" presetClass="entr" presetSubtype="0" fill="hold" nodeType="clickEffect">
+                                  <p:stCondLst>
+                                    <p:cond delay="0"/>
+                                  </p:stCondLst>
+                                  <p:childTnLst>
+                                    <p:set>
+                                      <p:cBhvr>
+                                        <p:cTn id="14" dur="1" fill="hold">
+                                          <p:stCondLst>
+                                            <p:cond delay="0"/>
+                                          </p:stCondLst>
+                                        </p:cTn>
+                                        <p:tgtEl>
+                                          <p:spTgt spid="3">
+                                            <p:txEl>
+                                              <p:pRg st="2" end="2"/>
+                                            </p:txEl>
+                                          </p:spTgt>
+                                        </p:tgtEl>
+                                        <p:attrNameLst>
+                                          <p:attrName>style.visibility</p:attrName>
+                                        </p:attrNameLst>
+                                      </p:cBhvr>
+                                      <p:to>
+                                        <p:strVal val="visible"/>
+                                      </p:to>
+                                    </p:set>
+                                  </p:childTnLst>
+                                </p:cTn>
+                              </p:par>
+                            </p:childTnLst>
+                          </p:cTn>
+                        </p:par>
+                      </p:childTnLst>
+                    </p:cTn>
+                  </p:par>
+                  <p:par>
+                    <p:cTn id="15" fill="hold">
+                      <p:stCondLst>
+                        <p:cond delay="indefinite"/>
+                      </p:stCondLst>
+                      <p:childTnLst>
+                        <p:par>
+                          <p:cTn id="16" fill="hold">
+                            <p:stCondLst>
+                              <p:cond delay="0"/>
+                            </p:stCondLst>
+                            <p:childTnLst>
+                              <p:par>
+                                <p:cTn id="17" presetID="1" presetClass="entr" presetSubtype="0" fill="hold" nodeType="clickEffect">
+                                  <p:stCondLst>
+                                    <p:cond delay="0"/>
+                                  </p:stCondLst>
+                                  <p:childTnLst>
+                                    <p:set>
+                                      <p:cBhvr>
+                                        <p:cTn id="18" dur="1" fill="hold">
+                                          <p:stCondLst>
+                                            <p:cond delay="0"/>
+                                          </p:stCondLst>
+                                        </p:cTn>
+                                        <p:tgtEl>
+                                          <p:spTgt spid="3">
+                                            <p:txEl>
+                                              <p:pRg st="3" end="3"/>
+                                            </p:txEl>
+                                          </p:spTgt>
+                                        </p:tgtEl>
+                                        <p:attrNameLst>
+                                          <p:attrName>style.visibility</p:attrName>
+                                        </p:attrNameLst>
+                                      </p:cBhvr>
+                                      <p:to>
+                                        <p:strVal val="visible"/>
+                                      </p:to>
+                                    </p:set>
+                                  </p:childTnLst>
+                                </p:cTn>
+                              </p:par>
+                            </p:childTnLst>
+                          </p:cTn>
+                        </p:par>
+                      </p:childTnLst>
+                    </p:cTn>
+                  </p:par>
+                </p:childTnLst>
+              </p:cTn>
+              <p:prevCondLst>
+                <p:cond evt="onPrev" delay="0">
+                  <p:tgtEl>
+                    <p:sldTgt/>
+                  </p:tgtEl>
+                </p:cond>
+              </p:prevCondLst>
+              <p:nextCondLst>
+                <p:cond evt="onNext" delay="0">
+                  <p:tgtEl>
+                    <p:sldTgt/>
+                  </p:tgtEl>
+                </p:cond>
+              </p:nextCondLst>
+            </p:seq>
+          </p:childTnLst>
+        </p:cTn>
+      </p:par>
+    </p:tnLst>
+  </p:timing>
+</p:sld>
+</file>
+
+<file path=ppt/slides/slide6.xml><?xml version="1.0" encoding="utf-8"?>
+<p:sld xmlns:a="http://schemas.openxmlformats.org/drawingml/2006/main" xmlns:r="http://schemas.openxmlformats.org/officeDocument/2006/relationships" xmlns:p="http://schemas.openxmlformats.org/presentationml/2006/main">
+  <p:cSld>
+    <p:spTree>
+      <p:nvGrpSpPr>
+        <p:cNvPr id="1" name=""/>
+        <p:cNvGrpSpPr/>
+        <p:nvPr/>
+      </p:nvGrpSpPr>
+      <p:grpSpPr>
+        <a:xfrm>
+          <a:off x="0" y="0"/>
+          <a:ext cx="0" cy="0"/>
+          <a:chOff x="0" y="0"/>
+          <a:chExt cx="0" cy="0"/>
+        </a:xfrm>
+      </p:grpSpPr>
+      <p:sp>
+        <p:nvSpPr>
+          <p:cNvPr id="2" name="Title 1"/>
+          <p:cNvSpPr>
+            <a:spLocks noGrp="1"/>
+          </p:cNvSpPr>
+          <p:nvPr>
+            <p:ph type="title"/>
+          </p:nvPr>
+        </p:nvSpPr>
+        <p:spPr/>
+        <p:txBody>
+          <a:bodyPr/>
+          <a:lstStyle/>
+          <a:p>
+            <a:pPr algn="ctr"/>
+            <a:r>
+              <a:rPr lang="en-US" dirty="0"/>
+              <a:t>Simple Membership (2012)</a:t>
+            </a:r>
+          </a:p>
+        </p:txBody>
+      </p:sp>
+      <p:sp>
+        <p:nvSpPr>
+          <p:cNvPr id="3" name="Content Placeholder 2"/>
+          <p:cNvSpPr>
+            <a:spLocks noGrp="1"/>
+          </p:cNvSpPr>
+          <p:nvPr>
+            <p:ph idx="1"/>
+          </p:nvPr>
+        </p:nvSpPr>
+        <p:spPr>
+          <a:xfrm>
+            <a:off x="752474" y="1744135"/>
+            <a:ext cx="10810875" cy="4592009"/>
+          </a:xfrm>
+        </p:spPr>
+        <p:txBody>
+          <a:bodyPr>
+            <a:noAutofit/>
+          </a:bodyPr>
+          <a:lstStyle/>
           <a:p>
             <a:pPr algn="ctr">
               <a:lnSpc>
                 <a:spcPct val="150000"/>
               </a:lnSpc>
             </a:pPr>
-            <a:r>
-              <a:rPr lang="en-US" sz="2400" dirty="0" smtClean="0"/>
-              <a:t>Built on top of ASP.NET Membership so there is still a tight coupling to SQL Server</a:t>
+            <a:br>
+              <a:rPr lang="en-US" sz="200" dirty="0"/>
+            </a:br>
+            <a:r>
+              <a:rPr lang="en-US" sz="2400" dirty="0"/>
+              <a:t>Supports a custom database schema</a:t>
             </a:r>
           </a:p>
           <a:p>
@@ -8657,10 +8832,61 @@
               </a:lnSpc>
             </a:pPr>
             <a:r>
-              <a:rPr lang="en-US" sz="2400" dirty="0" smtClean="0"/>
+              <a:rPr lang="en-US" sz="2400" dirty="0"/>
+              <a:t>You can choose the ID and username columns</a:t>
+            </a:r>
+          </a:p>
+          <a:p>
+            <a:pPr algn="ctr">
+              <a:lnSpc>
+                <a:spcPct val="150000"/>
+              </a:lnSpc>
+            </a:pPr>
+            <a:r>
+              <a:rPr lang="en-US" sz="2400" dirty="0"/>
+              <a:t>There are extensions making OAuth and </a:t>
+            </a:r>
+            <a:r>
+              <a:rPr lang="en-US" sz="2400" dirty="0" err="1"/>
+              <a:t>OpenID</a:t>
+            </a:r>
+            <a:r>
+              <a:rPr lang="en-US" sz="2400" dirty="0"/>
+              <a:t> support possible</a:t>
+            </a:r>
+          </a:p>
+          <a:p>
+            <a:pPr algn="ctr">
+              <a:lnSpc>
+                <a:spcPct val="150000"/>
+              </a:lnSpc>
+            </a:pPr>
+            <a:r>
+              <a:rPr lang="en-US" sz="2400" dirty="0"/>
+              <a:t>Supports account reset token by default</a:t>
+            </a:r>
+          </a:p>
+          <a:p>
+            <a:pPr algn="ctr">
+              <a:lnSpc>
+                <a:spcPct val="150000"/>
+              </a:lnSpc>
+            </a:pPr>
+            <a:r>
+              <a:rPr lang="en-US" sz="2400" dirty="0"/>
+              <a:t>Built on top of ASP.NET Membership so there is still a tight coupling to SQL Server</a:t>
+            </a:r>
+          </a:p>
+          <a:p>
+            <a:pPr algn="ctr">
+              <a:lnSpc>
+                <a:spcPct val="150000"/>
+              </a:lnSpc>
+            </a:pPr>
+            <a:r>
+              <a:rPr lang="en-US" sz="2400" dirty="0"/>
               <a:t>Making changes to persistence means rewriting things like password hashing too</a:t>
             </a:r>
-            <a:endParaRPr lang="en-US" sz="2400" dirty="0"/>
           </a:p>
         </p:txBody>
       </p:sp>
@@ -9001,7 +9227,7 @@
 </p:sld>
 </file>
 
-<file path=ppt/slides/slide6.xml><?xml version="1.0" encoding="utf-8"?>
+<file path=ppt/slides/slide7.xml><?xml version="1.0" encoding="utf-8"?>
 <p:sld xmlns:a="http://schemas.openxmlformats.org/drawingml/2006/main" xmlns:r="http://schemas.openxmlformats.org/officeDocument/2006/relationships" xmlns:p="http://schemas.openxmlformats.org/presentationml/2006/main">
   <p:cSld>
     <p:spTree>
@@ -9035,10 +9261,9 @@
           <a:p>
             <a:pPr algn="ctr"/>
             <a:r>
-              <a:rPr lang="en-US" dirty="0" smtClean="0"/>
+              <a:rPr lang="en-US" dirty="0"/>
               <a:t>AspNet.Identity</a:t>
             </a:r>
-            <a:endParaRPr lang="en-US" dirty="0"/>
           </a:p>
         </p:txBody>
       </p:sp>
@@ -9070,20 +9295,8 @@
               </a:lnSpc>
             </a:pPr>
             <a:r>
-              <a:rPr lang="en-US" sz="2400" dirty="0" smtClean="0"/>
-              <a:t>OAuth, </a:t>
-            </a:r>
-            <a:r>
-              <a:rPr lang="en-US" sz="2400" dirty="0" err="1" smtClean="0"/>
-              <a:t>OpenID</a:t>
-            </a:r>
-            <a:r>
               <a:rPr lang="en-US" sz="2400" dirty="0"/>
-              <a:t> </a:t>
-            </a:r>
-            <a:r>
-              <a:rPr lang="en-US" sz="2400" dirty="0" smtClean="0"/>
-              <a:t>(Facebook, Google, Microsoft Live, LinkedIn, etc..)</a:t>
+              <a:t>OAuth &amp; OpenID (Facebook, Google, Microsoft Live, LinkedIn, etc..)</a:t>
             </a:r>
           </a:p>
           <a:p>
@@ -9093,10 +9306,9 @@
               </a:lnSpc>
             </a:pPr>
             <a:r>
-              <a:rPr lang="en-US" sz="2400" dirty="0" smtClean="0"/>
+              <a:rPr lang="en-US" sz="2400" dirty="0"/>
               <a:t>Custom Data Stores (even NoSQL!) are easy to implement </a:t>
             </a:r>
-            <a:endParaRPr lang="en-US" sz="2400" dirty="0"/>
           </a:p>
           <a:p>
             <a:pPr algn="ctr">
@@ -9105,7 +9317,7 @@
               </a:lnSpc>
             </a:pPr>
             <a:r>
-              <a:rPr lang="en-US" sz="2400" dirty="0" smtClean="0"/>
+              <a:rPr lang="en-US" sz="2400" dirty="0"/>
               <a:t>Roles, Claims, or Both</a:t>
             </a:r>
           </a:p>
@@ -9116,7 +9328,7 @@
               </a:lnSpc>
             </a:pPr>
             <a:r>
-              <a:rPr lang="en-US" sz="2400" dirty="0" smtClean="0"/>
+              <a:rPr lang="en-US" sz="2400" dirty="0"/>
               <a:t>Organizational Accounts Too (Active Directory, Azure AD, Office 365)</a:t>
             </a:r>
           </a:p>
@@ -9127,10 +9339,9 @@
               </a:lnSpc>
             </a:pPr>
             <a:r>
-              <a:rPr lang="en-US" sz="2400" dirty="0" smtClean="0"/>
+              <a:rPr lang="en-US" sz="2400" dirty="0"/>
               <a:t>Happiness</a:t>
             </a:r>
-            <a:endParaRPr lang="en-US" sz="2400" dirty="0"/>
           </a:p>
         </p:txBody>
       </p:sp>
@@ -9422,362 +9633,6 @@
 </p:sld>
 </file>
 
-<file path=ppt/slides/slide7.xml><?xml version="1.0" encoding="utf-8"?>
-<p:sld xmlns:a="http://schemas.openxmlformats.org/drawingml/2006/main" xmlns:r="http://schemas.openxmlformats.org/officeDocument/2006/relationships" xmlns:p="http://schemas.openxmlformats.org/presentationml/2006/main">
-  <p:cSld>
-    <p:spTree>
-      <p:nvGrpSpPr>
-        <p:cNvPr id="1" name=""/>
-        <p:cNvGrpSpPr/>
-        <p:nvPr/>
-      </p:nvGrpSpPr>
-      <p:grpSpPr>
-        <a:xfrm>
-          <a:off x="0" y="0"/>
-          <a:ext cx="0" cy="0"/>
-          <a:chOff x="0" y="0"/>
-          <a:chExt cx="0" cy="0"/>
-        </a:xfrm>
-      </p:grpSpPr>
-      <p:sp>
-        <p:nvSpPr>
-          <p:cNvPr id="2" name="Title 1"/>
-          <p:cNvSpPr>
-            <a:spLocks noGrp="1"/>
-          </p:cNvSpPr>
-          <p:nvPr>
-            <p:ph type="title"/>
-          </p:nvPr>
-        </p:nvSpPr>
-        <p:spPr/>
-        <p:txBody>
-          <a:bodyPr/>
-          <a:lstStyle/>
-          <a:p>
-            <a:pPr algn="ctr"/>
-            <a:r>
-              <a:rPr lang="en-US" dirty="0" smtClean="0"/>
-              <a:t>Claims</a:t>
-            </a:r>
-            <a:endParaRPr lang="en-US" dirty="0"/>
-          </a:p>
-        </p:txBody>
-      </p:sp>
-      <p:sp>
-        <p:nvSpPr>
-          <p:cNvPr id="3" name="Content Placeholder 2"/>
-          <p:cNvSpPr>
-            <a:spLocks noGrp="1"/>
-          </p:cNvSpPr>
-          <p:nvPr>
-            <p:ph idx="1"/>
-          </p:nvPr>
-        </p:nvSpPr>
-        <p:spPr>
-          <a:xfrm>
-            <a:off x="752474" y="1845734"/>
-            <a:ext cx="10810875" cy="4023360"/>
-          </a:xfrm>
-        </p:spPr>
-        <p:txBody>
-          <a:bodyPr>
-            <a:noAutofit/>
-          </a:bodyPr>
-          <a:lstStyle/>
-          <a:p>
-            <a:pPr algn="ctr">
-              <a:lnSpc>
-                <a:spcPct val="150000"/>
-              </a:lnSpc>
-            </a:pPr>
-            <a:r>
-              <a:rPr lang="en-US" sz="2400" dirty="0" smtClean="0"/>
-              <a:t>Additional bits of information</a:t>
-            </a:r>
-          </a:p>
-          <a:p>
-            <a:pPr algn="ctr">
-              <a:lnSpc>
-                <a:spcPct val="150000"/>
-              </a:lnSpc>
-            </a:pPr>
-            <a:r>
-              <a:rPr lang="en-US" sz="2400" dirty="0" smtClean="0"/>
-              <a:t>More granular than roles</a:t>
-            </a:r>
-            <a:endParaRPr lang="en-US" sz="2400" dirty="0"/>
-          </a:p>
-          <a:p>
-            <a:pPr algn="ctr">
-              <a:lnSpc>
-                <a:spcPct val="150000"/>
-              </a:lnSpc>
-            </a:pPr>
-            <a:r>
-              <a:rPr lang="en-US" sz="2400" dirty="0" smtClean="0"/>
-              <a:t>A </a:t>
-            </a:r>
-            <a:r>
-              <a:rPr lang="en-US" sz="2400" dirty="0" err="1" smtClean="0"/>
-              <a:t>KeyValue</a:t>
-            </a:r>
-            <a:r>
-              <a:rPr lang="en-US" sz="2400" dirty="0" smtClean="0"/>
-              <a:t> store that lives with the user</a:t>
-            </a:r>
-          </a:p>
-          <a:p>
-            <a:pPr algn="ctr">
-              <a:lnSpc>
-                <a:spcPct val="150000"/>
-              </a:lnSpc>
-            </a:pPr>
-            <a:r>
-              <a:rPr lang="en-US" sz="2400" dirty="0" smtClean="0"/>
-              <a:t>Stored in the user’s (encrypted) cookie</a:t>
-            </a:r>
-          </a:p>
-        </p:txBody>
-      </p:sp>
-    </p:spTree>
-    <p:extLst>
-      <p:ext uri="{BB962C8B-B14F-4D97-AF65-F5344CB8AC3E}">
-        <p14:creationId xmlns:p14="http://schemas.microsoft.com/office/powerpoint/2010/main" val="4057673773"/>
-      </p:ext>
-    </p:extLst>
-  </p:cSld>
-  <p:clrMapOvr>
-    <a:masterClrMapping/>
-  </p:clrMapOvr>
-  <p:timing>
-    <p:tnLst>
-      <p:par>
-        <p:cTn id="1" dur="indefinite" restart="never" nodeType="tmRoot">
-          <p:childTnLst>
-            <p:seq concurrent="1" nextAc="seek">
-              <p:cTn id="2" dur="indefinite" nodeType="mainSeq">
-                <p:childTnLst>
-                  <p:par>
-                    <p:cTn id="3" fill="hold">
-                      <p:stCondLst>
-                        <p:cond delay="indefinite"/>
-                      </p:stCondLst>
-                      <p:childTnLst>
-                        <p:par>
-                          <p:cTn id="4" fill="hold">
-                            <p:stCondLst>
-                              <p:cond delay="0"/>
-                            </p:stCondLst>
-                            <p:childTnLst>
-                              <p:par>
-                                <p:cTn id="5" presetID="1" presetClass="entr" presetSubtype="0" fill="hold" nodeType="clickEffect">
-                                  <p:stCondLst>
-                                    <p:cond delay="0"/>
-                                  </p:stCondLst>
-                                  <p:childTnLst>
-                                    <p:set>
-                                      <p:cBhvr>
-                                        <p:cTn id="6" dur="1" fill="hold">
-                                          <p:stCondLst>
-                                            <p:cond delay="0"/>
-                                          </p:stCondLst>
-                                        </p:cTn>
-                                        <p:tgtEl>
-                                          <p:spTgt spid="3">
-                                            <p:txEl>
-                                              <p:pRg st="0" end="0"/>
-                                            </p:txEl>
-                                          </p:spTgt>
-                                        </p:tgtEl>
-                                        <p:attrNameLst>
-                                          <p:attrName>style.visibility</p:attrName>
-                                        </p:attrNameLst>
-                                      </p:cBhvr>
-                                      <p:to>
-                                        <p:strVal val="visible"/>
-                                      </p:to>
-                                    </p:set>
-                                  </p:childTnLst>
-                                </p:cTn>
-                              </p:par>
-                            </p:childTnLst>
-                          </p:cTn>
-                        </p:par>
-                      </p:childTnLst>
-                    </p:cTn>
-                  </p:par>
-                  <p:par>
-                    <p:cTn id="7" fill="hold">
-                      <p:stCondLst>
-                        <p:cond delay="indefinite"/>
-                      </p:stCondLst>
-                      <p:childTnLst>
-                        <p:par>
-                          <p:cTn id="8" fill="hold">
-                            <p:stCondLst>
-                              <p:cond delay="0"/>
-                            </p:stCondLst>
-                            <p:childTnLst>
-                              <p:par>
-                                <p:cTn id="9" presetID="1" presetClass="entr" presetSubtype="0" fill="hold" nodeType="clickEffect">
-                                  <p:stCondLst>
-                                    <p:cond delay="0"/>
-                                  </p:stCondLst>
-                                  <p:childTnLst>
-                                    <p:set>
-                                      <p:cBhvr>
-                                        <p:cTn id="10" dur="1" fill="hold">
-                                          <p:stCondLst>
-                                            <p:cond delay="0"/>
-                                          </p:stCondLst>
-                                        </p:cTn>
-                                        <p:tgtEl>
-                                          <p:spTgt spid="3">
-                                            <p:txEl>
-                                              <p:pRg st="1" end="1"/>
-                                            </p:txEl>
-                                          </p:spTgt>
-                                        </p:tgtEl>
-                                        <p:attrNameLst>
-                                          <p:attrName>style.visibility</p:attrName>
-                                        </p:attrNameLst>
-                                      </p:cBhvr>
-                                      <p:to>
-                                        <p:strVal val="visible"/>
-                                      </p:to>
-                                    </p:set>
-                                  </p:childTnLst>
-                                </p:cTn>
-                              </p:par>
-                            </p:childTnLst>
-                          </p:cTn>
-                        </p:par>
-                      </p:childTnLst>
-                    </p:cTn>
-                  </p:par>
-                  <p:par>
-                    <p:cTn id="11" fill="hold">
-                      <p:stCondLst>
-                        <p:cond delay="indefinite"/>
-                      </p:stCondLst>
-                      <p:childTnLst>
-                        <p:par>
-                          <p:cTn id="12" fill="hold">
-                            <p:stCondLst>
-                              <p:cond delay="0"/>
-                            </p:stCondLst>
-                            <p:childTnLst>
-                              <p:par>
-                                <p:cTn id="13" presetID="1" presetClass="entr" presetSubtype="0" fill="hold" nodeType="clickEffect">
-                                  <p:stCondLst>
-                                    <p:cond delay="0"/>
-                                  </p:stCondLst>
-                                  <p:childTnLst>
-                                    <p:set>
-                                      <p:cBhvr>
-                                        <p:cTn id="14" dur="1" fill="hold">
-                                          <p:stCondLst>
-                                            <p:cond delay="0"/>
-                                          </p:stCondLst>
-                                        </p:cTn>
-                                        <p:tgtEl>
-                                          <p:spTgt spid="3">
-                                            <p:txEl>
-                                              <p:pRg st="2" end="2"/>
-                                            </p:txEl>
-                                          </p:spTgt>
-                                        </p:tgtEl>
-                                        <p:attrNameLst>
-                                          <p:attrName>style.visibility</p:attrName>
-                                        </p:attrNameLst>
-                                      </p:cBhvr>
-                                      <p:to>
-                                        <p:strVal val="visible"/>
-                                      </p:to>
-                                    </p:set>
-                                  </p:childTnLst>
-                                </p:cTn>
-                              </p:par>
-                            </p:childTnLst>
-                          </p:cTn>
-                        </p:par>
-                      </p:childTnLst>
-                    </p:cTn>
-                  </p:par>
-                  <p:par>
-                    <p:cTn id="15" fill="hold">
-                      <p:stCondLst>
-                        <p:cond delay="indefinite"/>
-                      </p:stCondLst>
-                      <p:childTnLst>
-                        <p:par>
-                          <p:cTn id="16" fill="hold">
-                            <p:stCondLst>
-                              <p:cond delay="0"/>
-                            </p:stCondLst>
-                            <p:childTnLst>
-                              <p:par>
-                                <p:cTn id="17" presetID="1" presetClass="entr" presetSubtype="0" fill="hold" nodeType="clickEffect">
-                                  <p:stCondLst>
-                                    <p:cond delay="0"/>
-                                  </p:stCondLst>
-                                  <p:childTnLst>
-                                    <p:set>
-                                      <p:cBhvr>
-                                        <p:cTn id="18" dur="1" fill="hold">
-                                          <p:stCondLst>
-                                            <p:cond delay="0"/>
-                                          </p:stCondLst>
-                                        </p:cTn>
-                                        <p:tgtEl>
-                                          <p:spTgt spid="3">
-                                            <p:txEl>
-                                              <p:pRg st="3" end="3"/>
-                                            </p:txEl>
-                                          </p:spTgt>
-                                        </p:tgtEl>
-                                        <p:attrNameLst>
-                                          <p:attrName>style.visibility</p:attrName>
-                                        </p:attrNameLst>
-                                      </p:cBhvr>
-                                      <p:to>
-                                        <p:strVal val="visible"/>
-                                      </p:to>
-                                    </p:set>
-                                  </p:childTnLst>
-                                </p:cTn>
-                              </p:par>
-                            </p:childTnLst>
-                          </p:cTn>
-                        </p:par>
-                      </p:childTnLst>
-                    </p:cTn>
-                  </p:par>
-                </p:childTnLst>
-              </p:cTn>
-              <p:prevCondLst>
-                <p:cond evt="onPrev" delay="0">
-                  <p:tgtEl>
-                    <p:sldTgt/>
-                  </p:tgtEl>
-                </p:cond>
-              </p:prevCondLst>
-              <p:nextCondLst>
-                <p:cond evt="onNext" delay="0">
-                  <p:tgtEl>
-                    <p:sldTgt/>
-                  </p:tgtEl>
-                </p:cond>
-              </p:nextCondLst>
-            </p:seq>
-          </p:childTnLst>
-        </p:cTn>
-      </p:par>
-    </p:tnLst>
-  </p:timing>
-</p:sld>
-</file>
-
 <file path=ppt/slides/slide8.xml><?xml version="1.0" encoding="utf-8"?>
 <p:sld xmlns:a="http://schemas.openxmlformats.org/drawingml/2006/main" xmlns:r="http://schemas.openxmlformats.org/officeDocument/2006/relationships" xmlns:p="http://schemas.openxmlformats.org/presentationml/2006/main">
   <p:cSld>
@@ -9812,10 +9667,9 @@
           <a:p>
             <a:pPr algn="ctr"/>
             <a:r>
-              <a:rPr lang="en-US" dirty="0" smtClean="0"/>
-              <a:t>Demonstrating</a:t>
-            </a:r>
-            <a:endParaRPr lang="en-US" dirty="0"/>
+              <a:rPr lang="en-US" dirty="0"/>
+              <a:t>Claims</a:t>
+            </a:r>
           </a:p>
         </p:txBody>
       </p:sp>
@@ -9831,8 +9685,8 @@
         </p:nvSpPr>
         <p:spPr>
           <a:xfrm>
-            <a:off x="752474" y="1799553"/>
-            <a:ext cx="10810875" cy="4471937"/>
+            <a:off x="752474" y="1845734"/>
+            <a:ext cx="10810875" cy="4023360"/>
           </a:xfrm>
         </p:spPr>
         <p:txBody>
@@ -9847,8 +9701,8 @@
               </a:lnSpc>
             </a:pPr>
             <a:r>
-              <a:rPr lang="en-US" sz="2400" dirty="0" smtClean="0"/>
-              <a:t>Authentication under the hood</a:t>
+              <a:rPr lang="en-US" sz="2400" dirty="0"/>
+              <a:t>Additional bits of information</a:t>
             </a:r>
           </a:p>
           <a:p>
@@ -9858,10 +9712,9 @@
               </a:lnSpc>
             </a:pPr>
             <a:r>
-              <a:rPr lang="en-US" sz="2400" dirty="0" smtClean="0"/>
-              <a:t>Bare-bones no-password authentication with MVC 5</a:t>
-            </a:r>
-            <a:endParaRPr lang="en-US" sz="2400" dirty="0"/>
+              <a:rPr lang="en-US" sz="2400" dirty="0"/>
+              <a:t>More granular than roles</a:t>
+            </a:r>
           </a:p>
           <a:p>
             <a:pPr algn="ctr">
@@ -9870,8 +9723,16 @@
               </a:lnSpc>
             </a:pPr>
             <a:r>
-              <a:rPr lang="en-US" sz="2400" dirty="0" smtClean="0"/>
-              <a:t>Adding the Identity bits</a:t>
+              <a:rPr lang="en-US" sz="2400" dirty="0"/>
+              <a:t>A </a:t>
+            </a:r>
+            <a:r>
+              <a:rPr lang="en-US" sz="2400" dirty="0" err="1"/>
+              <a:t>KeyValue</a:t>
+            </a:r>
+            <a:r>
+              <a:rPr lang="en-US" sz="2400" dirty="0"/>
+              <a:t> store that lives with the user</a:t>
             </a:r>
           </a:p>
           <a:p>
@@ -9881,24 +9742,16 @@
               </a:lnSpc>
             </a:pPr>
             <a:r>
-              <a:rPr lang="en-US" sz="2400" dirty="0" smtClean="0"/>
-              <a:t>Managers &amp; Stores</a:t>
-            </a:r>
-          </a:p>
-          <a:p>
-            <a:pPr algn="ctr">
-              <a:lnSpc>
-                <a:spcPct val="150000"/>
-              </a:lnSpc>
-            </a:pPr>
-            <a:endParaRPr lang="en-US" sz="2400" dirty="0" smtClean="0"/>
+              <a:rPr lang="en-US" sz="2400" dirty="0"/>
+              <a:t>Stored in the user’s (encrypted) cookie</a:t>
+            </a:r>
           </a:p>
         </p:txBody>
       </p:sp>
     </p:spTree>
     <p:extLst>
       <p:ext uri="{BB962C8B-B14F-4D97-AF65-F5344CB8AC3E}">
-        <p14:creationId xmlns:p14="http://schemas.microsoft.com/office/powerpoint/2010/main" val="1655825560"/>
+        <p14:creationId xmlns:p14="http://schemas.microsoft.com/office/powerpoint/2010/main" val="4057673773"/>
       </p:ext>
     </p:extLst>
   </p:cSld>
@@ -10168,10 +10021,9 @@
           <a:p>
             <a:pPr algn="ctr"/>
             <a:r>
-              <a:rPr lang="en-US" dirty="0" smtClean="0"/>
-              <a:t>Showing / Discussing</a:t>
-            </a:r>
-            <a:endParaRPr lang="en-US" dirty="0"/>
+              <a:rPr lang="en-US" dirty="0"/>
+              <a:t>Demonstrating</a:t>
+            </a:r>
           </a:p>
         </p:txBody>
       </p:sp>
@@ -10187,8 +10039,8 @@
         </p:nvSpPr>
         <p:spPr>
           <a:xfrm>
-            <a:off x="752474" y="1845734"/>
-            <a:ext cx="10810875" cy="4023360"/>
+            <a:off x="752474" y="1799553"/>
+            <a:ext cx="10810875" cy="4471937"/>
           </a:xfrm>
         </p:spPr>
         <p:txBody>
@@ -10204,11 +10056,7 @@
             </a:pPr>
             <a:r>
               <a:rPr lang="en-US" sz="2400" dirty="0"/>
-              <a:t>Custom code for password </a:t>
-            </a:r>
-            <a:r>
-              <a:rPr lang="en-US" sz="2400" dirty="0" smtClean="0"/>
-              <a:t>validation</a:t>
+              <a:t>Authentication under the hood</a:t>
             </a:r>
           </a:p>
           <a:p>
@@ -10219,7 +10067,7 @@
             </a:pPr>
             <a:r>
               <a:rPr lang="en-US" sz="2400" dirty="0"/>
-              <a:t>Adding claims to a user</a:t>
+              <a:t>Bare-bones no-password authentication</a:t>
             </a:r>
           </a:p>
           <a:p>
@@ -10229,8 +10077,8 @@
               </a:lnSpc>
             </a:pPr>
             <a:r>
-              <a:rPr lang="en-US" sz="2400" dirty="0" smtClean="0"/>
-              <a:t>Two-factor authentication – how &amp; where would you go to implement it?</a:t>
+              <a:rPr lang="en-US" sz="2400" dirty="0"/>
+              <a:t>Adding the Identity bits</a:t>
             </a:r>
           </a:p>
           <a:p>
@@ -10240,8 +10088,19 @@
               </a:lnSpc>
             </a:pPr>
             <a:r>
-              <a:rPr lang="en-US" sz="2400" dirty="0" smtClean="0"/>
-              <a:t>Social providers</a:t>
+              <a:rPr lang="en-US" sz="2400" dirty="0"/>
+              <a:t>Managers &amp; Stores</a:t>
+            </a:r>
+          </a:p>
+          <a:p>
+            <a:pPr algn="ctr">
+              <a:lnSpc>
+                <a:spcPct val="150000"/>
+              </a:lnSpc>
+            </a:pPr>
+            <a:r>
+              <a:rPr lang="en-US" sz="2400" dirty="0"/>
+              <a:t>Custom code for password validation</a:t>
             </a:r>
           </a:p>
         </p:txBody>
@@ -10249,7 +10108,7 @@
     </p:spTree>
     <p:extLst>
       <p:ext uri="{BB962C8B-B14F-4D97-AF65-F5344CB8AC3E}">
-        <p14:creationId xmlns:p14="http://schemas.microsoft.com/office/powerpoint/2010/main" val="1135059950"/>
+        <p14:creationId xmlns:p14="http://schemas.microsoft.com/office/powerpoint/2010/main" val="1655825560"/>
       </p:ext>
     </p:extLst>
   </p:cSld>
@@ -10440,6 +10299,55 @@
                                           <p:spTgt spid="3">
                                             <p:txEl>
                                               <p:pRg st="3" end="3"/>
+                                            </p:txEl>
+                                          </p:spTgt>
+                                        </p:tgtEl>
+                                        <p:attrNameLst>
+                                          <p:attrName>style.visibility</p:attrName>
+                                        </p:attrNameLst>
+                                      </p:cBhvr>
+                                      <p:to>
+                                        <p:strVal val="visible"/>
+                                      </p:to>
+                                    </p:set>
+                                  </p:childTnLst>
+                                </p:cTn>
+                              </p:par>
+                            </p:childTnLst>
+                          </p:cTn>
+                        </p:par>
+                      </p:childTnLst>
+                    </p:cTn>
+                  </p:par>
+                  <p:par>
+                    <p:cTn id="19" fill="hold">
+                      <p:stCondLst>
+                        <p:cond delay="indefinite"/>
+                      </p:stCondLst>
+                      <p:childTnLst>
+                        <p:par>
+                          <p:cTn id="20" fill="hold">
+                            <p:stCondLst>
+                              <p:cond delay="0"/>
+                            </p:stCondLst>
+                            <p:childTnLst>
+                              <p:par>
+                                <p:cTn id="21" presetID="1" presetClass="entr" presetSubtype="0" fill="hold" nodeType="clickEffect">
+                                  <p:stCondLst>
+                                    <p:cond delay="0"/>
+                                  </p:stCondLst>
+                                  <p:childTnLst>
+                                    <p:set>
+                                      <p:cBhvr>
+                                        <p:cTn id="22" dur="1" fill="hold">
+                                          <p:stCondLst>
+                                            <p:cond delay="0"/>
+                                          </p:stCondLst>
+                                        </p:cTn>
+                                        <p:tgtEl>
+                                          <p:spTgt spid="3">
+                                            <p:txEl>
+                                              <p:pRg st="4" end="4"/>
                                             </p:txEl>
                                           </p:spTgt>
                                         </p:tgtEl>

</xml_diff>

<commit_message>
Added code and updated slides from That Conference 2018
</commit_message>
<xml_diff>
--- a/slides.pptx
+++ b/slides.pptx
@@ -5,11 +5,11 @@
     <p:sldMasterId id="2147483648" r:id="rId1"/>
   </p:sldMasterIdLst>
   <p:notesMasterIdLst>
-    <p:notesMasterId r:id="rId23"/>
+    <p:notesMasterId r:id="rId22"/>
   </p:notesMasterIdLst>
   <p:sldIdLst>
     <p:sldId id="256" r:id="rId2"/>
-    <p:sldId id="265" r:id="rId3"/>
+    <p:sldId id="434" r:id="rId3"/>
     <p:sldId id="422" r:id="rId4"/>
     <p:sldId id="433" r:id="rId5"/>
     <p:sldId id="415" r:id="rId6"/>
@@ -17,18 +17,17 @@
     <p:sldId id="417" r:id="rId8"/>
     <p:sldId id="418" r:id="rId9"/>
     <p:sldId id="419" r:id="rId10"/>
-    <p:sldId id="421" r:id="rId11"/>
-    <p:sldId id="425" r:id="rId12"/>
-    <p:sldId id="424" r:id="rId13"/>
-    <p:sldId id="429" r:id="rId14"/>
-    <p:sldId id="430" r:id="rId15"/>
-    <p:sldId id="426" r:id="rId16"/>
-    <p:sldId id="427" r:id="rId17"/>
-    <p:sldId id="428" r:id="rId18"/>
-    <p:sldId id="398" r:id="rId19"/>
-    <p:sldId id="431" r:id="rId20"/>
-    <p:sldId id="411" r:id="rId21"/>
-    <p:sldId id="391" r:id="rId22"/>
+    <p:sldId id="425" r:id="rId11"/>
+    <p:sldId id="424" r:id="rId12"/>
+    <p:sldId id="429" r:id="rId13"/>
+    <p:sldId id="430" r:id="rId14"/>
+    <p:sldId id="426" r:id="rId15"/>
+    <p:sldId id="427" r:id="rId16"/>
+    <p:sldId id="428" r:id="rId17"/>
+    <p:sldId id="438" r:id="rId18"/>
+    <p:sldId id="431" r:id="rId19"/>
+    <p:sldId id="411" r:id="rId20"/>
+    <p:sldId id="391" r:id="rId21"/>
   </p:sldIdLst>
   <p:sldSz cx="12192000" cy="6858000"/>
   <p:notesSz cx="6858000" cy="9144000"/>
@@ -135,6 +134,109 @@
 </p:presentation>
 </file>
 
+<file path=ppt/changesInfos/changesInfo1.xml><?xml version="1.0" encoding="utf-8"?>
+<pc:chgInfo xmlns:a="http://schemas.openxmlformats.org/drawingml/2006/main" xmlns:r="http://schemas.openxmlformats.org/officeDocument/2006/relationships" xmlns:ac="http://schemas.microsoft.com/office/drawing/2013/main/command" xmlns:pc="http://schemas.microsoft.com/office/powerpoint/2013/main/command">
+  <pc:docChgLst>
+    <pc:chgData name="Ondrej Balas" userId="f157f85cfc3ecc3e" providerId="LiveId" clId="{484EFBEB-AC74-414C-AFBD-B4275985304E}"/>
+    <pc:docChg chg="undo custSel addSld modSld">
+      <pc:chgData name="Ondrej Balas" userId="f157f85cfc3ecc3e" providerId="LiveId" clId="{484EFBEB-AC74-414C-AFBD-B4275985304E}" dt="2018-08-07T19:50:41.913" v="331"/>
+      <pc:docMkLst>
+        <pc:docMk/>
+      </pc:docMkLst>
+      <pc:sldChg chg="modSp">
+        <pc:chgData name="Ondrej Balas" userId="f157f85cfc3ecc3e" providerId="LiveId" clId="{484EFBEB-AC74-414C-AFBD-B4275985304E}" dt="2018-08-07T19:04:15.279" v="302" actId="20577"/>
+        <pc:sldMkLst>
+          <pc:docMk/>
+          <pc:sldMk cId="2305317701" sldId="256"/>
+        </pc:sldMkLst>
+        <pc:spChg chg="mod">
+          <ac:chgData name="Ondrej Balas" userId="f157f85cfc3ecc3e" providerId="LiveId" clId="{484EFBEB-AC74-414C-AFBD-B4275985304E}" dt="2018-08-07T19:04:15.279" v="302" actId="20577"/>
+          <ac:spMkLst>
+            <pc:docMk/>
+            <pc:sldMk cId="2305317701" sldId="256"/>
+            <ac:spMk id="2" creationId="{00000000-0000-0000-0000-000000000000}"/>
+          </ac:spMkLst>
+        </pc:spChg>
+      </pc:sldChg>
+      <pc:sldChg chg="modTransition">
+        <pc:chgData name="Ondrej Balas" userId="f157f85cfc3ecc3e" providerId="LiveId" clId="{484EFBEB-AC74-414C-AFBD-B4275985304E}" dt="2018-08-07T19:50:32.527" v="330"/>
+        <pc:sldMkLst>
+          <pc:docMk/>
+          <pc:sldMk cId="4062784622" sldId="398"/>
+        </pc:sldMkLst>
+      </pc:sldChg>
+      <pc:sldChg chg="modSp">
+        <pc:chgData name="Ondrej Balas" userId="f157f85cfc3ecc3e" providerId="LiveId" clId="{484EFBEB-AC74-414C-AFBD-B4275985304E}" dt="2018-08-07T19:35:59.813" v="329" actId="20577"/>
+        <pc:sldMkLst>
+          <pc:docMk/>
+          <pc:sldMk cId="4057673773" sldId="418"/>
+        </pc:sldMkLst>
+        <pc:spChg chg="mod">
+          <ac:chgData name="Ondrej Balas" userId="f157f85cfc3ecc3e" providerId="LiveId" clId="{484EFBEB-AC74-414C-AFBD-B4275985304E}" dt="2018-08-07T19:35:59.813" v="329" actId="20577"/>
+          <ac:spMkLst>
+            <pc:docMk/>
+            <pc:sldMk cId="4057673773" sldId="418"/>
+            <ac:spMk id="3" creationId="{00000000-0000-0000-0000-000000000000}"/>
+          </ac:spMkLst>
+        </pc:spChg>
+      </pc:sldChg>
+      <pc:sldChg chg="modSp modAnim">
+        <pc:chgData name="Ondrej Balas" userId="f157f85cfc3ecc3e" providerId="LiveId" clId="{484EFBEB-AC74-414C-AFBD-B4275985304E}" dt="2018-08-07T18:59:30.534" v="113" actId="20577"/>
+        <pc:sldMkLst>
+          <pc:docMk/>
+          <pc:sldMk cId="3811974222" sldId="422"/>
+        </pc:sldMkLst>
+        <pc:spChg chg="mod">
+          <ac:chgData name="Ondrej Balas" userId="f157f85cfc3ecc3e" providerId="LiveId" clId="{484EFBEB-AC74-414C-AFBD-B4275985304E}" dt="2018-08-07T18:59:30.534" v="113" actId="20577"/>
+          <ac:spMkLst>
+            <pc:docMk/>
+            <pc:sldMk cId="3811974222" sldId="422"/>
+            <ac:spMk id="3" creationId="{00000000-0000-0000-0000-000000000000}"/>
+          </ac:spMkLst>
+        </pc:spChg>
+      </pc:sldChg>
+      <pc:sldChg chg="addSp delSp modSp">
+        <pc:chgData name="Ondrej Balas" userId="f157f85cfc3ecc3e" providerId="LiveId" clId="{484EFBEB-AC74-414C-AFBD-B4275985304E}" dt="2018-08-07T19:23:55.821" v="308"/>
+        <pc:sldMkLst>
+          <pc:docMk/>
+          <pc:sldMk cId="2421003315" sldId="433"/>
+        </pc:sldMkLst>
+        <pc:picChg chg="add del mod">
+          <ac:chgData name="Ondrej Balas" userId="f157f85cfc3ecc3e" providerId="LiveId" clId="{484EFBEB-AC74-414C-AFBD-B4275985304E}" dt="2018-08-07T19:23:55.821" v="308"/>
+          <ac:picMkLst>
+            <pc:docMk/>
+            <pc:sldMk cId="2421003315" sldId="433"/>
+            <ac:picMk id="2" creationId="{5D606590-822A-4EE8-8B22-192B2A80E5B0}"/>
+          </ac:picMkLst>
+        </pc:picChg>
+      </pc:sldChg>
+      <pc:sldChg chg="modSp modNotesTx">
+        <pc:chgData name="Ondrej Balas" userId="f157f85cfc3ecc3e" providerId="LiveId" clId="{484EFBEB-AC74-414C-AFBD-B4275985304E}" dt="2018-08-07T19:04:28.387" v="304" actId="20577"/>
+        <pc:sldMkLst>
+          <pc:docMk/>
+          <pc:sldMk cId="2608099043" sldId="434"/>
+        </pc:sldMkLst>
+        <pc:spChg chg="mod">
+          <ac:chgData name="Ondrej Balas" userId="f157f85cfc3ecc3e" providerId="LiveId" clId="{484EFBEB-AC74-414C-AFBD-B4275985304E}" dt="2018-08-07T19:04:28.387" v="304" actId="20577"/>
+          <ac:spMkLst>
+            <pc:docMk/>
+            <pc:sldMk cId="2608099043" sldId="434"/>
+            <ac:spMk id="12" creationId="{00000000-0000-0000-0000-000000000000}"/>
+          </ac:spMkLst>
+        </pc:spChg>
+      </pc:sldChg>
+      <pc:sldChg chg="add">
+        <pc:chgData name="Ondrej Balas" userId="f157f85cfc3ecc3e" providerId="LiveId" clId="{484EFBEB-AC74-414C-AFBD-B4275985304E}" dt="2018-08-07T19:50:41.913" v="331"/>
+        <pc:sldMkLst>
+          <pc:docMk/>
+          <pc:sldMk cId="957100005" sldId="438"/>
+        </pc:sldMkLst>
+      </pc:sldChg>
+    </pc:docChg>
+  </pc:docChgLst>
+</pc:chgInfo>
+</file>
+
 <file path=ppt/notesMasters/notesMaster1.xml><?xml version="1.0" encoding="utf-8"?>
 <p:notesMaster xmlns:a="http://schemas.openxmlformats.org/drawingml/2006/main" xmlns:r="http://schemas.openxmlformats.org/officeDocument/2006/relationships" xmlns:p="http://schemas.openxmlformats.org/presentationml/2006/main">
   <p:cSld>
@@ -217,7 +319,7 @@
           <a:p>
             <a:fld id="{99DFD45C-204D-49D0-AA7B-31A6035D5E91}" type="datetimeFigureOut">
               <a:rPr lang="en-US" smtClean="0"/>
-              <a:t>1/14/2017</a:t>
+              <a:t>8/8/2018</a:t>
             </a:fld>
             <a:endParaRPr lang="en-US"/>
           </a:p>
@@ -643,19 +745,11 @@
           <a:p>
             <a:r>
               <a:rPr lang="en-US" dirty="0"/>
-              <a:t>The</a:t>
+              <a:t>Let’s say you then click on a link that takes you to a protected part of the website. You can think of</a:t>
             </a:r>
             <a:r>
               <a:rPr lang="en-US" baseline="0" dirty="0"/>
-              <a:t> 302 has contains no body (content), only a URL of the next page to request. The browser will then make the next request, to the login page, and get the 200 (OK) response back from the server. </a:t>
-            </a:r>
-            <a:r>
-              <a:rPr lang="en-US" dirty="0"/>
-              <a:t>At the login</a:t>
-            </a:r>
-            <a:r>
-              <a:rPr lang="en-US" baseline="0" dirty="0"/>
-              <a:t> page, the user will type in their username and password, and then hit the login (or “Meow” in this case) button. </a:t>
+              <a:t> this as being an Action with an [Authorize] attribute surrounding it. The server will examine the request and determine if it’s an authenticated request. Using cookie authentication, it is looking for a specific cookie that should contain some kind of token that it can correlate to a user and validate. Since this request has no cookie, authentication fails, and the server responds with a 302 (redirect) to the login page.</a:t>
             </a:r>
             <a:endParaRPr lang="en-US" dirty="0"/>
           </a:p>
@@ -678,7 +772,7 @@
           <a:p>
             <a:fld id="{C16E5CF5-7271-4C13-8455-0600239432B5}" type="slidenum">
               <a:rPr lang="en-US" smtClean="0"/>
-              <a:t>15</a:t>
+              <a:t>13</a:t>
             </a:fld>
             <a:endParaRPr lang="en-US"/>
           </a:p>
@@ -687,7 +781,7 @@
     </p:spTree>
     <p:extLst>
       <p:ext uri="{BB962C8B-B14F-4D97-AF65-F5344CB8AC3E}">
-        <p14:creationId xmlns:p14="http://schemas.microsoft.com/office/powerpoint/2010/main" val="996763482"/>
+        <p14:creationId xmlns:p14="http://schemas.microsoft.com/office/powerpoint/2010/main" val="3407336804"/>
       </p:ext>
     </p:extLst>
   </p:cSld>
@@ -742,8 +836,20 @@
           <a:lstStyle/>
           <a:p>
             <a:r>
+              <a:rPr lang="en-US" dirty="0"/>
+              <a:t>The</a:t>
+            </a:r>
+            <a:r>
               <a:rPr lang="en-US" baseline="0" dirty="0"/>
-              <a:t>That will trigger the browser to make an HTTP POST request, with the body containing the values you entered. This Is where SSL comes in handy! The server will respond with a 302 back to the protected page, but this time with a “Set-Cookie” header.</a:t>
+              <a:t> 302 has contains no body (content), only a URL of the next page to request. The browser will then make the next request, to the login page, and get the 200 (OK) response back from the server. </a:t>
+            </a:r>
+            <a:r>
+              <a:rPr lang="en-US" dirty="0"/>
+              <a:t>At the login</a:t>
+            </a:r>
+            <a:r>
+              <a:rPr lang="en-US" baseline="0" dirty="0"/>
+              <a:t> page, the user will type in their username and password, and then hit the login (or “Meow” in this case) button. </a:t>
             </a:r>
             <a:endParaRPr lang="en-US" dirty="0"/>
           </a:p>
@@ -766,7 +872,7 @@
           <a:p>
             <a:fld id="{C16E5CF5-7271-4C13-8455-0600239432B5}" type="slidenum">
               <a:rPr lang="en-US" smtClean="0"/>
-              <a:t>16</a:t>
+              <a:t>14</a:t>
             </a:fld>
             <a:endParaRPr lang="en-US"/>
           </a:p>
@@ -775,7 +881,7 @@
     </p:spTree>
     <p:extLst>
       <p:ext uri="{BB962C8B-B14F-4D97-AF65-F5344CB8AC3E}">
-        <p14:creationId xmlns:p14="http://schemas.microsoft.com/office/powerpoint/2010/main" val="2725953082"/>
+        <p14:creationId xmlns:p14="http://schemas.microsoft.com/office/powerpoint/2010/main" val="996763482"/>
       </p:ext>
     </p:extLst>
   </p:cSld>
@@ -830,12 +936,8 @@
           <a:lstStyle/>
           <a:p>
             <a:r>
-              <a:rPr lang="en-US" dirty="0"/>
-              <a:t>At the login</a:t>
-            </a:r>
-            <a:r>
               <a:rPr lang="en-US" baseline="0" dirty="0"/>
-              <a:t> page, the user will type in their username and password, and then hit the login (or “Meow” in this case) button. That will trigger the browser to make an HTTP POST request, with the body containing the values you entered. This Is where SSL comes in handy! The server will respond with a 302 back to the protected page, but this time with a “Set-Cookie” header.</a:t>
+              <a:t>That will trigger the browser to make an HTTP POST request, with the body containing the values you entered. This Is where SSL comes in handy! The server will respond with a 302 back to the protected page, but this time with a “Set-Cookie” header.</a:t>
             </a:r>
             <a:endParaRPr lang="en-US" dirty="0"/>
           </a:p>
@@ -858,7 +960,7 @@
           <a:p>
             <a:fld id="{C16E5CF5-7271-4C13-8455-0600239432B5}" type="slidenum">
               <a:rPr lang="en-US" smtClean="0"/>
-              <a:t>17</a:t>
+              <a:t>15</a:t>
             </a:fld>
             <a:endParaRPr lang="en-US"/>
           </a:p>
@@ -867,7 +969,7 @@
     </p:spTree>
     <p:extLst>
       <p:ext uri="{BB962C8B-B14F-4D97-AF65-F5344CB8AC3E}">
-        <p14:creationId xmlns:p14="http://schemas.microsoft.com/office/powerpoint/2010/main" val="3959871104"/>
+        <p14:creationId xmlns:p14="http://schemas.microsoft.com/office/powerpoint/2010/main" val="2725953082"/>
       </p:ext>
     </p:extLst>
   </p:cSld>
@@ -921,6 +1023,14 @@
           <a:bodyPr/>
           <a:lstStyle/>
           <a:p>
+            <a:r>
+              <a:rPr lang="en-US" dirty="0"/>
+              <a:t>At the login</a:t>
+            </a:r>
+            <a:r>
+              <a:rPr lang="en-US" baseline="0" dirty="0"/>
+              <a:t> page, the user will type in their username and password, and then hit the login (or “Meow” in this case) button. That will trigger the browser to make an HTTP POST request, with the body containing the values you entered. This Is where SSL comes in handy! The server will respond with a 302 back to the protected page, but this time with a “Set-Cookie” header.</a:t>
+            </a:r>
             <a:endParaRPr lang="en-US" dirty="0"/>
           </a:p>
         </p:txBody>
@@ -942,7 +1052,7 @@
           <a:p>
             <a:fld id="{C16E5CF5-7271-4C13-8455-0600239432B5}" type="slidenum">
               <a:rPr lang="en-US" smtClean="0"/>
-              <a:t>18</a:t>
+              <a:t>16</a:t>
             </a:fld>
             <a:endParaRPr lang="en-US"/>
           </a:p>
@@ -951,7 +1061,7 @@
     </p:spTree>
     <p:extLst>
       <p:ext uri="{BB962C8B-B14F-4D97-AF65-F5344CB8AC3E}">
-        <p14:creationId xmlns:p14="http://schemas.microsoft.com/office/powerpoint/2010/main" val="2378242908"/>
+        <p14:creationId xmlns:p14="http://schemas.microsoft.com/office/powerpoint/2010/main" val="3959871104"/>
       </p:ext>
     </p:extLst>
   </p:cSld>
@@ -1037,7 +1147,7 @@
           <a:p>
             <a:fld id="{C16E5CF5-7271-4C13-8455-0600239432B5}" type="slidenum">
               <a:rPr lang="en-US" smtClean="0"/>
-              <a:t>20</a:t>
+              <a:t>19</a:t>
             </a:fld>
             <a:endParaRPr lang="en-US"/>
           </a:p>
@@ -1100,6 +1210,36 @@
           <a:bodyPr/>
           <a:lstStyle/>
           <a:p>
+            <a:r>
+              <a:rPr lang="en-US" dirty="0"/>
+              <a:t>Microsoft MVP in Visual Studio</a:t>
+            </a:r>
+          </a:p>
+          <a:p>
+            <a:r>
+              <a:rPr lang="en-US" dirty="0"/>
+              <a:t>Writing – topics related to .NET development including things like regular expressions, dependency injection, etc.</a:t>
+            </a:r>
+          </a:p>
+          <a:p>
+            <a:r>
+              <a:rPr lang="en-US" dirty="0"/>
+              <a:t>Consulting – Started in 2001 and played with several technology stacks, but focused solely on .NET after its release the following year.</a:t>
+            </a:r>
+          </a:p>
+          <a:p>
+            <a:r>
+              <a:rPr lang="en-US" dirty="0"/>
+              <a:t>Startup is focused around helping developers get a piece of the profits made from credit card processing solutions they implement. Why should Stripe make all the money? </a:t>
+            </a:r>
+          </a:p>
+          <a:p>
+            <a:r>
+              <a:rPr lang="en-US" dirty="0"/>
+              <a:t>I’d love to chat about any of those topics, and if you see me around the conference center stop me and say hi!</a:t>
+            </a:r>
+          </a:p>
+          <a:p>
             <a:endParaRPr lang="en-US" dirty="0"/>
           </a:p>
         </p:txBody>
@@ -1121,7 +1261,7 @@
           <a:p>
             <a:fld id="{C16E5CF5-7271-4C13-8455-0600239432B5}" type="slidenum">
               <a:rPr lang="en-US" smtClean="0"/>
-              <a:t>3</a:t>
+              <a:t>2</a:t>
             </a:fld>
             <a:endParaRPr lang="en-US"/>
           </a:p>
@@ -1130,7 +1270,7 @@
     </p:spTree>
     <p:extLst>
       <p:ext uri="{BB962C8B-B14F-4D97-AF65-F5344CB8AC3E}">
-        <p14:creationId xmlns:p14="http://schemas.microsoft.com/office/powerpoint/2010/main" val="2854506185"/>
+        <p14:creationId xmlns:p14="http://schemas.microsoft.com/office/powerpoint/2010/main" val="1262591727"/>
       </p:ext>
     </p:extLst>
   </p:cSld>
@@ -1205,7 +1345,7 @@
           <a:p>
             <a:fld id="{C16E5CF5-7271-4C13-8455-0600239432B5}" type="slidenum">
               <a:rPr lang="en-US" smtClean="0"/>
-              <a:t>4</a:t>
+              <a:t>3</a:t>
             </a:fld>
             <a:endParaRPr lang="en-US"/>
           </a:p>
@@ -1214,7 +1354,7 @@
     </p:spTree>
     <p:extLst>
       <p:ext uri="{BB962C8B-B14F-4D97-AF65-F5344CB8AC3E}">
-        <p14:creationId xmlns:p14="http://schemas.microsoft.com/office/powerpoint/2010/main" val="1674304126"/>
+        <p14:creationId xmlns:p14="http://schemas.microsoft.com/office/powerpoint/2010/main" val="2854506185"/>
       </p:ext>
     </p:extLst>
   </p:cSld>
@@ -1268,35 +1408,6 @@
           <a:bodyPr/>
           <a:lstStyle/>
           <a:p>
-            <a:r>
-              <a:rPr lang="en-US" dirty="0"/>
-              <a:t>Keep</a:t>
-            </a:r>
-            <a:r>
-              <a:rPr lang="en-US" baseline="0" dirty="0"/>
-              <a:t> in mind that when ASP.NET Membership shipped, it pre-dated things like MVC which didn’t release until much later. So this was a solution that made sense at the time.</a:t>
-            </a:r>
-            <a:endParaRPr lang="en-US" dirty="0"/>
-          </a:p>
-          <a:p>
-            <a:r>
-              <a:rPr lang="en-US" dirty="0"/>
-              <a:t>Really only worked with SQL server. Other relational databases (even MySQL) required custom providers, and trying to write a custom provider for a non-relational database was very difficult</a:t>
-            </a:r>
-          </a:p>
-          <a:p>
-            <a:r>
-              <a:rPr lang="en-US" dirty="0"/>
-              <a:t>Things like roles and passwords were a requirement of the system. This meant no compatibility with things like OAuth, Claims based authentication, etc.</a:t>
-            </a:r>
-          </a:p>
-          <a:p>
-            <a:r>
-              <a:rPr lang="en-US" dirty="0"/>
-              <a:t>Adding fields to users was difficult. The mechanism was user profiles, but they way they worked was weird. Because of the tight coupling with SQL and a specific database schema, additional fields were all stored in a single column, in a relatively cryptic format. Nothing as neat as JSON or even XML. This made querying or reporting on user data overly complicated. And forget about doing SQL joins to any of that.</a:t>
-            </a:r>
-          </a:p>
-          <a:p>
             <a:endParaRPr lang="en-US" dirty="0"/>
           </a:p>
         </p:txBody>
@@ -1318,7 +1429,7 @@
           <a:p>
             <a:fld id="{C16E5CF5-7271-4C13-8455-0600239432B5}" type="slidenum">
               <a:rPr lang="en-US" smtClean="0"/>
-              <a:t>5</a:t>
+              <a:t>4</a:t>
             </a:fld>
             <a:endParaRPr lang="en-US"/>
           </a:p>
@@ -1327,7 +1438,7 @@
     </p:spTree>
     <p:extLst>
       <p:ext uri="{BB962C8B-B14F-4D97-AF65-F5344CB8AC3E}">
-        <p14:creationId xmlns:p14="http://schemas.microsoft.com/office/powerpoint/2010/main" val="2463631471"/>
+        <p14:creationId xmlns:p14="http://schemas.microsoft.com/office/powerpoint/2010/main" val="1674304126"/>
       </p:ext>
     </p:extLst>
   </p:cSld>
@@ -1381,6 +1492,35 @@
           <a:bodyPr/>
           <a:lstStyle/>
           <a:p>
+            <a:r>
+              <a:rPr lang="en-US" dirty="0"/>
+              <a:t>Keep</a:t>
+            </a:r>
+            <a:r>
+              <a:rPr lang="en-US" baseline="0" dirty="0"/>
+              <a:t> in mind that when ASP.NET Membership shipped, it pre-dated things like MVC which didn’t release until much later. So this was a solution that made sense at the time.</a:t>
+            </a:r>
+            <a:endParaRPr lang="en-US" dirty="0"/>
+          </a:p>
+          <a:p>
+            <a:r>
+              <a:rPr lang="en-US" dirty="0"/>
+              <a:t>Really only worked with SQL server. Other relational databases (even MySQL) required custom providers, and trying to write a custom provider for a non-relational database was very difficult</a:t>
+            </a:r>
+          </a:p>
+          <a:p>
+            <a:r>
+              <a:rPr lang="en-US" dirty="0"/>
+              <a:t>Things like roles and passwords were a requirement of the system. This meant no compatibility with things like OAuth, Claims based authentication, etc.</a:t>
+            </a:r>
+          </a:p>
+          <a:p>
+            <a:r>
+              <a:rPr lang="en-US" dirty="0"/>
+              <a:t>Adding fields to users was difficult. The mechanism was user profiles, but they way they worked was weird. Because of the tight coupling with SQL and a specific database schema, additional fields were all stored in a single column, in a relatively cryptic format. Nothing as neat as JSON or even XML. This made querying or reporting on user data overly complicated. And forget about doing SQL joins to any of that.</a:t>
+            </a:r>
+          </a:p>
+          <a:p>
             <a:endParaRPr lang="en-US" dirty="0"/>
           </a:p>
         </p:txBody>
@@ -1402,7 +1542,7 @@
           <a:p>
             <a:fld id="{C16E5CF5-7271-4C13-8455-0600239432B5}" type="slidenum">
               <a:rPr lang="en-US" smtClean="0"/>
-              <a:t>9</a:t>
+              <a:t>5</a:t>
             </a:fld>
             <a:endParaRPr lang="en-US"/>
           </a:p>
@@ -1411,7 +1551,7 @@
     </p:spTree>
     <p:extLst>
       <p:ext uri="{BB962C8B-B14F-4D97-AF65-F5344CB8AC3E}">
-        <p14:creationId xmlns:p14="http://schemas.microsoft.com/office/powerpoint/2010/main" val="1064917578"/>
+        <p14:creationId xmlns:p14="http://schemas.microsoft.com/office/powerpoint/2010/main" val="2463631471"/>
       </p:ext>
     </p:extLst>
   </p:cSld>
@@ -1465,31 +1605,6 @@
           <a:bodyPr/>
           <a:lstStyle/>
           <a:p>
-            <a:pPr marL="0" marR="0" lvl="0" indent="0" algn="l" defTabSz="914400" rtl="0" eaLnBrk="1" fontAlgn="auto" latinLnBrk="0" hangingPunct="1">
-              <a:lnSpc>
-                <a:spcPct val="100000"/>
-              </a:lnSpc>
-              <a:spcBef>
-                <a:spcPts val="0"/>
-              </a:spcBef>
-              <a:spcAft>
-                <a:spcPts val="0"/>
-              </a:spcAft>
-              <a:buClrTx/>
-              <a:buSzTx/>
-              <a:buFontTx/>
-              <a:buNone/>
-              <a:tabLst/>
-              <a:defRPr/>
-            </a:pPr>
-            <a:r>
-              <a:rPr lang="en-US" dirty="0"/>
-              <a:t>It</a:t>
-            </a:r>
-            <a:r>
-              <a:rPr lang="en-US" baseline="0" dirty="0"/>
-              <a:t> all starts when you go to your browser and type in the url to your favorite website. Behind the scenes, your browser will make a request, and the website will respond with an HTTP 200 (OK). The body of the response will contain the HTML needed to construct the page in your browser.</a:t>
-            </a:r>
             <a:endParaRPr lang="en-US" dirty="0"/>
           </a:p>
         </p:txBody>
@@ -1511,7 +1626,7 @@
           <a:p>
             <a:fld id="{C16E5CF5-7271-4C13-8455-0600239432B5}" type="slidenum">
               <a:rPr lang="en-US" smtClean="0"/>
-              <a:t>11</a:t>
+              <a:t>9</a:t>
             </a:fld>
             <a:endParaRPr lang="en-US"/>
           </a:p>
@@ -1520,7 +1635,7 @@
     </p:spTree>
     <p:extLst>
       <p:ext uri="{BB962C8B-B14F-4D97-AF65-F5344CB8AC3E}">
-        <p14:creationId xmlns:p14="http://schemas.microsoft.com/office/powerpoint/2010/main" val="3989136874"/>
+        <p14:creationId xmlns:p14="http://schemas.microsoft.com/office/powerpoint/2010/main" val="1064917578"/>
       </p:ext>
     </p:extLst>
   </p:cSld>
@@ -1574,13 +1689,30 @@
           <a:bodyPr/>
           <a:lstStyle/>
           <a:p>
+            <a:pPr marL="0" marR="0" lvl="0" indent="0" algn="l" defTabSz="914400" rtl="0" eaLnBrk="1" fontAlgn="auto" latinLnBrk="0" hangingPunct="1">
+              <a:lnSpc>
+                <a:spcPct val="100000"/>
+              </a:lnSpc>
+              <a:spcBef>
+                <a:spcPts val="0"/>
+              </a:spcBef>
+              <a:spcAft>
+                <a:spcPts val="0"/>
+              </a:spcAft>
+              <a:buClrTx/>
+              <a:buSzTx/>
+              <a:buFontTx/>
+              <a:buNone/>
+              <a:tabLst/>
+              <a:defRPr/>
+            </a:pPr>
             <a:r>
               <a:rPr lang="en-US" dirty="0"/>
-              <a:t>Let’s say you then click on a link that takes you to a protected part of the website. You can think of</a:t>
+              <a:t>It</a:t>
             </a:r>
             <a:r>
               <a:rPr lang="en-US" baseline="0" dirty="0"/>
-              <a:t> this as being an Action with an [Authorize] attribute surrounding it. The server will examine the request and determine if it’s an authenticated request. Using cookie authentication, it is looking for a specific cookie that should contain some kind of token that it can correlate to a user and validate. Since this request has no cookie, authentication fails, and the server responds with a 302 (redirect) to the login page.</a:t>
+              <a:t> all starts when you go to your browser and type in the url to your favorite website. Behind the scenes, your browser will make a request, and the website will respond with an HTTP 200 (OK). The body of the response will contain the HTML needed to construct the page in your browser.</a:t>
             </a:r>
             <a:endParaRPr lang="en-US" dirty="0"/>
           </a:p>
@@ -1603,7 +1735,7 @@
           <a:p>
             <a:fld id="{C16E5CF5-7271-4C13-8455-0600239432B5}" type="slidenum">
               <a:rPr lang="en-US" smtClean="0"/>
-              <a:t>12</a:t>
+              <a:t>10</a:t>
             </a:fld>
             <a:endParaRPr lang="en-US"/>
           </a:p>
@@ -1612,7 +1744,7 @@
     </p:spTree>
     <p:extLst>
       <p:ext uri="{BB962C8B-B14F-4D97-AF65-F5344CB8AC3E}">
-        <p14:creationId xmlns:p14="http://schemas.microsoft.com/office/powerpoint/2010/main" val="3499351020"/>
+        <p14:creationId xmlns:p14="http://schemas.microsoft.com/office/powerpoint/2010/main" val="3989136874"/>
       </p:ext>
     </p:extLst>
   </p:cSld>
@@ -1695,7 +1827,7 @@
           <a:p>
             <a:fld id="{C16E5CF5-7271-4C13-8455-0600239432B5}" type="slidenum">
               <a:rPr lang="en-US" smtClean="0"/>
-              <a:t>13</a:t>
+              <a:t>11</a:t>
             </a:fld>
             <a:endParaRPr lang="en-US"/>
           </a:p>
@@ -1704,7 +1836,7 @@
     </p:spTree>
     <p:extLst>
       <p:ext uri="{BB962C8B-B14F-4D97-AF65-F5344CB8AC3E}">
-        <p14:creationId xmlns:p14="http://schemas.microsoft.com/office/powerpoint/2010/main" val="3113043242"/>
+        <p14:creationId xmlns:p14="http://schemas.microsoft.com/office/powerpoint/2010/main" val="3499351020"/>
       </p:ext>
     </p:extLst>
   </p:cSld>
@@ -1787,7 +1919,7 @@
           <a:p>
             <a:fld id="{C16E5CF5-7271-4C13-8455-0600239432B5}" type="slidenum">
               <a:rPr lang="en-US" smtClean="0"/>
-              <a:t>14</a:t>
+              <a:t>12</a:t>
             </a:fld>
             <a:endParaRPr lang="en-US"/>
           </a:p>
@@ -1796,7 +1928,7 @@
     </p:spTree>
     <p:extLst>
       <p:ext uri="{BB962C8B-B14F-4D97-AF65-F5344CB8AC3E}">
-        <p14:creationId xmlns:p14="http://schemas.microsoft.com/office/powerpoint/2010/main" val="3407336804"/>
+        <p14:creationId xmlns:p14="http://schemas.microsoft.com/office/powerpoint/2010/main" val="3113043242"/>
       </p:ext>
     </p:extLst>
   </p:cSld>
@@ -2032,7 +2164,7 @@
           <a:p>
             <a:fld id="{96DFF08F-DC6B-4601-B491-B0F83F6DD2DA}" type="datetimeFigureOut">
               <a:rPr lang="en-US" dirty="0"/>
-              <a:t>1/14/2017</a:t>
+              <a:t>8/8/2018</a:t>
             </a:fld>
             <a:endParaRPr lang="en-US" dirty="0"/>
           </a:p>
@@ -2235,7 +2367,7 @@
           <a:p>
             <a:fld id="{96DFF08F-DC6B-4601-B491-B0F83F6DD2DA}" type="datetimeFigureOut">
               <a:rPr lang="en-US" dirty="0"/>
-              <a:t>1/14/2017</a:t>
+              <a:t>8/8/2018</a:t>
             </a:fld>
             <a:endParaRPr lang="en-US" dirty="0"/>
           </a:p>
@@ -2486,7 +2618,7 @@
           <a:p>
             <a:fld id="{96DFF08F-DC6B-4601-B491-B0F83F6DD2DA}" type="datetimeFigureOut">
               <a:rPr lang="en-US" dirty="0"/>
-              <a:t>1/14/2017</a:t>
+              <a:t>8/8/2018</a:t>
             </a:fld>
             <a:endParaRPr lang="en-US" dirty="0"/>
           </a:p>
@@ -2651,7 +2783,7 @@
           <a:p>
             <a:fld id="{D62CEF3B-A037-46D0-B02C-1428F07E9383}" type="datetimeFigureOut">
               <a:rPr lang="en-US" dirty="0"/>
-              <a:t>1/14/2017</a:t>
+              <a:t>8/8/2018</a:t>
             </a:fld>
             <a:endParaRPr lang="en-US" dirty="0"/>
           </a:p>
@@ -2989,7 +3121,7 @@
           <a:p>
             <a:fld id="{96DFF08F-DC6B-4601-B491-B0F83F6DD2DA}" type="datetimeFigureOut">
               <a:rPr lang="en-US" dirty="0"/>
-              <a:t>1/14/2017</a:t>
+              <a:t>8/8/2018</a:t>
             </a:fld>
             <a:endParaRPr lang="en-US" dirty="0"/>
           </a:p>
@@ -3259,7 +3391,7 @@
           <a:p>
             <a:fld id="{96DFF08F-DC6B-4601-B491-B0F83F6DD2DA}" type="datetimeFigureOut">
               <a:rPr lang="en-US" dirty="0"/>
-              <a:t>1/14/2017</a:t>
+              <a:t>8/8/2018</a:t>
             </a:fld>
             <a:endParaRPr lang="en-US" dirty="0"/>
           </a:p>
@@ -3633,7 +3765,7 @@
           <a:p>
             <a:fld id="{96DFF08F-DC6B-4601-B491-B0F83F6DD2DA}" type="datetimeFigureOut">
               <a:rPr lang="en-US" dirty="0"/>
-              <a:t>1/14/2017</a:t>
+              <a:t>8/8/2018</a:t>
             </a:fld>
             <a:endParaRPr lang="en-US" dirty="0"/>
           </a:p>
@@ -3746,7 +3878,7 @@
           <a:p>
             <a:fld id="{96DFF08F-DC6B-4601-B491-B0F83F6DD2DA}" type="datetimeFigureOut">
               <a:rPr lang="en-US" dirty="0"/>
-              <a:t>1/14/2017</a:t>
+              <a:t>8/8/2018</a:t>
             </a:fld>
             <a:endParaRPr lang="en-US" dirty="0"/>
           </a:p>
@@ -3913,7 +4045,7 @@
             <a:fld id="{96DFF08F-DC6B-4601-B491-B0F83F6DD2DA}" type="datetimeFigureOut">
               <a:rPr lang="en-US" dirty="0"/>
               <a:pPr/>
-              <a:t>1/14/2017</a:t>
+              <a:t>8/8/2018</a:t>
             </a:fld>
             <a:endParaRPr lang="en-US" dirty="0"/>
           </a:p>
@@ -4264,7 +4396,7 @@
             <a:fld id="{96DFF08F-DC6B-4601-B491-B0F83F6DD2DA}" type="datetimeFigureOut">
               <a:rPr lang="en-US" dirty="0"/>
               <a:pPr/>
-              <a:t>1/14/2017</a:t>
+              <a:t>8/8/2018</a:t>
             </a:fld>
             <a:endParaRPr lang="en-US" dirty="0"/>
           </a:p>
@@ -4637,7 +4769,7 @@
           <a:p>
             <a:fld id="{96DFF08F-DC6B-4601-B491-B0F83F6DD2DA}" type="datetimeFigureOut">
               <a:rPr lang="en-US" dirty="0"/>
-              <a:t>1/14/2017</a:t>
+              <a:t>8/8/2018</a:t>
             </a:fld>
             <a:endParaRPr lang="en-US" dirty="0"/>
           </a:p>
@@ -4920,7 +5052,7 @@
             <a:fld id="{96DFF08F-DC6B-4601-B491-B0F83F6DD2DA}" type="datetimeFigureOut">
               <a:rPr lang="en-US" dirty="0"/>
               <a:pPr/>
-              <a:t>1/14/2017</a:t>
+              <a:t>8/8/2018</a:t>
             </a:fld>
             <a:endParaRPr lang="en-US" dirty="0"/>
           </a:p>
@@ -5460,7 +5592,7 @@
             <a:pPr algn="ctr"/>
             <a:r>
               <a:rPr lang="en-US" sz="7200" dirty="0"/>
-              <a:t>Identity Management</a:t>
+              <a:t>Identity</a:t>
             </a:r>
             <a:br>
               <a:rPr lang="en-US" sz="7200" dirty="0"/>
@@ -5474,7 +5606,7 @@
             </a:br>
             <a:r>
               <a:rPr lang="en-US" sz="7200" dirty="0"/>
-              <a:t>ASP.NET Core</a:t>
+              <a:t>ASP.NET Core 2.x</a:t>
             </a:r>
             <a:endParaRPr lang="en-US" sz="4400" dirty="0"/>
           </a:p>
@@ -5830,234 +5962,6 @@
 </file>
 
 <file path=ppt/slides/slide10.xml><?xml version="1.0" encoding="utf-8"?>
-<p:sld xmlns:a="http://schemas.openxmlformats.org/drawingml/2006/main" xmlns:r="http://schemas.openxmlformats.org/officeDocument/2006/relationships" xmlns:p="http://schemas.openxmlformats.org/presentationml/2006/main">
-  <p:cSld>
-    <p:spTree>
-      <p:nvGrpSpPr>
-        <p:cNvPr id="1" name=""/>
-        <p:cNvGrpSpPr/>
-        <p:nvPr/>
-      </p:nvGrpSpPr>
-      <p:grpSpPr>
-        <a:xfrm>
-          <a:off x="0" y="0"/>
-          <a:ext cx="0" cy="0"/>
-          <a:chOff x="0" y="0"/>
-          <a:chExt cx="0" cy="0"/>
-        </a:xfrm>
-      </p:grpSpPr>
-      <p:sp>
-        <p:nvSpPr>
-          <p:cNvPr id="2" name="Title 1"/>
-          <p:cNvSpPr>
-            <a:spLocks noGrp="1"/>
-          </p:cNvSpPr>
-          <p:nvPr>
-            <p:ph type="title"/>
-          </p:nvPr>
-        </p:nvSpPr>
-        <p:spPr/>
-        <p:txBody>
-          <a:bodyPr/>
-          <a:lstStyle/>
-          <a:p>
-            <a:pPr algn="ctr"/>
-            <a:r>
-              <a:rPr lang="en-US" dirty="0"/>
-              <a:t>Not Covering</a:t>
-            </a:r>
-          </a:p>
-        </p:txBody>
-      </p:sp>
-      <p:sp>
-        <p:nvSpPr>
-          <p:cNvPr id="3" name="Content Placeholder 2"/>
-          <p:cNvSpPr>
-            <a:spLocks noGrp="1"/>
-          </p:cNvSpPr>
-          <p:nvPr>
-            <p:ph idx="1"/>
-          </p:nvPr>
-        </p:nvSpPr>
-        <p:spPr>
-          <a:xfrm>
-            <a:off x="752474" y="1845734"/>
-            <a:ext cx="10810875" cy="4023360"/>
-          </a:xfrm>
-        </p:spPr>
-        <p:txBody>
-          <a:bodyPr>
-            <a:noAutofit/>
-          </a:bodyPr>
-          <a:lstStyle/>
-          <a:p>
-            <a:pPr algn="ctr">
-              <a:lnSpc>
-                <a:spcPct val="150000"/>
-              </a:lnSpc>
-            </a:pPr>
-            <a:r>
-              <a:rPr lang="en-US" sz="2400" dirty="0" err="1"/>
-              <a:t>WebForms</a:t>
-            </a:r>
-            <a:endParaRPr lang="en-US" sz="2400" dirty="0"/>
-          </a:p>
-          <a:p>
-            <a:pPr algn="ctr">
-              <a:lnSpc>
-                <a:spcPct val="150000"/>
-              </a:lnSpc>
-            </a:pPr>
-            <a:r>
-              <a:rPr lang="en-US" sz="2400" dirty="0" err="1"/>
-              <a:t>EntityFramework</a:t>
-            </a:r>
-            <a:endParaRPr lang="en-US" sz="2400" dirty="0"/>
-          </a:p>
-        </p:txBody>
-      </p:sp>
-    </p:spTree>
-    <p:extLst>
-      <p:ext uri="{BB962C8B-B14F-4D97-AF65-F5344CB8AC3E}">
-        <p14:creationId xmlns:p14="http://schemas.microsoft.com/office/powerpoint/2010/main" val="2497083202"/>
-      </p:ext>
-    </p:extLst>
-  </p:cSld>
-  <p:clrMapOvr>
-    <a:masterClrMapping/>
-  </p:clrMapOvr>
-  <p:timing>
-    <p:tnLst>
-      <p:par>
-        <p:cTn id="1" dur="indefinite" restart="never" nodeType="tmRoot">
-          <p:childTnLst>
-            <p:seq concurrent="1" nextAc="seek">
-              <p:cTn id="2" dur="indefinite" nodeType="mainSeq">
-                <p:childTnLst>
-                  <p:par>
-                    <p:cTn id="3" fill="hold">
-                      <p:stCondLst>
-                        <p:cond delay="indefinite"/>
-                      </p:stCondLst>
-                      <p:childTnLst>
-                        <p:par>
-                          <p:cTn id="4" fill="hold">
-                            <p:stCondLst>
-                              <p:cond delay="0"/>
-                            </p:stCondLst>
-                            <p:childTnLst>
-                              <p:par>
-                                <p:cTn id="5" presetID="1" presetClass="entr" presetSubtype="0" fill="hold" nodeType="clickEffect">
-                                  <p:stCondLst>
-                                    <p:cond delay="0"/>
-                                  </p:stCondLst>
-                                  <p:childTnLst>
-                                    <p:set>
-                                      <p:cBhvr>
-                                        <p:cTn id="6" dur="1" fill="hold">
-                                          <p:stCondLst>
-                                            <p:cond delay="0"/>
-                                          </p:stCondLst>
-                                        </p:cTn>
-                                        <p:tgtEl>
-                                          <p:spTgt spid="3">
-                                            <p:txEl>
-                                              <p:pRg st="0" end="0"/>
-                                            </p:txEl>
-                                          </p:spTgt>
-                                        </p:tgtEl>
-                                        <p:attrNameLst>
-                                          <p:attrName>style.visibility</p:attrName>
-                                        </p:attrNameLst>
-                                      </p:cBhvr>
-                                      <p:to>
-                                        <p:strVal val="visible"/>
-                                      </p:to>
-                                    </p:set>
-                                  </p:childTnLst>
-                                </p:cTn>
-                              </p:par>
-                            </p:childTnLst>
-                          </p:cTn>
-                        </p:par>
-                      </p:childTnLst>
-                    </p:cTn>
-                  </p:par>
-                  <p:par>
-                    <p:cTn id="7" fill="hold">
-                      <p:stCondLst>
-                        <p:cond delay="indefinite"/>
-                      </p:stCondLst>
-                      <p:childTnLst>
-                        <p:par>
-                          <p:cTn id="8" fill="hold">
-                            <p:stCondLst>
-                              <p:cond delay="0"/>
-                            </p:stCondLst>
-                            <p:childTnLst>
-                              <p:par>
-                                <p:cTn id="9" presetID="1" presetClass="entr" presetSubtype="0" fill="hold" nodeType="clickEffect">
-                                  <p:stCondLst>
-                                    <p:cond delay="0"/>
-                                  </p:stCondLst>
-                                  <p:childTnLst>
-                                    <p:set>
-                                      <p:cBhvr>
-                                        <p:cTn id="10" dur="1" fill="hold">
-                                          <p:stCondLst>
-                                            <p:cond delay="0"/>
-                                          </p:stCondLst>
-                                        </p:cTn>
-                                        <p:tgtEl>
-                                          <p:spTgt spid="3">
-                                            <p:txEl>
-                                              <p:pRg st="1" end="1"/>
-                                            </p:txEl>
-                                          </p:spTgt>
-                                        </p:tgtEl>
-                                        <p:attrNameLst>
-                                          <p:attrName>style.visibility</p:attrName>
-                                        </p:attrNameLst>
-                                      </p:cBhvr>
-                                      <p:to>
-                                        <p:strVal val="visible"/>
-                                      </p:to>
-                                    </p:set>
-                                  </p:childTnLst>
-                                </p:cTn>
-                              </p:par>
-                            </p:childTnLst>
-                          </p:cTn>
-                        </p:par>
-                      </p:childTnLst>
-                    </p:cTn>
-                  </p:par>
-                </p:childTnLst>
-              </p:cTn>
-              <p:prevCondLst>
-                <p:cond evt="onPrev" delay="0">
-                  <p:tgtEl>
-                    <p:sldTgt/>
-                  </p:tgtEl>
-                </p:cond>
-              </p:prevCondLst>
-              <p:nextCondLst>
-                <p:cond evt="onNext" delay="0">
-                  <p:tgtEl>
-                    <p:sldTgt/>
-                  </p:tgtEl>
-                </p:cond>
-              </p:nextCondLst>
-            </p:seq>
-          </p:childTnLst>
-        </p:cTn>
-      </p:par>
-    </p:tnLst>
-  </p:timing>
-</p:sld>
-</file>
-
-<file path=ppt/slides/slide11.xml><?xml version="1.0" encoding="utf-8"?>
 <p:sld xmlns:a="http://schemas.openxmlformats.org/drawingml/2006/main" xmlns:r="http://schemas.openxmlformats.org/officeDocument/2006/relationships" xmlns:p="http://schemas.openxmlformats.org/presentationml/2006/main" showMasterSp="0">
   <p:cSld>
     <p:spTree>
@@ -6090,7 +5994,7 @@
           <a:graphicData uri="http://schemas.openxmlformats.org/presentationml/2006/ole">
             <mc:AlternateContent xmlns:mc="http://schemas.openxmlformats.org/markup-compatibility/2006">
               <mc:Choice xmlns:v="urn:schemas-microsoft-com:vml" Requires="v">
-                <p:oleObj spid="_x0000_s3093" name="Image" r:id="rId4" imgW="1993320" imgH="2298240" progId="Photoshop.Image.16">
+                <p:oleObj spid="_x0000_s1027" name="Image" r:id="rId4" imgW="1993320" imgH="2298240" progId="Photoshop.Image.16">
                   <p:embed/>
                 </p:oleObj>
               </mc:Choice>
@@ -6569,7 +6473,7 @@
 </p:sld>
 </file>
 
-<file path=ppt/slides/slide12.xml><?xml version="1.0" encoding="utf-8"?>
+<file path=ppt/slides/slide11.xml><?xml version="1.0" encoding="utf-8"?>
 <p:sld xmlns:a="http://schemas.openxmlformats.org/drawingml/2006/main" xmlns:r="http://schemas.openxmlformats.org/officeDocument/2006/relationships" xmlns:p="http://schemas.openxmlformats.org/presentationml/2006/main" showMasterSp="0">
   <p:cSld>
     <p:spTree>
@@ -6608,7 +6512,7 @@
           <a:graphicData uri="http://schemas.openxmlformats.org/presentationml/2006/ole">
             <mc:AlternateContent xmlns:mc="http://schemas.openxmlformats.org/markup-compatibility/2006">
               <mc:Choice xmlns:v="urn:schemas-microsoft-com:vml" Requires="v">
-                <p:oleObj spid="_x0000_s2070" name="Image" r:id="rId4" imgW="1993320" imgH="2298240" progId="Photoshop.Image.16">
+                <p:oleObj spid="_x0000_s2051" name="Image" r:id="rId4" imgW="1993320" imgH="2298240" progId="Photoshop.Image.16">
                   <p:embed/>
                 </p:oleObj>
               </mc:Choice>
@@ -6848,7 +6752,7 @@
 </p:sld>
 </file>
 
-<file path=ppt/slides/slide13.xml><?xml version="1.0" encoding="utf-8"?>
+<file path=ppt/slides/slide12.xml><?xml version="1.0" encoding="utf-8"?>
 <p:sld xmlns:a="http://schemas.openxmlformats.org/drawingml/2006/main" xmlns:r="http://schemas.openxmlformats.org/officeDocument/2006/relationships" xmlns:p="http://schemas.openxmlformats.org/presentationml/2006/main" showMasterSp="0">
   <p:cSld>
     <p:spTree>
@@ -6911,7 +6815,7 @@
           <a:graphicData uri="http://schemas.openxmlformats.org/presentationml/2006/ole">
             <mc:AlternateContent xmlns:mc="http://schemas.openxmlformats.org/markup-compatibility/2006">
               <mc:Choice xmlns:v="urn:schemas-microsoft-com:vml" Requires="v">
-                <p:oleObj spid="_x0000_s7186" name="Image" r:id="rId5" imgW="1993320" imgH="2298240" progId="Photoshop.Image.16">
+                <p:oleObj spid="_x0000_s3075" name="Image" r:id="rId5" imgW="1993320" imgH="2298240" progId="Photoshop.Image.16">
                   <p:embed/>
                 </p:oleObj>
               </mc:Choice>
@@ -6920,7 +6824,7 @@
                   <p:embed/>
                   <p:pic>
                     <p:nvPicPr>
-                      <p:cNvPr id="23" name="Object 22"/>
+                      <p:cNvPr id="11" name="Object 10"/>
                       <p:cNvPicPr/>
                       <p:nvPr/>
                     </p:nvPicPr>
@@ -7301,7 +7205,7 @@
 </p:sld>
 </file>
 
-<file path=ppt/slides/slide14.xml><?xml version="1.0" encoding="utf-8"?>
+<file path=ppt/slides/slide13.xml><?xml version="1.0" encoding="utf-8"?>
 <p:sld xmlns:a="http://schemas.openxmlformats.org/drawingml/2006/main" xmlns:r="http://schemas.openxmlformats.org/officeDocument/2006/relationships" xmlns:p="http://schemas.openxmlformats.org/presentationml/2006/main" showMasterSp="0">
   <p:cSld>
     <p:spTree>
@@ -7358,7 +7262,7 @@
           <a:graphicData uri="http://schemas.openxmlformats.org/presentationml/2006/ole">
             <mc:AlternateContent xmlns:mc="http://schemas.openxmlformats.org/markup-compatibility/2006">
               <mc:Choice xmlns:v="urn:schemas-microsoft-com:vml" Requires="v">
-                <p:oleObj spid="_x0000_s8210" name="Image" r:id="rId5" imgW="1993320" imgH="2298240" progId="Photoshop.Image.16">
+                <p:oleObj spid="_x0000_s4099" name="Image" r:id="rId5" imgW="1993320" imgH="2298240" progId="Photoshop.Image.16">
                   <p:embed/>
                 </p:oleObj>
               </mc:Choice>
@@ -7651,7 +7555,7 @@
 </p:sld>
 </file>
 
-<file path=ppt/slides/slide15.xml><?xml version="1.0" encoding="utf-8"?>
+<file path=ppt/slides/slide14.xml><?xml version="1.0" encoding="utf-8"?>
 <p:sld xmlns:a="http://schemas.openxmlformats.org/drawingml/2006/main" xmlns:r="http://schemas.openxmlformats.org/officeDocument/2006/relationships" xmlns:p="http://schemas.openxmlformats.org/presentationml/2006/main" showMasterSp="0">
   <p:cSld>
     <p:spTree>
@@ -7684,7 +7588,7 @@
           <a:graphicData uri="http://schemas.openxmlformats.org/presentationml/2006/ole">
             <mc:AlternateContent xmlns:mc="http://schemas.openxmlformats.org/markup-compatibility/2006">
               <mc:Choice xmlns:v="urn:schemas-microsoft-com:vml" Requires="v">
-                <p:oleObj spid="_x0000_s4118" name="Image" r:id="rId4" imgW="1993320" imgH="2298240" progId="Photoshop.Image.16">
+                <p:oleObj spid="_x0000_s5123" name="Image" r:id="rId4" imgW="1993320" imgH="2298240" progId="Photoshop.Image.16">
                   <p:embed/>
                 </p:oleObj>
               </mc:Choice>
@@ -8136,7 +8040,7 @@
 </p:sld>
 </file>
 
-<file path=ppt/slides/slide16.xml><?xml version="1.0" encoding="utf-8"?>
+<file path=ppt/slides/slide15.xml><?xml version="1.0" encoding="utf-8"?>
 <p:sld xmlns:a="http://schemas.openxmlformats.org/drawingml/2006/main" xmlns:r="http://schemas.openxmlformats.org/officeDocument/2006/relationships" xmlns:p="http://schemas.openxmlformats.org/presentationml/2006/main" showMasterSp="0">
   <p:cSld>
     <p:spTree>
@@ -8169,7 +8073,7 @@
           <a:graphicData uri="http://schemas.openxmlformats.org/presentationml/2006/ole">
             <mc:AlternateContent xmlns:mc="http://schemas.openxmlformats.org/markup-compatibility/2006">
               <mc:Choice xmlns:v="urn:schemas-microsoft-com:vml" Requires="v">
-                <p:oleObj spid="_x0000_s5140" name="Image" r:id="rId4" imgW="1993320" imgH="2298240" progId="Photoshop.Image.16">
+                <p:oleObj spid="_x0000_s6147" name="Image" r:id="rId4" imgW="1993320" imgH="2298240" progId="Photoshop.Image.16">
                   <p:embed/>
                 </p:oleObj>
               </mc:Choice>
@@ -8778,7 +8682,7 @@
 </p:sld>
 </file>
 
-<file path=ppt/slides/slide17.xml><?xml version="1.0" encoding="utf-8"?>
+<file path=ppt/slides/slide16.xml><?xml version="1.0" encoding="utf-8"?>
 <p:sld xmlns:a="http://schemas.openxmlformats.org/drawingml/2006/main" xmlns:r="http://schemas.openxmlformats.org/officeDocument/2006/relationships" xmlns:p="http://schemas.openxmlformats.org/presentationml/2006/main" showMasterSp="0">
   <p:cSld>
     <p:spTree>
@@ -8811,7 +8715,7 @@
           <a:graphicData uri="http://schemas.openxmlformats.org/presentationml/2006/ole">
             <mc:AlternateContent xmlns:mc="http://schemas.openxmlformats.org/markup-compatibility/2006">
               <mc:Choice xmlns:v="urn:schemas-microsoft-com:vml" Requires="v">
-                <p:oleObj spid="_x0000_s6163" name="Image" r:id="rId4" imgW="1993320" imgH="2298240" progId="Photoshop.Image.16">
+                <p:oleObj spid="_x0000_s7171" name="Image" r:id="rId4" imgW="1993320" imgH="2298240" progId="Photoshop.Image.16">
                   <p:embed/>
                 </p:oleObj>
               </mc:Choice>
@@ -9350,7 +9254,7 @@
 </p:sld>
 </file>
 
-<file path=ppt/slides/slide18.xml><?xml version="1.0" encoding="utf-8"?>
+<file path=ppt/slides/slide17.xml><?xml version="1.0" encoding="utf-8"?>
 <p:sld xmlns:a="http://schemas.openxmlformats.org/drawingml/2006/main" xmlns:r="http://schemas.openxmlformats.org/officeDocument/2006/relationships" xmlns:p="http://schemas.openxmlformats.org/presentationml/2006/main">
   <p:cSld>
     <p:spTree>
@@ -9369,7 +9273,7 @@
       </p:grpSpPr>
       <p:sp>
         <p:nvSpPr>
-          <p:cNvPr id="2" name="Title 1"/>
+          <p:cNvPr id="4" name="Title 3"/>
           <p:cNvSpPr>
             <a:spLocks noGrp="1"/>
           </p:cNvSpPr>
@@ -9377,156 +9281,53 @@
             <p:ph type="title"/>
           </p:nvPr>
         </p:nvSpPr>
-        <p:spPr/>
+        <p:spPr>
+          <a:xfrm>
+            <a:off x="1097280" y="758952"/>
+            <a:ext cx="10058400" cy="3165348"/>
+          </a:xfrm>
+        </p:spPr>
         <p:txBody>
           <a:bodyPr/>
           <a:lstStyle/>
           <a:p>
             <a:r>
               <a:rPr lang="en-US" dirty="0"/>
-              <a:t>Code Samples</a:t>
+              <a:t>Demo Time</a:t>
             </a:r>
           </a:p>
         </p:txBody>
       </p:sp>
       <p:sp>
         <p:nvSpPr>
-          <p:cNvPr id="3" name="Content Placeholder 2"/>
+          <p:cNvPr id="5" name="Text Placeholder 4"/>
           <p:cNvSpPr>
             <a:spLocks noGrp="1"/>
           </p:cNvSpPr>
           <p:nvPr>
-            <p:ph idx="1"/>
+            <p:ph type="body" idx="1"/>
           </p:nvPr>
         </p:nvSpPr>
-        <p:spPr/>
+        <p:spPr>
+          <a:xfrm>
+            <a:off x="1097279" y="4400527"/>
+            <a:ext cx="10214885" cy="2123313"/>
+          </a:xfrm>
+        </p:spPr>
         <p:txBody>
           <a:bodyPr>
             <a:normAutofit/>
           </a:bodyPr>
           <a:lstStyle/>
           <a:p>
-            <a:r>
-              <a:rPr lang="en-US" sz="2400" dirty="0"/>
-              <a:t>All code samples are created in </a:t>
-            </a:r>
-            <a:r>
-              <a:rPr lang="en-US" sz="2400" b="1" dirty="0">
-                <a:solidFill>
-                  <a:srgbClr val="0000FF"/>
-                </a:solidFill>
-              </a:rPr>
-              <a:t>Visual Studio 2015 Update 3</a:t>
-            </a:r>
-            <a:r>
-              <a:rPr lang="en-US" sz="2400" dirty="0"/>
-              <a:t>.</a:t>
-            </a:r>
-          </a:p>
-          <a:p>
-            <a:r>
-              <a:rPr lang="en-US" sz="2400" dirty="0"/>
-              <a:t>The project template is the </a:t>
-            </a:r>
-            <a:r>
-              <a:rPr lang="en-US" sz="2400" b="1" dirty="0">
-                <a:solidFill>
-                  <a:srgbClr val="0000FF"/>
-                </a:solidFill>
-              </a:rPr>
-              <a:t>ASP.NET Core Web Application (.NET Framework)</a:t>
-            </a:r>
-            <a:r>
-              <a:rPr lang="en-US" sz="2400" dirty="0"/>
-              <a:t> under </a:t>
-            </a:r>
-            <a:r>
-              <a:rPr lang="en-US" sz="2400" b="1" dirty="0">
-                <a:solidFill>
-                  <a:srgbClr val="0000FF"/>
-                </a:solidFill>
-              </a:rPr>
-              <a:t>.NET Framework 4.6.2</a:t>
-            </a:r>
-            <a:r>
-              <a:rPr lang="en-US" sz="2400" dirty="0"/>
-              <a:t>, and using the </a:t>
-            </a:r>
-            <a:r>
-              <a:rPr lang="en-US" sz="2400" b="1" dirty="0">
-                <a:solidFill>
-                  <a:srgbClr val="0000FF"/>
-                </a:solidFill>
-              </a:rPr>
-              <a:t>MVC</a:t>
-            </a:r>
-            <a:r>
-              <a:rPr lang="en-US" sz="2400" dirty="0"/>
-              <a:t> template with </a:t>
-            </a:r>
-            <a:r>
-              <a:rPr lang="en-US" sz="2400" b="1" dirty="0">
-                <a:solidFill>
-                  <a:srgbClr val="0000FF"/>
-                </a:solidFill>
-              </a:rPr>
-              <a:t>No Authentication</a:t>
-            </a:r>
-            <a:r>
-              <a:rPr lang="en-US" sz="2400" dirty="0"/>
-              <a:t>.</a:t>
-            </a:r>
-          </a:p>
-          <a:p>
-            <a:r>
-              <a:rPr lang="en-US" sz="2400" dirty="0"/>
-              <a:t>I chose to use </a:t>
-            </a:r>
-            <a:r>
-              <a:rPr lang="en-US" sz="2400" b="1" dirty="0">
-                <a:solidFill>
-                  <a:srgbClr val="0000FF"/>
-                </a:solidFill>
-              </a:rPr>
-              <a:t>No Authentication</a:t>
-            </a:r>
-            <a:r>
-              <a:rPr lang="en-US" sz="2400" dirty="0"/>
-              <a:t> because the templates including authentication are coupled with EF, including some implementations sitting in the </a:t>
-            </a:r>
-            <a:r>
-              <a:rPr lang="en-US" sz="2400" dirty="0" err="1"/>
-              <a:t>Microsoft.AspNetCore.Identity.EntityFrameworkCore</a:t>
-            </a:r>
-            <a:r>
-              <a:rPr lang="en-US" sz="2400" dirty="0"/>
-              <a:t> namespace. This muddies the waters and makes it difficult to see the separation between Identity and the data layer.</a:t>
-            </a:r>
-          </a:p>
-          <a:p>
-            <a:r>
-              <a:rPr lang="en-US" sz="2400" dirty="0"/>
-              <a:t>Let’s code!</a:t>
-            </a:r>
-          </a:p>
-          <a:p>
-            <a:endParaRPr lang="en-US" sz="2400" dirty="0"/>
-          </a:p>
-          <a:p>
-            <a:pPr marL="0" indent="0">
-              <a:buNone/>
-            </a:pPr>
-            <a:endParaRPr lang="en-US" sz="2400" dirty="0"/>
-          </a:p>
-          <a:p>
-            <a:endParaRPr lang="en-US" sz="2400" dirty="0"/>
+            <a:endParaRPr lang="en-US" dirty="0"/>
           </a:p>
         </p:txBody>
       </p:sp>
     </p:spTree>
     <p:extLst>
       <p:ext uri="{BB962C8B-B14F-4D97-AF65-F5344CB8AC3E}">
-        <p14:creationId xmlns:p14="http://schemas.microsoft.com/office/powerpoint/2010/main" val="4062784622"/>
+        <p14:creationId xmlns:p14="http://schemas.microsoft.com/office/powerpoint/2010/main" val="957100005"/>
       </p:ext>
     </p:extLst>
   </p:cSld>
@@ -9536,7 +9337,7 @@
 </p:sld>
 </file>
 
-<file path=ppt/slides/slide19.xml><?xml version="1.0" encoding="utf-8"?>
+<file path=ppt/slides/slide18.xml><?xml version="1.0" encoding="utf-8"?>
 <p:sld xmlns:a="http://schemas.openxmlformats.org/drawingml/2006/main" xmlns:r="http://schemas.openxmlformats.org/officeDocument/2006/relationships" xmlns:p="http://schemas.openxmlformats.org/presentationml/2006/main" showMasterSp="0">
   <p:cSld>
     <p:spTree>
@@ -10466,858 +10267,7 @@
 </p:sld>
 </file>
 
-<file path=ppt/slides/slide2.xml><?xml version="1.0" encoding="utf-8"?>
-<p:sld xmlns:a="http://schemas.openxmlformats.org/drawingml/2006/main" xmlns:r="http://schemas.openxmlformats.org/officeDocument/2006/relationships" xmlns:p="http://schemas.openxmlformats.org/presentationml/2006/main">
-  <p:cSld>
-    <p:spTree>
-      <p:nvGrpSpPr>
-        <p:cNvPr id="1" name=""/>
-        <p:cNvGrpSpPr/>
-        <p:nvPr/>
-      </p:nvGrpSpPr>
-      <p:grpSpPr>
-        <a:xfrm>
-          <a:off x="0" y="0"/>
-          <a:ext cx="0" cy="0"/>
-          <a:chOff x="0" y="0"/>
-          <a:chExt cx="0" cy="0"/>
-        </a:xfrm>
-      </p:grpSpPr>
-      <p:sp>
-        <p:nvSpPr>
-          <p:cNvPr id="3" name="Subtitle 2"/>
-          <p:cNvSpPr>
-            <a:spLocks noGrp="1"/>
-          </p:cNvSpPr>
-          <p:nvPr>
-            <p:ph type="subTitle" idx="1"/>
-          </p:nvPr>
-        </p:nvSpPr>
-        <p:spPr>
-          <a:xfrm>
-            <a:off x="789973" y="218949"/>
-            <a:ext cx="10639605" cy="1403169"/>
-          </a:xfrm>
-        </p:spPr>
-        <p:txBody>
-          <a:bodyPr numCol="1">
-            <a:normAutofit/>
-          </a:bodyPr>
-          <a:lstStyle/>
-          <a:p>
-            <a:r>
-              <a:rPr lang="en-US" sz="8000" dirty="0"/>
-              <a:t>Ondrej  balas</a:t>
-            </a:r>
-            <a:endParaRPr lang="en-US" sz="5400" dirty="0"/>
-          </a:p>
-        </p:txBody>
-      </p:sp>
-      <p:pic>
-        <p:nvPicPr>
-          <p:cNvPr id="6" name="Picture 3" descr="J:\UTD\Logo\1.png"/>
-          <p:cNvPicPr>
-            <a:picLocks noChangeAspect="1" noChangeArrowheads="1"/>
-          </p:cNvPicPr>
-          <p:nvPr/>
-        </p:nvPicPr>
-        <p:blipFill>
-          <a:blip r:embed="rId2" cstate="print">
-            <a:extLst>
-              <a:ext uri="{28A0092B-C50C-407E-A947-70E740481C1C}">
-                <a14:useLocalDpi xmlns:a14="http://schemas.microsoft.com/office/drawing/2010/main" val="0"/>
-              </a:ext>
-            </a:extLst>
-          </a:blip>
-          <a:srcRect/>
-          <a:stretch>
-            <a:fillRect/>
-          </a:stretch>
-        </p:blipFill>
-        <p:spPr bwMode="auto">
-          <a:xfrm>
-            <a:off x="870527" y="4388693"/>
-            <a:ext cx="2667000" cy="2000563"/>
-          </a:xfrm>
-          <a:prstGeom prst="rect">
-            <a:avLst/>
-          </a:prstGeom>
-          <a:noFill/>
-          <a:extLst>
-            <a:ext uri="{909E8E84-426E-40DD-AFC4-6F175D3DCCD1}">
-              <a14:hiddenFill xmlns:a14="http://schemas.microsoft.com/office/drawing/2010/main">
-                <a:solidFill>
-                  <a:srgbClr val="FFFFFF"/>
-                </a:solidFill>
-              </a14:hiddenFill>
-            </a:ext>
-          </a:extLst>
-        </p:spPr>
-      </p:pic>
-      <p:pic>
-        <p:nvPicPr>
-          <p:cNvPr id="7" name="Picture 2" descr="http://nullquest.com/img/obalas.jpg"/>
-          <p:cNvPicPr>
-            <a:picLocks noChangeAspect="1" noChangeArrowheads="1"/>
-          </p:cNvPicPr>
-          <p:nvPr/>
-        </p:nvPicPr>
-        <p:blipFill>
-          <a:blip r:embed="rId3">
-            <a:extLst>
-              <a:ext uri="{28A0092B-C50C-407E-A947-70E740481C1C}">
-                <a14:useLocalDpi xmlns:a14="http://schemas.microsoft.com/office/drawing/2010/main" val="0"/>
-              </a:ext>
-            </a:extLst>
-          </a:blip>
-          <a:srcRect/>
-          <a:stretch>
-            <a:fillRect/>
-          </a:stretch>
-        </p:blipFill>
-        <p:spPr bwMode="auto">
-          <a:xfrm>
-            <a:off x="8725975" y="1187827"/>
-            <a:ext cx="2814365" cy="2814365"/>
-          </a:xfrm>
-          <a:prstGeom prst="rect">
-            <a:avLst/>
-          </a:prstGeom>
-          <a:noFill/>
-          <a:extLst>
-            <a:ext uri="{909E8E84-426E-40DD-AFC4-6F175D3DCCD1}">
-              <a14:hiddenFill xmlns:a14="http://schemas.microsoft.com/office/drawing/2010/main">
-                <a:solidFill>
-                  <a:srgbClr val="FFFFFF"/>
-                </a:solidFill>
-              </a14:hiddenFill>
-            </a:ext>
-          </a:extLst>
-        </p:spPr>
-      </p:pic>
-      <p:pic>
-        <p:nvPicPr>
-          <p:cNvPr id="6146" name="Picture 2" descr="http://timradney.com/wp-content/uploads/2014/06/1780-mvp_horizontal_fullcolor-550x0.png"/>
-          <p:cNvPicPr>
-            <a:picLocks noChangeAspect="1" noChangeArrowheads="1"/>
-          </p:cNvPicPr>
-          <p:nvPr/>
-        </p:nvPicPr>
-        <p:blipFill>
-          <a:blip r:embed="rId4">
-            <a:extLst>
-              <a:ext uri="{28A0092B-C50C-407E-A947-70E740481C1C}">
-                <a14:useLocalDpi xmlns:a14="http://schemas.microsoft.com/office/drawing/2010/main" val="0"/>
-              </a:ext>
-            </a:extLst>
-          </a:blip>
-          <a:srcRect/>
-          <a:stretch>
-            <a:fillRect/>
-          </a:stretch>
-        </p:blipFill>
-        <p:spPr bwMode="auto">
-          <a:xfrm>
-            <a:off x="8650662" y="4834443"/>
-            <a:ext cx="2889678" cy="1166379"/>
-          </a:xfrm>
-          <a:prstGeom prst="rect">
-            <a:avLst/>
-          </a:prstGeom>
-          <a:noFill/>
-          <a:extLst>
-            <a:ext uri="{909E8E84-426E-40DD-AFC4-6F175D3DCCD1}">
-              <a14:hiddenFill xmlns:a14="http://schemas.microsoft.com/office/drawing/2010/main">
-                <a:solidFill>
-                  <a:srgbClr val="FFFFFF"/>
-                </a:solidFill>
-              </a14:hiddenFill>
-            </a:ext>
-          </a:extLst>
-        </p:spPr>
-      </p:pic>
-      <p:sp>
-        <p:nvSpPr>
-          <p:cNvPr id="12" name="Subtitle 2"/>
-          <p:cNvSpPr txBox="1">
-            <a:spLocks/>
-          </p:cNvSpPr>
-          <p:nvPr/>
-        </p:nvSpPr>
-        <p:spPr>
-          <a:xfrm>
-            <a:off x="1293091" y="1627292"/>
-            <a:ext cx="7825509" cy="2374900"/>
-          </a:xfrm>
-          <a:prstGeom prst="rect">
-            <a:avLst/>
-          </a:prstGeom>
-        </p:spPr>
-        <p:txBody>
-          <a:bodyPr vert="horz" lIns="91440" tIns="45720" rIns="91440" bIns="45720" numCol="1" rtlCol="0">
-            <a:noAutofit/>
-          </a:bodyPr>
-          <a:lstStyle>
-            <a:lvl1pPr marL="0" indent="0" algn="l" defTabSz="914400" rtl="0" eaLnBrk="1" latinLnBrk="0" hangingPunct="1">
-              <a:lnSpc>
-                <a:spcPct val="90000"/>
-              </a:lnSpc>
-              <a:spcBef>
-                <a:spcPts val="1200"/>
-              </a:spcBef>
-              <a:spcAft>
-                <a:spcPts val="200"/>
-              </a:spcAft>
-              <a:buClr>
-                <a:schemeClr val="accent1"/>
-              </a:buClr>
-              <a:buSzPct val="100000"/>
-              <a:buFont typeface="Calibri" panose="020F0502020204030204" pitchFamily="34" charset="0"/>
-              <a:buNone/>
-              <a:defRPr sz="2400" kern="1200" cap="all" spc="200" baseline="0">
-                <a:solidFill>
-                  <a:schemeClr val="tx2"/>
-                </a:solidFill>
-                <a:latin typeface="+mj-lt"/>
-                <a:ea typeface="+mn-ea"/>
-                <a:cs typeface="+mn-cs"/>
-              </a:defRPr>
-            </a:lvl1pPr>
-            <a:lvl2pPr marL="457200" indent="0" algn="ctr" defTabSz="914400" rtl="0" eaLnBrk="1" latinLnBrk="0" hangingPunct="1">
-              <a:lnSpc>
-                <a:spcPct val="90000"/>
-              </a:lnSpc>
-              <a:spcBef>
-                <a:spcPts val="200"/>
-              </a:spcBef>
-              <a:spcAft>
-                <a:spcPts val="400"/>
-              </a:spcAft>
-              <a:buClr>
-                <a:schemeClr val="accent1"/>
-              </a:buClr>
-              <a:buFont typeface="Calibri" pitchFamily="34" charset="0"/>
-              <a:buNone/>
-              <a:defRPr sz="2400" kern="1200">
-                <a:solidFill>
-                  <a:schemeClr val="tx1">
-                    <a:lumMod val="75000"/>
-                    <a:lumOff val="25000"/>
-                  </a:schemeClr>
-                </a:solidFill>
-                <a:latin typeface="+mn-lt"/>
-                <a:ea typeface="+mn-ea"/>
-                <a:cs typeface="+mn-cs"/>
-              </a:defRPr>
-            </a:lvl2pPr>
-            <a:lvl3pPr marL="914400" indent="0" algn="ctr" defTabSz="914400" rtl="0" eaLnBrk="1" latinLnBrk="0" hangingPunct="1">
-              <a:lnSpc>
-                <a:spcPct val="90000"/>
-              </a:lnSpc>
-              <a:spcBef>
-                <a:spcPts val="200"/>
-              </a:spcBef>
-              <a:spcAft>
-                <a:spcPts val="400"/>
-              </a:spcAft>
-              <a:buClr>
-                <a:schemeClr val="accent1"/>
-              </a:buClr>
-              <a:buFont typeface="Calibri" pitchFamily="34" charset="0"/>
-              <a:buNone/>
-              <a:defRPr sz="2400" kern="1200">
-                <a:solidFill>
-                  <a:schemeClr val="tx1">
-                    <a:lumMod val="75000"/>
-                    <a:lumOff val="25000"/>
-                  </a:schemeClr>
-                </a:solidFill>
-                <a:latin typeface="+mn-lt"/>
-                <a:ea typeface="+mn-ea"/>
-                <a:cs typeface="+mn-cs"/>
-              </a:defRPr>
-            </a:lvl3pPr>
-            <a:lvl4pPr marL="1371600" indent="0" algn="ctr" defTabSz="914400" rtl="0" eaLnBrk="1" latinLnBrk="0" hangingPunct="1">
-              <a:lnSpc>
-                <a:spcPct val="90000"/>
-              </a:lnSpc>
-              <a:spcBef>
-                <a:spcPts val="200"/>
-              </a:spcBef>
-              <a:spcAft>
-                <a:spcPts val="400"/>
-              </a:spcAft>
-              <a:buClr>
-                <a:schemeClr val="accent1"/>
-              </a:buClr>
-              <a:buFont typeface="Calibri" pitchFamily="34" charset="0"/>
-              <a:buNone/>
-              <a:defRPr sz="2000" kern="1200">
-                <a:solidFill>
-                  <a:schemeClr val="tx1">
-                    <a:lumMod val="75000"/>
-                    <a:lumOff val="25000"/>
-                  </a:schemeClr>
-                </a:solidFill>
-                <a:latin typeface="+mn-lt"/>
-                <a:ea typeface="+mn-ea"/>
-                <a:cs typeface="+mn-cs"/>
-              </a:defRPr>
-            </a:lvl4pPr>
-            <a:lvl5pPr marL="1828800" indent="0" algn="ctr" defTabSz="914400" rtl="0" eaLnBrk="1" latinLnBrk="0" hangingPunct="1">
-              <a:lnSpc>
-                <a:spcPct val="90000"/>
-              </a:lnSpc>
-              <a:spcBef>
-                <a:spcPts val="200"/>
-              </a:spcBef>
-              <a:spcAft>
-                <a:spcPts val="400"/>
-              </a:spcAft>
-              <a:buClr>
-                <a:schemeClr val="accent1"/>
-              </a:buClr>
-              <a:buFont typeface="Calibri" pitchFamily="34" charset="0"/>
-              <a:buNone/>
-              <a:defRPr sz="2000" kern="1200">
-                <a:solidFill>
-                  <a:schemeClr val="tx1">
-                    <a:lumMod val="75000"/>
-                    <a:lumOff val="25000"/>
-                  </a:schemeClr>
-                </a:solidFill>
-                <a:latin typeface="+mn-lt"/>
-                <a:ea typeface="+mn-ea"/>
-                <a:cs typeface="+mn-cs"/>
-              </a:defRPr>
-            </a:lvl5pPr>
-            <a:lvl6pPr marL="2286000" indent="0" algn="ctr" defTabSz="914400" rtl="0" eaLnBrk="1" latinLnBrk="0" hangingPunct="1">
-              <a:lnSpc>
-                <a:spcPct val="90000"/>
-              </a:lnSpc>
-              <a:spcBef>
-                <a:spcPts val="200"/>
-              </a:spcBef>
-              <a:spcAft>
-                <a:spcPts val="400"/>
-              </a:spcAft>
-              <a:buClr>
-                <a:schemeClr val="accent1"/>
-              </a:buClr>
-              <a:buFont typeface="Calibri" pitchFamily="34" charset="0"/>
-              <a:buNone/>
-              <a:defRPr sz="2000" kern="1200">
-                <a:solidFill>
-                  <a:schemeClr val="tx1">
-                    <a:lumMod val="75000"/>
-                    <a:lumOff val="25000"/>
-                  </a:schemeClr>
-                </a:solidFill>
-                <a:latin typeface="+mn-lt"/>
-                <a:ea typeface="+mn-ea"/>
-                <a:cs typeface="+mn-cs"/>
-              </a:defRPr>
-            </a:lvl6pPr>
-            <a:lvl7pPr marL="2743200" indent="0" algn="ctr" defTabSz="914400" rtl="0" eaLnBrk="1" latinLnBrk="0" hangingPunct="1">
-              <a:lnSpc>
-                <a:spcPct val="90000"/>
-              </a:lnSpc>
-              <a:spcBef>
-                <a:spcPts val="200"/>
-              </a:spcBef>
-              <a:spcAft>
-                <a:spcPts val="400"/>
-              </a:spcAft>
-              <a:buClr>
-                <a:schemeClr val="accent1"/>
-              </a:buClr>
-              <a:buFont typeface="Calibri" pitchFamily="34" charset="0"/>
-              <a:buNone/>
-              <a:defRPr sz="2000" kern="1200">
-                <a:solidFill>
-                  <a:schemeClr val="tx1">
-                    <a:lumMod val="75000"/>
-                    <a:lumOff val="25000"/>
-                  </a:schemeClr>
-                </a:solidFill>
-                <a:latin typeface="+mn-lt"/>
-                <a:ea typeface="+mn-ea"/>
-                <a:cs typeface="+mn-cs"/>
-              </a:defRPr>
-            </a:lvl7pPr>
-            <a:lvl8pPr marL="3200400" indent="0" algn="ctr" defTabSz="914400" rtl="0" eaLnBrk="1" latinLnBrk="0" hangingPunct="1">
-              <a:lnSpc>
-                <a:spcPct val="90000"/>
-              </a:lnSpc>
-              <a:spcBef>
-                <a:spcPts val="200"/>
-              </a:spcBef>
-              <a:spcAft>
-                <a:spcPts val="400"/>
-              </a:spcAft>
-              <a:buClr>
-                <a:schemeClr val="accent1"/>
-              </a:buClr>
-              <a:buFont typeface="Calibri" pitchFamily="34" charset="0"/>
-              <a:buNone/>
-              <a:defRPr sz="2000" kern="1200">
-                <a:solidFill>
-                  <a:schemeClr val="tx1">
-                    <a:lumMod val="75000"/>
-                    <a:lumOff val="25000"/>
-                  </a:schemeClr>
-                </a:solidFill>
-                <a:latin typeface="+mn-lt"/>
-                <a:ea typeface="+mn-ea"/>
-                <a:cs typeface="+mn-cs"/>
-              </a:defRPr>
-            </a:lvl8pPr>
-            <a:lvl9pPr marL="3657600" indent="0" algn="ctr" defTabSz="914400" rtl="0" eaLnBrk="1" latinLnBrk="0" hangingPunct="1">
-              <a:lnSpc>
-                <a:spcPct val="90000"/>
-              </a:lnSpc>
-              <a:spcBef>
-                <a:spcPts val="200"/>
-              </a:spcBef>
-              <a:spcAft>
-                <a:spcPts val="400"/>
-              </a:spcAft>
-              <a:buClr>
-                <a:schemeClr val="accent1"/>
-              </a:buClr>
-              <a:buFont typeface="Calibri" pitchFamily="34" charset="0"/>
-              <a:buNone/>
-              <a:defRPr sz="2000" kern="1200">
-                <a:solidFill>
-                  <a:schemeClr val="tx1">
-                    <a:lumMod val="75000"/>
-                    <a:lumOff val="25000"/>
-                  </a:schemeClr>
-                </a:solidFill>
-                <a:latin typeface="+mn-lt"/>
-                <a:ea typeface="+mn-ea"/>
-                <a:cs typeface="+mn-cs"/>
-              </a:defRPr>
-            </a:lvl9pPr>
-          </a:lstStyle>
-          <a:p>
-            <a:r>
-              <a:rPr lang="en-US" cap="none" dirty="0">
-                <a:latin typeface="FontAwesome" pitchFamily="50" charset="0"/>
-              </a:rPr>
-              <a:t></a:t>
-            </a:r>
-            <a:r>
-              <a:rPr lang="en-US" cap="none" dirty="0"/>
-              <a:t> </a:t>
-            </a:r>
-            <a:r>
-              <a:rPr lang="en-US" b="1" cap="none" dirty="0"/>
-              <a:t>Microsoft MVP in Visual Studio</a:t>
-            </a:r>
-          </a:p>
-          <a:p>
-            <a:r>
-              <a:rPr lang="en-US" cap="none" dirty="0">
-                <a:latin typeface="FontAwesome" pitchFamily="50" charset="0"/>
-              </a:rPr>
-              <a:t></a:t>
-            </a:r>
-            <a:r>
-              <a:rPr lang="en-US" cap="none" dirty="0"/>
-              <a:t> </a:t>
-            </a:r>
-            <a:r>
-              <a:rPr lang="en-US" b="1" cap="none" dirty="0"/>
-              <a:t>Writer for Visual Studio Magazine</a:t>
-            </a:r>
-          </a:p>
-          <a:p>
-            <a:r>
-              <a:rPr lang="en-US" dirty="0">
-                <a:latin typeface="FontAwesome" pitchFamily="50" charset="0"/>
-              </a:rPr>
-              <a:t></a:t>
-            </a:r>
-            <a:r>
-              <a:rPr lang="en-US" cap="none" dirty="0"/>
-              <a:t> </a:t>
-            </a:r>
-            <a:r>
-              <a:rPr lang="en-US" b="1" cap="none" dirty="0"/>
-              <a:t>Owner of UseTech Design</a:t>
-            </a:r>
-          </a:p>
-          <a:p>
-            <a:r>
-              <a:rPr lang="en-US" dirty="0">
-                <a:latin typeface="FontAwesome" pitchFamily="50" charset="0"/>
-              </a:rPr>
-              <a:t></a:t>
-            </a:r>
-            <a:r>
-              <a:rPr lang="en-US" dirty="0"/>
-              <a:t> </a:t>
-            </a:r>
-            <a:r>
-              <a:rPr lang="en-US" b="1" cap="none" dirty="0"/>
-              <a:t>Building software that drives business</a:t>
-            </a:r>
-            <a:endParaRPr lang="en-US" sz="1800" b="1" dirty="0"/>
-          </a:p>
-        </p:txBody>
-      </p:sp>
-      <p:sp>
-        <p:nvSpPr>
-          <p:cNvPr id="15" name="Subtitle 2"/>
-          <p:cNvSpPr txBox="1">
-            <a:spLocks/>
-          </p:cNvSpPr>
-          <p:nvPr/>
-        </p:nvSpPr>
-        <p:spPr>
-          <a:xfrm>
-            <a:off x="4135264" y="4951122"/>
-            <a:ext cx="3917661" cy="1144878"/>
-          </a:xfrm>
-          <a:prstGeom prst="rect">
-            <a:avLst/>
-          </a:prstGeom>
-        </p:spPr>
-        <p:txBody>
-          <a:bodyPr vert="horz" lIns="91440" tIns="45720" rIns="91440" bIns="45720" numCol="1" rtlCol="0">
-            <a:noAutofit/>
-          </a:bodyPr>
-          <a:lstStyle>
-            <a:lvl1pPr marL="0" indent="0" algn="l" defTabSz="914400" rtl="0" eaLnBrk="1" latinLnBrk="0" hangingPunct="1">
-              <a:lnSpc>
-                <a:spcPct val="90000"/>
-              </a:lnSpc>
-              <a:spcBef>
-                <a:spcPts val="1200"/>
-              </a:spcBef>
-              <a:spcAft>
-                <a:spcPts val="200"/>
-              </a:spcAft>
-              <a:buClr>
-                <a:schemeClr val="accent1"/>
-              </a:buClr>
-              <a:buSzPct val="100000"/>
-              <a:buFont typeface="Calibri" panose="020F0502020204030204" pitchFamily="34" charset="0"/>
-              <a:buNone/>
-              <a:defRPr sz="2400" kern="1200" cap="all" spc="200" baseline="0">
-                <a:solidFill>
-                  <a:schemeClr val="tx2"/>
-                </a:solidFill>
-                <a:latin typeface="+mj-lt"/>
-                <a:ea typeface="+mn-ea"/>
-                <a:cs typeface="+mn-cs"/>
-              </a:defRPr>
-            </a:lvl1pPr>
-            <a:lvl2pPr marL="457200" indent="0" algn="ctr" defTabSz="914400" rtl="0" eaLnBrk="1" latinLnBrk="0" hangingPunct="1">
-              <a:lnSpc>
-                <a:spcPct val="90000"/>
-              </a:lnSpc>
-              <a:spcBef>
-                <a:spcPts val="200"/>
-              </a:spcBef>
-              <a:spcAft>
-                <a:spcPts val="400"/>
-              </a:spcAft>
-              <a:buClr>
-                <a:schemeClr val="accent1"/>
-              </a:buClr>
-              <a:buFont typeface="Calibri" pitchFamily="34" charset="0"/>
-              <a:buNone/>
-              <a:defRPr sz="2400" kern="1200">
-                <a:solidFill>
-                  <a:schemeClr val="tx1">
-                    <a:lumMod val="75000"/>
-                    <a:lumOff val="25000"/>
-                  </a:schemeClr>
-                </a:solidFill>
-                <a:latin typeface="+mn-lt"/>
-                <a:ea typeface="+mn-ea"/>
-                <a:cs typeface="+mn-cs"/>
-              </a:defRPr>
-            </a:lvl2pPr>
-            <a:lvl3pPr marL="914400" indent="0" algn="ctr" defTabSz="914400" rtl="0" eaLnBrk="1" latinLnBrk="0" hangingPunct="1">
-              <a:lnSpc>
-                <a:spcPct val="90000"/>
-              </a:lnSpc>
-              <a:spcBef>
-                <a:spcPts val="200"/>
-              </a:spcBef>
-              <a:spcAft>
-                <a:spcPts val="400"/>
-              </a:spcAft>
-              <a:buClr>
-                <a:schemeClr val="accent1"/>
-              </a:buClr>
-              <a:buFont typeface="Calibri" pitchFamily="34" charset="0"/>
-              <a:buNone/>
-              <a:defRPr sz="2400" kern="1200">
-                <a:solidFill>
-                  <a:schemeClr val="tx1">
-                    <a:lumMod val="75000"/>
-                    <a:lumOff val="25000"/>
-                  </a:schemeClr>
-                </a:solidFill>
-                <a:latin typeface="+mn-lt"/>
-                <a:ea typeface="+mn-ea"/>
-                <a:cs typeface="+mn-cs"/>
-              </a:defRPr>
-            </a:lvl3pPr>
-            <a:lvl4pPr marL="1371600" indent="0" algn="ctr" defTabSz="914400" rtl="0" eaLnBrk="1" latinLnBrk="0" hangingPunct="1">
-              <a:lnSpc>
-                <a:spcPct val="90000"/>
-              </a:lnSpc>
-              <a:spcBef>
-                <a:spcPts val="200"/>
-              </a:spcBef>
-              <a:spcAft>
-                <a:spcPts val="400"/>
-              </a:spcAft>
-              <a:buClr>
-                <a:schemeClr val="accent1"/>
-              </a:buClr>
-              <a:buFont typeface="Calibri" pitchFamily="34" charset="0"/>
-              <a:buNone/>
-              <a:defRPr sz="2000" kern="1200">
-                <a:solidFill>
-                  <a:schemeClr val="tx1">
-                    <a:lumMod val="75000"/>
-                    <a:lumOff val="25000"/>
-                  </a:schemeClr>
-                </a:solidFill>
-                <a:latin typeface="+mn-lt"/>
-                <a:ea typeface="+mn-ea"/>
-                <a:cs typeface="+mn-cs"/>
-              </a:defRPr>
-            </a:lvl4pPr>
-            <a:lvl5pPr marL="1828800" indent="0" algn="ctr" defTabSz="914400" rtl="0" eaLnBrk="1" latinLnBrk="0" hangingPunct="1">
-              <a:lnSpc>
-                <a:spcPct val="90000"/>
-              </a:lnSpc>
-              <a:spcBef>
-                <a:spcPts val="200"/>
-              </a:spcBef>
-              <a:spcAft>
-                <a:spcPts val="400"/>
-              </a:spcAft>
-              <a:buClr>
-                <a:schemeClr val="accent1"/>
-              </a:buClr>
-              <a:buFont typeface="Calibri" pitchFamily="34" charset="0"/>
-              <a:buNone/>
-              <a:defRPr sz="2000" kern="1200">
-                <a:solidFill>
-                  <a:schemeClr val="tx1">
-                    <a:lumMod val="75000"/>
-                    <a:lumOff val="25000"/>
-                  </a:schemeClr>
-                </a:solidFill>
-                <a:latin typeface="+mn-lt"/>
-                <a:ea typeface="+mn-ea"/>
-                <a:cs typeface="+mn-cs"/>
-              </a:defRPr>
-            </a:lvl5pPr>
-            <a:lvl6pPr marL="2286000" indent="0" algn="ctr" defTabSz="914400" rtl="0" eaLnBrk="1" latinLnBrk="0" hangingPunct="1">
-              <a:lnSpc>
-                <a:spcPct val="90000"/>
-              </a:lnSpc>
-              <a:spcBef>
-                <a:spcPts val="200"/>
-              </a:spcBef>
-              <a:spcAft>
-                <a:spcPts val="400"/>
-              </a:spcAft>
-              <a:buClr>
-                <a:schemeClr val="accent1"/>
-              </a:buClr>
-              <a:buFont typeface="Calibri" pitchFamily="34" charset="0"/>
-              <a:buNone/>
-              <a:defRPr sz="2000" kern="1200">
-                <a:solidFill>
-                  <a:schemeClr val="tx1">
-                    <a:lumMod val="75000"/>
-                    <a:lumOff val="25000"/>
-                  </a:schemeClr>
-                </a:solidFill>
-                <a:latin typeface="+mn-lt"/>
-                <a:ea typeface="+mn-ea"/>
-                <a:cs typeface="+mn-cs"/>
-              </a:defRPr>
-            </a:lvl6pPr>
-            <a:lvl7pPr marL="2743200" indent="0" algn="ctr" defTabSz="914400" rtl="0" eaLnBrk="1" latinLnBrk="0" hangingPunct="1">
-              <a:lnSpc>
-                <a:spcPct val="90000"/>
-              </a:lnSpc>
-              <a:spcBef>
-                <a:spcPts val="200"/>
-              </a:spcBef>
-              <a:spcAft>
-                <a:spcPts val="400"/>
-              </a:spcAft>
-              <a:buClr>
-                <a:schemeClr val="accent1"/>
-              </a:buClr>
-              <a:buFont typeface="Calibri" pitchFamily="34" charset="0"/>
-              <a:buNone/>
-              <a:defRPr sz="2000" kern="1200">
-                <a:solidFill>
-                  <a:schemeClr val="tx1">
-                    <a:lumMod val="75000"/>
-                    <a:lumOff val="25000"/>
-                  </a:schemeClr>
-                </a:solidFill>
-                <a:latin typeface="+mn-lt"/>
-                <a:ea typeface="+mn-ea"/>
-                <a:cs typeface="+mn-cs"/>
-              </a:defRPr>
-            </a:lvl7pPr>
-            <a:lvl8pPr marL="3200400" indent="0" algn="ctr" defTabSz="914400" rtl="0" eaLnBrk="1" latinLnBrk="0" hangingPunct="1">
-              <a:lnSpc>
-                <a:spcPct val="90000"/>
-              </a:lnSpc>
-              <a:spcBef>
-                <a:spcPts val="200"/>
-              </a:spcBef>
-              <a:spcAft>
-                <a:spcPts val="400"/>
-              </a:spcAft>
-              <a:buClr>
-                <a:schemeClr val="accent1"/>
-              </a:buClr>
-              <a:buFont typeface="Calibri" pitchFamily="34" charset="0"/>
-              <a:buNone/>
-              <a:defRPr sz="2000" kern="1200">
-                <a:solidFill>
-                  <a:schemeClr val="tx1">
-                    <a:lumMod val="75000"/>
-                    <a:lumOff val="25000"/>
-                  </a:schemeClr>
-                </a:solidFill>
-                <a:latin typeface="+mn-lt"/>
-                <a:ea typeface="+mn-ea"/>
-                <a:cs typeface="+mn-cs"/>
-              </a:defRPr>
-            </a:lvl8pPr>
-            <a:lvl9pPr marL="3657600" indent="0" algn="ctr" defTabSz="914400" rtl="0" eaLnBrk="1" latinLnBrk="0" hangingPunct="1">
-              <a:lnSpc>
-                <a:spcPct val="90000"/>
-              </a:lnSpc>
-              <a:spcBef>
-                <a:spcPts val="200"/>
-              </a:spcBef>
-              <a:spcAft>
-                <a:spcPts val="400"/>
-              </a:spcAft>
-              <a:buClr>
-                <a:schemeClr val="accent1"/>
-              </a:buClr>
-              <a:buFont typeface="Calibri" pitchFamily="34" charset="0"/>
-              <a:buNone/>
-              <a:defRPr sz="2000" kern="1200">
-                <a:solidFill>
-                  <a:schemeClr val="tx1">
-                    <a:lumMod val="75000"/>
-                    <a:lumOff val="25000"/>
-                  </a:schemeClr>
-                </a:solidFill>
-                <a:latin typeface="+mn-lt"/>
-                <a:ea typeface="+mn-ea"/>
-                <a:cs typeface="+mn-cs"/>
-              </a:defRPr>
-            </a:lvl9pPr>
-          </a:lstStyle>
-          <a:p>
-            <a:pPr>
-              <a:lnSpc>
-                <a:spcPct val="50000"/>
-              </a:lnSpc>
-            </a:pPr>
-            <a:r>
-              <a:rPr lang="en-US" sz="2000" dirty="0">
-                <a:latin typeface="FontAwesome" pitchFamily="2" charset="0"/>
-              </a:rPr>
-              <a:t></a:t>
-            </a:r>
-            <a:r>
-              <a:rPr lang="en-US" dirty="0">
-                <a:latin typeface="FontAwesome" pitchFamily="2" charset="0"/>
-              </a:rPr>
-              <a:t> </a:t>
-            </a:r>
-            <a:r>
-              <a:rPr lang="en-US" sz="1800" dirty="0"/>
-              <a:t>www.ondrejbalas.com</a:t>
-            </a:r>
-          </a:p>
-          <a:p>
-            <a:pPr>
-              <a:lnSpc>
-                <a:spcPct val="50000"/>
-              </a:lnSpc>
-            </a:pPr>
-            <a:r>
-              <a:rPr lang="en-US" sz="2000" dirty="0">
-                <a:latin typeface="FontAwesome" pitchFamily="2" charset="0"/>
-              </a:rPr>
-              <a:t></a:t>
-            </a:r>
-            <a:r>
-              <a:rPr lang="en-US" dirty="0">
-                <a:latin typeface="FontAwesome" pitchFamily="2" charset="0"/>
-              </a:rPr>
-              <a:t> </a:t>
-            </a:r>
-            <a:r>
-              <a:rPr lang="en-US" sz="1800" dirty="0"/>
-              <a:t>Ondrej@ondrejbalas.com</a:t>
-            </a:r>
-          </a:p>
-          <a:p>
-            <a:pPr>
-              <a:lnSpc>
-                <a:spcPct val="50000"/>
-              </a:lnSpc>
-            </a:pPr>
-            <a:r>
-              <a:rPr lang="en-US" sz="1800" dirty="0">
-                <a:latin typeface="FontAwesome" pitchFamily="50" charset="0"/>
-              </a:rPr>
-              <a:t></a:t>
-            </a:r>
-            <a:r>
-              <a:rPr lang="en-US" sz="1800" dirty="0"/>
-              <a:t> @ondrejbalas</a:t>
-            </a:r>
-          </a:p>
-          <a:p>
-            <a:pPr>
-              <a:lnSpc>
-                <a:spcPct val="50000"/>
-              </a:lnSpc>
-            </a:pPr>
-            <a:endParaRPr lang="en-US" sz="1800" dirty="0"/>
-          </a:p>
-        </p:txBody>
-      </p:sp>
-    </p:spTree>
-    <p:extLst>
-      <p:ext uri="{BB962C8B-B14F-4D97-AF65-F5344CB8AC3E}">
-        <p14:creationId xmlns:p14="http://schemas.microsoft.com/office/powerpoint/2010/main" val="643858046"/>
-      </p:ext>
-    </p:extLst>
-  </p:cSld>
-  <p:clrMapOvr>
-    <a:masterClrMapping/>
-  </p:clrMapOvr>
-</p:sld>
-</file>
-
-<file path=ppt/slides/slide20.xml><?xml version="1.0" encoding="utf-8"?>
+<file path=ppt/slides/slide19.xml><?xml version="1.0" encoding="utf-8"?>
 <p:sld xmlns:a="http://schemas.openxmlformats.org/drawingml/2006/main" xmlns:r="http://schemas.openxmlformats.org/officeDocument/2006/relationships" xmlns:p="http://schemas.openxmlformats.org/presentationml/2006/main" showMasterSp="0">
   <p:cSld>
     <p:spTree>
@@ -12241,7 +11191,914 @@
 </p:sld>
 </file>
 
-<file path=ppt/slides/slide21.xml><?xml version="1.0" encoding="utf-8"?>
+<file path=ppt/slides/slide2.xml><?xml version="1.0" encoding="utf-8"?>
+<p:sld xmlns:a="http://schemas.openxmlformats.org/drawingml/2006/main" xmlns:r="http://schemas.openxmlformats.org/officeDocument/2006/relationships" xmlns:p="http://schemas.openxmlformats.org/presentationml/2006/main">
+  <p:cSld>
+    <p:spTree>
+      <p:nvGrpSpPr>
+        <p:cNvPr id="1" name=""/>
+        <p:cNvGrpSpPr/>
+        <p:nvPr/>
+      </p:nvGrpSpPr>
+      <p:grpSpPr>
+        <a:xfrm>
+          <a:off x="0" y="0"/>
+          <a:ext cx="0" cy="0"/>
+          <a:chOff x="0" y="0"/>
+          <a:chExt cx="0" cy="0"/>
+        </a:xfrm>
+      </p:grpSpPr>
+      <p:sp>
+        <p:nvSpPr>
+          <p:cNvPr id="3" name="Subtitle 2"/>
+          <p:cNvSpPr>
+            <a:spLocks noGrp="1"/>
+          </p:cNvSpPr>
+          <p:nvPr>
+            <p:ph type="subTitle" idx="1"/>
+          </p:nvPr>
+        </p:nvSpPr>
+        <p:spPr>
+          <a:xfrm>
+            <a:off x="789973" y="218949"/>
+            <a:ext cx="10639605" cy="1403169"/>
+          </a:xfrm>
+        </p:spPr>
+        <p:txBody>
+          <a:bodyPr numCol="1">
+            <a:normAutofit/>
+          </a:bodyPr>
+          <a:lstStyle/>
+          <a:p>
+            <a:r>
+              <a:rPr lang="en-US" sz="8000" dirty="0"/>
+              <a:t>Ondrej  balas</a:t>
+            </a:r>
+            <a:endParaRPr lang="en-US" sz="5400" dirty="0"/>
+          </a:p>
+        </p:txBody>
+      </p:sp>
+      <p:pic>
+        <p:nvPicPr>
+          <p:cNvPr id="6" name="Picture 3" descr="J:\UTD\Logo\1.png"/>
+          <p:cNvPicPr>
+            <a:picLocks noChangeAspect="1" noChangeArrowheads="1"/>
+          </p:cNvPicPr>
+          <p:nvPr/>
+        </p:nvPicPr>
+        <p:blipFill>
+          <a:blip r:embed="rId3" cstate="print">
+            <a:extLst>
+              <a:ext uri="{28A0092B-C50C-407E-A947-70E740481C1C}">
+                <a14:useLocalDpi xmlns:a14="http://schemas.microsoft.com/office/drawing/2010/main" val="0"/>
+              </a:ext>
+            </a:extLst>
+          </a:blip>
+          <a:srcRect/>
+          <a:stretch>
+            <a:fillRect/>
+          </a:stretch>
+        </p:blipFill>
+        <p:spPr bwMode="auto">
+          <a:xfrm>
+            <a:off x="1246035" y="4224385"/>
+            <a:ext cx="1931293" cy="1448696"/>
+          </a:xfrm>
+          <a:prstGeom prst="rect">
+            <a:avLst/>
+          </a:prstGeom>
+          <a:noFill/>
+          <a:extLst>
+            <a:ext uri="{909E8E84-426E-40DD-AFC4-6F175D3DCCD1}">
+              <a14:hiddenFill xmlns:a14="http://schemas.microsoft.com/office/drawing/2010/main">
+                <a:solidFill>
+                  <a:srgbClr val="FFFFFF"/>
+                </a:solidFill>
+              </a14:hiddenFill>
+            </a:ext>
+          </a:extLst>
+        </p:spPr>
+      </p:pic>
+      <p:pic>
+        <p:nvPicPr>
+          <p:cNvPr id="7" name="Picture 2"/>
+          <p:cNvPicPr>
+            <a:picLocks noChangeAspect="1" noChangeArrowheads="1"/>
+          </p:cNvPicPr>
+          <p:nvPr/>
+        </p:nvPicPr>
+        <p:blipFill>
+          <a:blip r:embed="rId4"/>
+          <a:stretch>
+            <a:fillRect/>
+          </a:stretch>
+        </p:blipFill>
+        <p:spPr bwMode="auto">
+          <a:xfrm>
+            <a:off x="8725975" y="1187827"/>
+            <a:ext cx="2814365" cy="2814365"/>
+          </a:xfrm>
+          <a:prstGeom prst="rect">
+            <a:avLst/>
+          </a:prstGeom>
+          <a:noFill/>
+          <a:extLst>
+            <a:ext uri="{909E8E84-426E-40DD-AFC4-6F175D3DCCD1}">
+              <a14:hiddenFill xmlns:a14="http://schemas.microsoft.com/office/drawing/2010/main">
+                <a:solidFill>
+                  <a:srgbClr val="FFFFFF"/>
+                </a:solidFill>
+              </a14:hiddenFill>
+            </a:ext>
+          </a:extLst>
+        </p:spPr>
+      </p:pic>
+      <p:pic>
+        <p:nvPicPr>
+          <p:cNvPr id="6146" name="Picture 2" descr="http://timradney.com/wp-content/uploads/2014/06/1780-mvp_horizontal_fullcolor-550x0.png"/>
+          <p:cNvPicPr>
+            <a:picLocks noChangeAspect="1" noChangeArrowheads="1"/>
+          </p:cNvPicPr>
+          <p:nvPr/>
+        </p:nvPicPr>
+        <p:blipFill>
+          <a:blip r:embed="rId5">
+            <a:extLst>
+              <a:ext uri="{28A0092B-C50C-407E-A947-70E740481C1C}">
+                <a14:useLocalDpi xmlns:a14="http://schemas.microsoft.com/office/drawing/2010/main" val="0"/>
+              </a:ext>
+            </a:extLst>
+          </a:blip>
+          <a:srcRect/>
+          <a:stretch>
+            <a:fillRect/>
+          </a:stretch>
+        </p:blipFill>
+        <p:spPr bwMode="auto">
+          <a:xfrm>
+            <a:off x="8650662" y="4834443"/>
+            <a:ext cx="2889678" cy="1166379"/>
+          </a:xfrm>
+          <a:prstGeom prst="rect">
+            <a:avLst/>
+          </a:prstGeom>
+          <a:noFill/>
+          <a:extLst>
+            <a:ext uri="{909E8E84-426E-40DD-AFC4-6F175D3DCCD1}">
+              <a14:hiddenFill xmlns:a14="http://schemas.microsoft.com/office/drawing/2010/main">
+                <a:solidFill>
+                  <a:srgbClr val="FFFFFF"/>
+                </a:solidFill>
+              </a14:hiddenFill>
+            </a:ext>
+          </a:extLst>
+        </p:spPr>
+      </p:pic>
+      <p:sp>
+        <p:nvSpPr>
+          <p:cNvPr id="12" name="Subtitle 2"/>
+          <p:cNvSpPr txBox="1">
+            <a:spLocks/>
+          </p:cNvSpPr>
+          <p:nvPr/>
+        </p:nvSpPr>
+        <p:spPr>
+          <a:xfrm>
+            <a:off x="1293091" y="1627292"/>
+            <a:ext cx="7221644" cy="2374900"/>
+          </a:xfrm>
+          <a:prstGeom prst="rect">
+            <a:avLst/>
+          </a:prstGeom>
+        </p:spPr>
+        <p:txBody>
+          <a:bodyPr vert="horz" lIns="91440" tIns="45720" rIns="91440" bIns="45720" numCol="1" rtlCol="0">
+            <a:noAutofit/>
+          </a:bodyPr>
+          <a:lstStyle>
+            <a:lvl1pPr marL="0" indent="0" algn="l" defTabSz="914400" rtl="0" eaLnBrk="1" latinLnBrk="0" hangingPunct="1">
+              <a:lnSpc>
+                <a:spcPct val="90000"/>
+              </a:lnSpc>
+              <a:spcBef>
+                <a:spcPts val="1200"/>
+              </a:spcBef>
+              <a:spcAft>
+                <a:spcPts val="200"/>
+              </a:spcAft>
+              <a:buClr>
+                <a:schemeClr val="accent1"/>
+              </a:buClr>
+              <a:buSzPct val="100000"/>
+              <a:buFont typeface="Calibri" panose="020F0502020204030204" pitchFamily="34" charset="0"/>
+              <a:buNone/>
+              <a:defRPr sz="2400" kern="1200" cap="all" spc="200" baseline="0">
+                <a:solidFill>
+                  <a:schemeClr val="tx2"/>
+                </a:solidFill>
+                <a:latin typeface="+mj-lt"/>
+                <a:ea typeface="+mn-ea"/>
+                <a:cs typeface="+mn-cs"/>
+              </a:defRPr>
+            </a:lvl1pPr>
+            <a:lvl2pPr marL="457200" indent="0" algn="ctr" defTabSz="914400" rtl="0" eaLnBrk="1" latinLnBrk="0" hangingPunct="1">
+              <a:lnSpc>
+                <a:spcPct val="90000"/>
+              </a:lnSpc>
+              <a:spcBef>
+                <a:spcPts val="200"/>
+              </a:spcBef>
+              <a:spcAft>
+                <a:spcPts val="400"/>
+              </a:spcAft>
+              <a:buClr>
+                <a:schemeClr val="accent1"/>
+              </a:buClr>
+              <a:buFont typeface="Calibri" pitchFamily="34" charset="0"/>
+              <a:buNone/>
+              <a:defRPr sz="2400" kern="1200">
+                <a:solidFill>
+                  <a:schemeClr val="tx1">
+                    <a:lumMod val="75000"/>
+                    <a:lumOff val="25000"/>
+                  </a:schemeClr>
+                </a:solidFill>
+                <a:latin typeface="+mn-lt"/>
+                <a:ea typeface="+mn-ea"/>
+                <a:cs typeface="+mn-cs"/>
+              </a:defRPr>
+            </a:lvl2pPr>
+            <a:lvl3pPr marL="914400" indent="0" algn="ctr" defTabSz="914400" rtl="0" eaLnBrk="1" latinLnBrk="0" hangingPunct="1">
+              <a:lnSpc>
+                <a:spcPct val="90000"/>
+              </a:lnSpc>
+              <a:spcBef>
+                <a:spcPts val="200"/>
+              </a:spcBef>
+              <a:spcAft>
+                <a:spcPts val="400"/>
+              </a:spcAft>
+              <a:buClr>
+                <a:schemeClr val="accent1"/>
+              </a:buClr>
+              <a:buFont typeface="Calibri" pitchFamily="34" charset="0"/>
+              <a:buNone/>
+              <a:defRPr sz="2400" kern="1200">
+                <a:solidFill>
+                  <a:schemeClr val="tx1">
+                    <a:lumMod val="75000"/>
+                    <a:lumOff val="25000"/>
+                  </a:schemeClr>
+                </a:solidFill>
+                <a:latin typeface="+mn-lt"/>
+                <a:ea typeface="+mn-ea"/>
+                <a:cs typeface="+mn-cs"/>
+              </a:defRPr>
+            </a:lvl3pPr>
+            <a:lvl4pPr marL="1371600" indent="0" algn="ctr" defTabSz="914400" rtl="0" eaLnBrk="1" latinLnBrk="0" hangingPunct="1">
+              <a:lnSpc>
+                <a:spcPct val="90000"/>
+              </a:lnSpc>
+              <a:spcBef>
+                <a:spcPts val="200"/>
+              </a:spcBef>
+              <a:spcAft>
+                <a:spcPts val="400"/>
+              </a:spcAft>
+              <a:buClr>
+                <a:schemeClr val="accent1"/>
+              </a:buClr>
+              <a:buFont typeface="Calibri" pitchFamily="34" charset="0"/>
+              <a:buNone/>
+              <a:defRPr sz="2000" kern="1200">
+                <a:solidFill>
+                  <a:schemeClr val="tx1">
+                    <a:lumMod val="75000"/>
+                    <a:lumOff val="25000"/>
+                  </a:schemeClr>
+                </a:solidFill>
+                <a:latin typeface="+mn-lt"/>
+                <a:ea typeface="+mn-ea"/>
+                <a:cs typeface="+mn-cs"/>
+              </a:defRPr>
+            </a:lvl4pPr>
+            <a:lvl5pPr marL="1828800" indent="0" algn="ctr" defTabSz="914400" rtl="0" eaLnBrk="1" latinLnBrk="0" hangingPunct="1">
+              <a:lnSpc>
+                <a:spcPct val="90000"/>
+              </a:lnSpc>
+              <a:spcBef>
+                <a:spcPts val="200"/>
+              </a:spcBef>
+              <a:spcAft>
+                <a:spcPts val="400"/>
+              </a:spcAft>
+              <a:buClr>
+                <a:schemeClr val="accent1"/>
+              </a:buClr>
+              <a:buFont typeface="Calibri" pitchFamily="34" charset="0"/>
+              <a:buNone/>
+              <a:defRPr sz="2000" kern="1200">
+                <a:solidFill>
+                  <a:schemeClr val="tx1">
+                    <a:lumMod val="75000"/>
+                    <a:lumOff val="25000"/>
+                  </a:schemeClr>
+                </a:solidFill>
+                <a:latin typeface="+mn-lt"/>
+                <a:ea typeface="+mn-ea"/>
+                <a:cs typeface="+mn-cs"/>
+              </a:defRPr>
+            </a:lvl5pPr>
+            <a:lvl6pPr marL="2286000" indent="0" algn="ctr" defTabSz="914400" rtl="0" eaLnBrk="1" latinLnBrk="0" hangingPunct="1">
+              <a:lnSpc>
+                <a:spcPct val="90000"/>
+              </a:lnSpc>
+              <a:spcBef>
+                <a:spcPts val="200"/>
+              </a:spcBef>
+              <a:spcAft>
+                <a:spcPts val="400"/>
+              </a:spcAft>
+              <a:buClr>
+                <a:schemeClr val="accent1"/>
+              </a:buClr>
+              <a:buFont typeface="Calibri" pitchFamily="34" charset="0"/>
+              <a:buNone/>
+              <a:defRPr sz="2000" kern="1200">
+                <a:solidFill>
+                  <a:schemeClr val="tx1">
+                    <a:lumMod val="75000"/>
+                    <a:lumOff val="25000"/>
+                  </a:schemeClr>
+                </a:solidFill>
+                <a:latin typeface="+mn-lt"/>
+                <a:ea typeface="+mn-ea"/>
+                <a:cs typeface="+mn-cs"/>
+              </a:defRPr>
+            </a:lvl6pPr>
+            <a:lvl7pPr marL="2743200" indent="0" algn="ctr" defTabSz="914400" rtl="0" eaLnBrk="1" latinLnBrk="0" hangingPunct="1">
+              <a:lnSpc>
+                <a:spcPct val="90000"/>
+              </a:lnSpc>
+              <a:spcBef>
+                <a:spcPts val="200"/>
+              </a:spcBef>
+              <a:spcAft>
+                <a:spcPts val="400"/>
+              </a:spcAft>
+              <a:buClr>
+                <a:schemeClr val="accent1"/>
+              </a:buClr>
+              <a:buFont typeface="Calibri" pitchFamily="34" charset="0"/>
+              <a:buNone/>
+              <a:defRPr sz="2000" kern="1200">
+                <a:solidFill>
+                  <a:schemeClr val="tx1">
+                    <a:lumMod val="75000"/>
+                    <a:lumOff val="25000"/>
+                  </a:schemeClr>
+                </a:solidFill>
+                <a:latin typeface="+mn-lt"/>
+                <a:ea typeface="+mn-ea"/>
+                <a:cs typeface="+mn-cs"/>
+              </a:defRPr>
+            </a:lvl7pPr>
+            <a:lvl8pPr marL="3200400" indent="0" algn="ctr" defTabSz="914400" rtl="0" eaLnBrk="1" latinLnBrk="0" hangingPunct="1">
+              <a:lnSpc>
+                <a:spcPct val="90000"/>
+              </a:lnSpc>
+              <a:spcBef>
+                <a:spcPts val="200"/>
+              </a:spcBef>
+              <a:spcAft>
+                <a:spcPts val="400"/>
+              </a:spcAft>
+              <a:buClr>
+                <a:schemeClr val="accent1"/>
+              </a:buClr>
+              <a:buFont typeface="Calibri" pitchFamily="34" charset="0"/>
+              <a:buNone/>
+              <a:defRPr sz="2000" kern="1200">
+                <a:solidFill>
+                  <a:schemeClr val="tx1">
+                    <a:lumMod val="75000"/>
+                    <a:lumOff val="25000"/>
+                  </a:schemeClr>
+                </a:solidFill>
+                <a:latin typeface="+mn-lt"/>
+                <a:ea typeface="+mn-ea"/>
+                <a:cs typeface="+mn-cs"/>
+              </a:defRPr>
+            </a:lvl8pPr>
+            <a:lvl9pPr marL="3657600" indent="0" algn="ctr" defTabSz="914400" rtl="0" eaLnBrk="1" latinLnBrk="0" hangingPunct="1">
+              <a:lnSpc>
+                <a:spcPct val="90000"/>
+              </a:lnSpc>
+              <a:spcBef>
+                <a:spcPts val="200"/>
+              </a:spcBef>
+              <a:spcAft>
+                <a:spcPts val="400"/>
+              </a:spcAft>
+              <a:buClr>
+                <a:schemeClr val="accent1"/>
+              </a:buClr>
+              <a:buFont typeface="Calibri" pitchFamily="34" charset="0"/>
+              <a:buNone/>
+              <a:defRPr sz="2000" kern="1200">
+                <a:solidFill>
+                  <a:schemeClr val="tx1">
+                    <a:lumMod val="75000"/>
+                    <a:lumOff val="25000"/>
+                  </a:schemeClr>
+                </a:solidFill>
+                <a:latin typeface="+mn-lt"/>
+                <a:ea typeface="+mn-ea"/>
+                <a:cs typeface="+mn-cs"/>
+              </a:defRPr>
+            </a:lvl9pPr>
+          </a:lstStyle>
+          <a:p>
+            <a:r>
+              <a:rPr lang="en-US" cap="none" dirty="0">
+                <a:latin typeface="FontAwesome" pitchFamily="50" charset="0"/>
+              </a:rPr>
+              <a:t></a:t>
+            </a:r>
+            <a:r>
+              <a:rPr lang="en-US" cap="none" dirty="0"/>
+              <a:t> </a:t>
+            </a:r>
+            <a:r>
+              <a:rPr lang="en-US" b="1" cap="none" dirty="0"/>
+              <a:t>Microsoft MVP in Visual Studio</a:t>
+            </a:r>
+          </a:p>
+          <a:p>
+            <a:r>
+              <a:rPr lang="en-US" cap="none" dirty="0">
+                <a:latin typeface="FontAwesome" pitchFamily="50" charset="0"/>
+              </a:rPr>
+              <a:t></a:t>
+            </a:r>
+            <a:r>
+              <a:rPr lang="en-US" cap="none" dirty="0"/>
+              <a:t> </a:t>
+            </a:r>
+            <a:r>
+              <a:rPr lang="en-US" b="1" cap="none" dirty="0"/>
+              <a:t>Blog at ondrejbalas.com</a:t>
+            </a:r>
+          </a:p>
+          <a:p>
+            <a:r>
+              <a:rPr lang="en-US" dirty="0">
+                <a:latin typeface="FontAwesome" pitchFamily="50" charset="0"/>
+              </a:rPr>
+              <a:t></a:t>
+            </a:r>
+            <a:r>
+              <a:rPr lang="en-US" cap="none" dirty="0"/>
+              <a:t> </a:t>
+            </a:r>
+            <a:r>
+              <a:rPr lang="en-US" b="1" cap="none" dirty="0"/>
+              <a:t>Consultant since 2001</a:t>
+            </a:r>
+          </a:p>
+          <a:p>
+            <a:r>
+              <a:rPr lang="en-US" dirty="0">
+                <a:latin typeface="FontAwesome" pitchFamily="50" charset="0"/>
+              </a:rPr>
+              <a:t></a:t>
+            </a:r>
+            <a:r>
+              <a:rPr lang="en-US" dirty="0"/>
+              <a:t> </a:t>
+            </a:r>
+            <a:r>
+              <a:rPr lang="en-US" b="1" cap="none" dirty="0"/>
+              <a:t>Founded startup in 2017</a:t>
+            </a:r>
+          </a:p>
+          <a:p>
+            <a:r>
+              <a:rPr lang="en-US" dirty="0">
+                <a:latin typeface="FontAwesome" pitchFamily="50" charset="0"/>
+              </a:rPr>
+              <a:t></a:t>
+            </a:r>
+            <a:r>
+              <a:rPr lang="en-US" dirty="0"/>
+              <a:t> </a:t>
+            </a:r>
+            <a:r>
+              <a:rPr lang="en-US" b="1" cap="none" dirty="0"/>
+              <a:t>Game development for fun</a:t>
+            </a:r>
+            <a:endParaRPr lang="en-US" sz="1800" b="1" dirty="0"/>
+          </a:p>
+        </p:txBody>
+      </p:sp>
+      <p:sp>
+        <p:nvSpPr>
+          <p:cNvPr id="15" name="Subtitle 2"/>
+          <p:cNvSpPr txBox="1">
+            <a:spLocks/>
+          </p:cNvSpPr>
+          <p:nvPr/>
+        </p:nvSpPr>
+        <p:spPr>
+          <a:xfrm>
+            <a:off x="3955164" y="4956749"/>
+            <a:ext cx="3917661" cy="1144878"/>
+          </a:xfrm>
+          <a:prstGeom prst="rect">
+            <a:avLst/>
+          </a:prstGeom>
+        </p:spPr>
+        <p:txBody>
+          <a:bodyPr vert="horz" lIns="91440" tIns="45720" rIns="91440" bIns="45720" numCol="1" rtlCol="0">
+            <a:noAutofit/>
+          </a:bodyPr>
+          <a:lstStyle>
+            <a:lvl1pPr marL="0" indent="0" algn="l" defTabSz="914400" rtl="0" eaLnBrk="1" latinLnBrk="0" hangingPunct="1">
+              <a:lnSpc>
+                <a:spcPct val="90000"/>
+              </a:lnSpc>
+              <a:spcBef>
+                <a:spcPts val="1200"/>
+              </a:spcBef>
+              <a:spcAft>
+                <a:spcPts val="200"/>
+              </a:spcAft>
+              <a:buClr>
+                <a:schemeClr val="accent1"/>
+              </a:buClr>
+              <a:buSzPct val="100000"/>
+              <a:buFont typeface="Calibri" panose="020F0502020204030204" pitchFamily="34" charset="0"/>
+              <a:buNone/>
+              <a:defRPr sz="2400" kern="1200" cap="all" spc="200" baseline="0">
+                <a:solidFill>
+                  <a:schemeClr val="tx2"/>
+                </a:solidFill>
+                <a:latin typeface="+mj-lt"/>
+                <a:ea typeface="+mn-ea"/>
+                <a:cs typeface="+mn-cs"/>
+              </a:defRPr>
+            </a:lvl1pPr>
+            <a:lvl2pPr marL="457200" indent="0" algn="ctr" defTabSz="914400" rtl="0" eaLnBrk="1" latinLnBrk="0" hangingPunct="1">
+              <a:lnSpc>
+                <a:spcPct val="90000"/>
+              </a:lnSpc>
+              <a:spcBef>
+                <a:spcPts val="200"/>
+              </a:spcBef>
+              <a:spcAft>
+                <a:spcPts val="400"/>
+              </a:spcAft>
+              <a:buClr>
+                <a:schemeClr val="accent1"/>
+              </a:buClr>
+              <a:buFont typeface="Calibri" pitchFamily="34" charset="0"/>
+              <a:buNone/>
+              <a:defRPr sz="2400" kern="1200">
+                <a:solidFill>
+                  <a:schemeClr val="tx1">
+                    <a:lumMod val="75000"/>
+                    <a:lumOff val="25000"/>
+                  </a:schemeClr>
+                </a:solidFill>
+                <a:latin typeface="+mn-lt"/>
+                <a:ea typeface="+mn-ea"/>
+                <a:cs typeface="+mn-cs"/>
+              </a:defRPr>
+            </a:lvl2pPr>
+            <a:lvl3pPr marL="914400" indent="0" algn="ctr" defTabSz="914400" rtl="0" eaLnBrk="1" latinLnBrk="0" hangingPunct="1">
+              <a:lnSpc>
+                <a:spcPct val="90000"/>
+              </a:lnSpc>
+              <a:spcBef>
+                <a:spcPts val="200"/>
+              </a:spcBef>
+              <a:spcAft>
+                <a:spcPts val="400"/>
+              </a:spcAft>
+              <a:buClr>
+                <a:schemeClr val="accent1"/>
+              </a:buClr>
+              <a:buFont typeface="Calibri" pitchFamily="34" charset="0"/>
+              <a:buNone/>
+              <a:defRPr sz="2400" kern="1200">
+                <a:solidFill>
+                  <a:schemeClr val="tx1">
+                    <a:lumMod val="75000"/>
+                    <a:lumOff val="25000"/>
+                  </a:schemeClr>
+                </a:solidFill>
+                <a:latin typeface="+mn-lt"/>
+                <a:ea typeface="+mn-ea"/>
+                <a:cs typeface="+mn-cs"/>
+              </a:defRPr>
+            </a:lvl3pPr>
+            <a:lvl4pPr marL="1371600" indent="0" algn="ctr" defTabSz="914400" rtl="0" eaLnBrk="1" latinLnBrk="0" hangingPunct="1">
+              <a:lnSpc>
+                <a:spcPct val="90000"/>
+              </a:lnSpc>
+              <a:spcBef>
+                <a:spcPts val="200"/>
+              </a:spcBef>
+              <a:spcAft>
+                <a:spcPts val="400"/>
+              </a:spcAft>
+              <a:buClr>
+                <a:schemeClr val="accent1"/>
+              </a:buClr>
+              <a:buFont typeface="Calibri" pitchFamily="34" charset="0"/>
+              <a:buNone/>
+              <a:defRPr sz="2000" kern="1200">
+                <a:solidFill>
+                  <a:schemeClr val="tx1">
+                    <a:lumMod val="75000"/>
+                    <a:lumOff val="25000"/>
+                  </a:schemeClr>
+                </a:solidFill>
+                <a:latin typeface="+mn-lt"/>
+                <a:ea typeface="+mn-ea"/>
+                <a:cs typeface="+mn-cs"/>
+              </a:defRPr>
+            </a:lvl4pPr>
+            <a:lvl5pPr marL="1828800" indent="0" algn="ctr" defTabSz="914400" rtl="0" eaLnBrk="1" latinLnBrk="0" hangingPunct="1">
+              <a:lnSpc>
+                <a:spcPct val="90000"/>
+              </a:lnSpc>
+              <a:spcBef>
+                <a:spcPts val="200"/>
+              </a:spcBef>
+              <a:spcAft>
+                <a:spcPts val="400"/>
+              </a:spcAft>
+              <a:buClr>
+                <a:schemeClr val="accent1"/>
+              </a:buClr>
+              <a:buFont typeface="Calibri" pitchFamily="34" charset="0"/>
+              <a:buNone/>
+              <a:defRPr sz="2000" kern="1200">
+                <a:solidFill>
+                  <a:schemeClr val="tx1">
+                    <a:lumMod val="75000"/>
+                    <a:lumOff val="25000"/>
+                  </a:schemeClr>
+                </a:solidFill>
+                <a:latin typeface="+mn-lt"/>
+                <a:ea typeface="+mn-ea"/>
+                <a:cs typeface="+mn-cs"/>
+              </a:defRPr>
+            </a:lvl5pPr>
+            <a:lvl6pPr marL="2286000" indent="0" algn="ctr" defTabSz="914400" rtl="0" eaLnBrk="1" latinLnBrk="0" hangingPunct="1">
+              <a:lnSpc>
+                <a:spcPct val="90000"/>
+              </a:lnSpc>
+              <a:spcBef>
+                <a:spcPts val="200"/>
+              </a:spcBef>
+              <a:spcAft>
+                <a:spcPts val="400"/>
+              </a:spcAft>
+              <a:buClr>
+                <a:schemeClr val="accent1"/>
+              </a:buClr>
+              <a:buFont typeface="Calibri" pitchFamily="34" charset="0"/>
+              <a:buNone/>
+              <a:defRPr sz="2000" kern="1200">
+                <a:solidFill>
+                  <a:schemeClr val="tx1">
+                    <a:lumMod val="75000"/>
+                    <a:lumOff val="25000"/>
+                  </a:schemeClr>
+                </a:solidFill>
+                <a:latin typeface="+mn-lt"/>
+                <a:ea typeface="+mn-ea"/>
+                <a:cs typeface="+mn-cs"/>
+              </a:defRPr>
+            </a:lvl6pPr>
+            <a:lvl7pPr marL="2743200" indent="0" algn="ctr" defTabSz="914400" rtl="0" eaLnBrk="1" latinLnBrk="0" hangingPunct="1">
+              <a:lnSpc>
+                <a:spcPct val="90000"/>
+              </a:lnSpc>
+              <a:spcBef>
+                <a:spcPts val="200"/>
+              </a:spcBef>
+              <a:spcAft>
+                <a:spcPts val="400"/>
+              </a:spcAft>
+              <a:buClr>
+                <a:schemeClr val="accent1"/>
+              </a:buClr>
+              <a:buFont typeface="Calibri" pitchFamily="34" charset="0"/>
+              <a:buNone/>
+              <a:defRPr sz="2000" kern="1200">
+                <a:solidFill>
+                  <a:schemeClr val="tx1">
+                    <a:lumMod val="75000"/>
+                    <a:lumOff val="25000"/>
+                  </a:schemeClr>
+                </a:solidFill>
+                <a:latin typeface="+mn-lt"/>
+                <a:ea typeface="+mn-ea"/>
+                <a:cs typeface="+mn-cs"/>
+              </a:defRPr>
+            </a:lvl7pPr>
+            <a:lvl8pPr marL="3200400" indent="0" algn="ctr" defTabSz="914400" rtl="0" eaLnBrk="1" latinLnBrk="0" hangingPunct="1">
+              <a:lnSpc>
+                <a:spcPct val="90000"/>
+              </a:lnSpc>
+              <a:spcBef>
+                <a:spcPts val="200"/>
+              </a:spcBef>
+              <a:spcAft>
+                <a:spcPts val="400"/>
+              </a:spcAft>
+              <a:buClr>
+                <a:schemeClr val="accent1"/>
+              </a:buClr>
+              <a:buFont typeface="Calibri" pitchFamily="34" charset="0"/>
+              <a:buNone/>
+              <a:defRPr sz="2000" kern="1200">
+                <a:solidFill>
+                  <a:schemeClr val="tx1">
+                    <a:lumMod val="75000"/>
+                    <a:lumOff val="25000"/>
+                  </a:schemeClr>
+                </a:solidFill>
+                <a:latin typeface="+mn-lt"/>
+                <a:ea typeface="+mn-ea"/>
+                <a:cs typeface="+mn-cs"/>
+              </a:defRPr>
+            </a:lvl8pPr>
+            <a:lvl9pPr marL="3657600" indent="0" algn="ctr" defTabSz="914400" rtl="0" eaLnBrk="1" latinLnBrk="0" hangingPunct="1">
+              <a:lnSpc>
+                <a:spcPct val="90000"/>
+              </a:lnSpc>
+              <a:spcBef>
+                <a:spcPts val="200"/>
+              </a:spcBef>
+              <a:spcAft>
+                <a:spcPts val="400"/>
+              </a:spcAft>
+              <a:buClr>
+                <a:schemeClr val="accent1"/>
+              </a:buClr>
+              <a:buFont typeface="Calibri" pitchFamily="34" charset="0"/>
+              <a:buNone/>
+              <a:defRPr sz="2000" kern="1200">
+                <a:solidFill>
+                  <a:schemeClr val="tx1">
+                    <a:lumMod val="75000"/>
+                    <a:lumOff val="25000"/>
+                  </a:schemeClr>
+                </a:solidFill>
+                <a:latin typeface="+mn-lt"/>
+                <a:ea typeface="+mn-ea"/>
+                <a:cs typeface="+mn-cs"/>
+              </a:defRPr>
+            </a:lvl9pPr>
+          </a:lstStyle>
+          <a:p>
+            <a:pPr>
+              <a:lnSpc>
+                <a:spcPct val="50000"/>
+              </a:lnSpc>
+            </a:pPr>
+            <a:r>
+              <a:rPr lang="en-US" sz="2000" dirty="0">
+                <a:latin typeface="FontAwesome" pitchFamily="2" charset="0"/>
+              </a:rPr>
+              <a:t></a:t>
+            </a:r>
+            <a:r>
+              <a:rPr lang="en-US" dirty="0">
+                <a:latin typeface="FontAwesome" pitchFamily="2" charset="0"/>
+              </a:rPr>
+              <a:t> </a:t>
+            </a:r>
+            <a:r>
+              <a:rPr lang="en-US" sz="1800" dirty="0"/>
+              <a:t>www.ondrejbalas.com</a:t>
+            </a:r>
+          </a:p>
+          <a:p>
+            <a:pPr>
+              <a:lnSpc>
+                <a:spcPct val="50000"/>
+              </a:lnSpc>
+            </a:pPr>
+            <a:r>
+              <a:rPr lang="en-US" sz="2000" dirty="0">
+                <a:latin typeface="FontAwesome" pitchFamily="2" charset="0"/>
+              </a:rPr>
+              <a:t></a:t>
+            </a:r>
+            <a:r>
+              <a:rPr lang="en-US" dirty="0">
+                <a:latin typeface="FontAwesome" pitchFamily="2" charset="0"/>
+              </a:rPr>
+              <a:t> </a:t>
+            </a:r>
+            <a:r>
+              <a:rPr lang="en-US" sz="1800" dirty="0"/>
+              <a:t>Ondrej@ondrejbalas.com</a:t>
+            </a:r>
+          </a:p>
+          <a:p>
+            <a:pPr>
+              <a:lnSpc>
+                <a:spcPct val="50000"/>
+              </a:lnSpc>
+            </a:pPr>
+            <a:r>
+              <a:rPr lang="en-US" sz="1800" dirty="0">
+                <a:latin typeface="FontAwesome" pitchFamily="50" charset="0"/>
+              </a:rPr>
+              <a:t></a:t>
+            </a:r>
+            <a:r>
+              <a:rPr lang="en-US" sz="1800" dirty="0"/>
+              <a:t> @ondrejbalas</a:t>
+            </a:r>
+          </a:p>
+          <a:p>
+            <a:pPr>
+              <a:lnSpc>
+                <a:spcPct val="50000"/>
+              </a:lnSpc>
+            </a:pPr>
+            <a:endParaRPr lang="en-US" sz="1800" dirty="0"/>
+          </a:p>
+        </p:txBody>
+      </p:sp>
+      <p:pic>
+        <p:nvPicPr>
+          <p:cNvPr id="3074" name="Picture 2" descr="logo">
+            <a:extLst>
+              <a:ext uri="{FF2B5EF4-FFF2-40B4-BE49-F238E27FC236}">
+                <a16:creationId xmlns:a16="http://schemas.microsoft.com/office/drawing/2014/main" id="{1351B2E5-6623-4EE8-982B-1D09BAD125CC}"/>
+              </a:ext>
+            </a:extLst>
+          </p:cNvPr>
+          <p:cNvPicPr>
+            <a:picLocks noChangeAspect="1" noChangeArrowheads="1"/>
+          </p:cNvPicPr>
+          <p:nvPr/>
+        </p:nvPicPr>
+        <p:blipFill>
+          <a:blip r:embed="rId6">
+            <a:extLst>
+              <a:ext uri="{28A0092B-C50C-407E-A947-70E740481C1C}">
+                <a14:useLocalDpi xmlns:a14="http://schemas.microsoft.com/office/drawing/2010/main" val="0"/>
+              </a:ext>
+            </a:extLst>
+          </a:blip>
+          <a:srcRect/>
+          <a:stretch>
+            <a:fillRect/>
+          </a:stretch>
+        </p:blipFill>
+        <p:spPr bwMode="auto">
+          <a:xfrm>
+            <a:off x="1136734" y="5529188"/>
+            <a:ext cx="2040594" cy="680198"/>
+          </a:xfrm>
+          <a:prstGeom prst="rect">
+            <a:avLst/>
+          </a:prstGeom>
+          <a:noFill/>
+          <a:extLst>
+            <a:ext uri="{909E8E84-426E-40DD-AFC4-6F175D3DCCD1}">
+              <a14:hiddenFill xmlns:a14="http://schemas.microsoft.com/office/drawing/2010/main">
+                <a:solidFill>
+                  <a:srgbClr val="FFFFFF"/>
+                </a:solidFill>
+              </a14:hiddenFill>
+            </a:ext>
+          </a:extLst>
+        </p:spPr>
+      </p:pic>
+    </p:spTree>
+    <p:extLst>
+      <p:ext uri="{BB962C8B-B14F-4D97-AF65-F5344CB8AC3E}">
+        <p14:creationId xmlns:p14="http://schemas.microsoft.com/office/powerpoint/2010/main" val="2608099043"/>
+      </p:ext>
+    </p:extLst>
+  </p:cSld>
+  <p:clrMapOvr>
+    <a:masterClrMapping/>
+  </p:clrMapOvr>
+</p:sld>
+</file>
+
+<file path=ppt/slides/slide20.xml><?xml version="1.0" encoding="utf-8"?>
 <p:sld xmlns:a="http://schemas.openxmlformats.org/drawingml/2006/main" xmlns:r="http://schemas.openxmlformats.org/officeDocument/2006/relationships" xmlns:p="http://schemas.openxmlformats.org/presentationml/2006/main">
   <p:cSld>
     <p:spTree>
@@ -13027,32 +12884,40 @@
               <a:buNone/>
             </a:pPr>
             <a:r>
-              <a:rPr lang="en-US" sz="2400" strike="sngStrike" dirty="0"/>
-              <a:t>MVC 6</a:t>
-            </a:r>
-            <a:r>
-              <a:rPr lang="en-US" sz="2400" dirty="0"/>
-              <a:t> </a:t>
-            </a:r>
-            <a:r>
               <a:rPr lang="en-US" sz="2400" b="1" dirty="0"/>
-              <a:t>ASP.NET Core MVC 1.0</a:t>
+              <a:t>ASP.NET Core MVC 2.1</a:t>
             </a:r>
             <a:r>
               <a:rPr lang="en-US" sz="2400" dirty="0"/>
               <a:t> templates use </a:t>
             </a:r>
             <a:r>
-              <a:rPr lang="en-US" sz="2400" strike="sngStrike" dirty="0"/>
-              <a:t>Identity 3</a:t>
-            </a:r>
+              <a:rPr lang="en-US" sz="2400" b="1" dirty="0"/>
+              <a:t>ASP.NET Core Identity 2.1</a:t>
+            </a:r>
+          </a:p>
+          <a:p>
+            <a:pPr marL="0" indent="0" algn="ctr">
+              <a:lnSpc>
+                <a:spcPct val="150000"/>
+              </a:lnSpc>
+              <a:buNone/>
+            </a:pPr>
             <a:r>
               <a:rPr lang="en-US" sz="2400" dirty="0"/>
-              <a:t> </a:t>
+              <a:t>As of </a:t>
             </a:r>
             <a:r>
               <a:rPr lang="en-US" sz="2400" b="1" dirty="0"/>
-              <a:t>ASP.NET Core Identity 1.0</a:t>
+              <a:t>2.1</a:t>
+            </a:r>
+            <a:r>
+              <a:rPr lang="en-US" sz="2400" dirty="0"/>
+              <a:t>, UI (default views) is provided as a </a:t>
+            </a:r>
+            <a:r>
+              <a:rPr lang="en-US" sz="2400" b="1" dirty="0"/>
+              <a:t>Razor Class Library</a:t>
             </a:r>
           </a:p>
         </p:txBody>
@@ -13202,6 +13067,55 @@
                                           <p:spTgt spid="3">
                                             <p:txEl>
                                               <p:pRg st="2" end="2"/>
+                                            </p:txEl>
+                                          </p:spTgt>
+                                        </p:tgtEl>
+                                        <p:attrNameLst>
+                                          <p:attrName>style.visibility</p:attrName>
+                                        </p:attrNameLst>
+                                      </p:cBhvr>
+                                      <p:to>
+                                        <p:strVal val="visible"/>
+                                      </p:to>
+                                    </p:set>
+                                  </p:childTnLst>
+                                </p:cTn>
+                              </p:par>
+                            </p:childTnLst>
+                          </p:cTn>
+                        </p:par>
+                      </p:childTnLst>
+                    </p:cTn>
+                  </p:par>
+                  <p:par>
+                    <p:cTn id="15" fill="hold">
+                      <p:stCondLst>
+                        <p:cond delay="indefinite"/>
+                      </p:stCondLst>
+                      <p:childTnLst>
+                        <p:par>
+                          <p:cTn id="16" fill="hold">
+                            <p:stCondLst>
+                              <p:cond delay="0"/>
+                            </p:stCondLst>
+                            <p:childTnLst>
+                              <p:par>
+                                <p:cTn id="17" presetID="1" presetClass="entr" presetSubtype="0" fill="hold" nodeType="clickEffect">
+                                  <p:stCondLst>
+                                    <p:cond delay="0"/>
+                                  </p:stCondLst>
+                                  <p:childTnLst>
+                                    <p:set>
+                                      <p:cBhvr>
+                                        <p:cTn id="18" dur="1" fill="hold">
+                                          <p:stCondLst>
+                                            <p:cond delay="0"/>
+                                          </p:stCondLst>
+                                        </p:cTn>
+                                        <p:tgtEl>
+                                          <p:spTgt spid="3">
+                                            <p:txEl>
+                                              <p:pRg st="3" end="3"/>
                                             </p:txEl>
                                           </p:spTgt>
                                         </p:tgtEl>
@@ -14346,7 +14260,7 @@
             </a:pPr>
             <a:r>
               <a:rPr lang="en-US" sz="2400" dirty="0"/>
-              <a:t>OAuth &amp; OpenID (Facebook, Google, Microsoft Live, LinkedIn, etc..)</a:t>
+              <a:t>OAuth &amp; OpenID Connect (Facebook, Google, Microsoft Live, LinkedIn, etc..)</a:t>
             </a:r>
           </a:p>
           <a:p>
@@ -14752,7 +14666,7 @@
             </a:pPr>
             <a:r>
               <a:rPr lang="en-US" sz="2400" dirty="0"/>
-              <a:t>Additional bits of information</a:t>
+              <a:t>Additional bits of information attached to a user</a:t>
             </a:r>
           </a:p>
           <a:p>

</xml_diff>